<commit_message>
Work on animations for powerpoint
</commit_message>
<xml_diff>
--- a/ThatConference2023.pptx
+++ b/ThatConference2023.pptx
@@ -237,7 +237,7 @@
           <a:p>
             <a:fld id="{BA065681-88F1-4872-B208-B53BCC8B42F3}" type="datetimeFigureOut">
               <a:rPr lang="en-US" smtClean="0"/>
-              <a:t>5/23/2023</a:t>
+              <a:t>5/24/2023</a:t>
             </a:fld>
             <a:endParaRPr lang="en-US"/>
           </a:p>
@@ -641,6 +641,90 @@
           <a:bodyPr/>
           <a:lstStyle/>
           <a:p>
+            <a:endParaRPr lang="en-US" dirty="0"/>
+          </a:p>
+        </p:txBody>
+      </p:sp>
+      <p:sp>
+        <p:nvSpPr>
+          <p:cNvPr id="4" name="Slide Number Placeholder 3"/>
+          <p:cNvSpPr>
+            <a:spLocks noGrp="1"/>
+          </p:cNvSpPr>
+          <p:nvPr>
+            <p:ph type="sldNum" sz="quarter" idx="5"/>
+          </p:nvPr>
+        </p:nvSpPr>
+        <p:spPr/>
+        <p:txBody>
+          <a:bodyPr/>
+          <a:lstStyle/>
+          <a:p>
+            <a:fld id="{AAA20043-755E-4D2A-B767-23CBDFF65C2F}" type="slidenum">
+              <a:rPr lang="en-US" smtClean="0"/>
+              <a:t>3</a:t>
+            </a:fld>
+            <a:endParaRPr lang="en-US"/>
+          </a:p>
+        </p:txBody>
+      </p:sp>
+    </p:spTree>
+    <p:extLst>
+      <p:ext uri="{BB962C8B-B14F-4D97-AF65-F5344CB8AC3E}">
+        <p14:creationId xmlns:p14="http://schemas.microsoft.com/office/powerpoint/2010/main" val="670499103"/>
+      </p:ext>
+    </p:extLst>
+  </p:cSld>
+  <p:clrMapOvr>
+    <a:masterClrMapping/>
+  </p:clrMapOvr>
+</p:notes>
+</file>
+
+<file path=ppt/notesSlides/notesSlide3.xml><?xml version="1.0" encoding="utf-8"?>
+<p:notes xmlns:a="http://schemas.openxmlformats.org/drawingml/2006/main" xmlns:r="http://schemas.openxmlformats.org/officeDocument/2006/relationships" xmlns:p="http://schemas.openxmlformats.org/presentationml/2006/main">
+  <p:cSld>
+    <p:spTree>
+      <p:nvGrpSpPr>
+        <p:cNvPr id="1" name=""/>
+        <p:cNvGrpSpPr/>
+        <p:nvPr/>
+      </p:nvGrpSpPr>
+      <p:grpSpPr>
+        <a:xfrm>
+          <a:off x="0" y="0"/>
+          <a:ext cx="0" cy="0"/>
+          <a:chOff x="0" y="0"/>
+          <a:chExt cx="0" cy="0"/>
+        </a:xfrm>
+      </p:grpSpPr>
+      <p:sp>
+        <p:nvSpPr>
+          <p:cNvPr id="2" name="Slide Image Placeholder 1"/>
+          <p:cNvSpPr>
+            <a:spLocks noGrp="1" noRot="1" noChangeAspect="1"/>
+          </p:cNvSpPr>
+          <p:nvPr>
+            <p:ph type="sldImg"/>
+          </p:nvPr>
+        </p:nvSpPr>
+        <p:spPr/>
+      </p:sp>
+      <p:sp>
+        <p:nvSpPr>
+          <p:cNvPr id="3" name="Notes Placeholder 2"/>
+          <p:cNvSpPr>
+            <a:spLocks noGrp="1"/>
+          </p:cNvSpPr>
+          <p:nvPr>
+            <p:ph type="body" idx="1"/>
+          </p:nvPr>
+        </p:nvSpPr>
+        <p:spPr/>
+        <p:txBody>
+          <a:bodyPr/>
+          <a:lstStyle/>
+          <a:p>
             <a:r>
               <a:rPr lang="en-US" dirty="0"/>
               <a:t>END 2:37</a:t>
@@ -815,7 +899,7 @@
           <a:p>
             <a:fld id="{846CE7D5-CF57-46EF-B807-FDD0502418D4}" type="datetimeFigureOut">
               <a:rPr lang="en-US" smtClean="0"/>
-              <a:t>5/23/2023</a:t>
+              <a:t>5/24/2023</a:t>
             </a:fld>
             <a:endParaRPr lang="en-US" dirty="0"/>
           </a:p>
@@ -985,7 +1069,7 @@
           <a:p>
             <a:fld id="{846CE7D5-CF57-46EF-B807-FDD0502418D4}" type="datetimeFigureOut">
               <a:rPr lang="en-US" smtClean="0"/>
-              <a:t>5/23/2023</a:t>
+              <a:t>5/24/2023</a:t>
             </a:fld>
             <a:endParaRPr lang="en-US" dirty="0"/>
           </a:p>
@@ -1165,7 +1249,7 @@
           <a:p>
             <a:fld id="{846CE7D5-CF57-46EF-B807-FDD0502418D4}" type="datetimeFigureOut">
               <a:rPr lang="en-US" smtClean="0"/>
-              <a:t>5/23/2023</a:t>
+              <a:t>5/24/2023</a:t>
             </a:fld>
             <a:endParaRPr lang="en-US" dirty="0"/>
           </a:p>
@@ -1335,7 +1419,7 @@
           <a:p>
             <a:fld id="{846CE7D5-CF57-46EF-B807-FDD0502418D4}" type="datetimeFigureOut">
               <a:rPr lang="en-US" smtClean="0"/>
-              <a:t>5/23/2023</a:t>
+              <a:t>5/24/2023</a:t>
             </a:fld>
             <a:endParaRPr lang="en-US" dirty="0"/>
           </a:p>
@@ -1581,7 +1665,7 @@
           <a:p>
             <a:fld id="{846CE7D5-CF57-46EF-B807-FDD0502418D4}" type="datetimeFigureOut">
               <a:rPr lang="en-US" smtClean="0"/>
-              <a:t>5/23/2023</a:t>
+              <a:t>5/24/2023</a:t>
             </a:fld>
             <a:endParaRPr lang="en-US" dirty="0"/>
           </a:p>
@@ -1813,7 +1897,7 @@
           <a:p>
             <a:fld id="{846CE7D5-CF57-46EF-B807-FDD0502418D4}" type="datetimeFigureOut">
               <a:rPr lang="en-US" smtClean="0"/>
-              <a:t>5/23/2023</a:t>
+              <a:t>5/24/2023</a:t>
             </a:fld>
             <a:endParaRPr lang="en-US" dirty="0"/>
           </a:p>
@@ -2180,7 +2264,7 @@
           <a:p>
             <a:fld id="{846CE7D5-CF57-46EF-B807-FDD0502418D4}" type="datetimeFigureOut">
               <a:rPr lang="en-US" smtClean="0"/>
-              <a:t>5/23/2023</a:t>
+              <a:t>5/24/2023</a:t>
             </a:fld>
             <a:endParaRPr lang="en-US" dirty="0"/>
           </a:p>
@@ -2298,7 +2382,7 @@
           <a:p>
             <a:fld id="{846CE7D5-CF57-46EF-B807-FDD0502418D4}" type="datetimeFigureOut">
               <a:rPr lang="en-US" smtClean="0"/>
-              <a:t>5/23/2023</a:t>
+              <a:t>5/24/2023</a:t>
             </a:fld>
             <a:endParaRPr lang="en-US" dirty="0"/>
           </a:p>
@@ -2393,7 +2477,7 @@
           <a:p>
             <a:fld id="{846CE7D5-CF57-46EF-B807-FDD0502418D4}" type="datetimeFigureOut">
               <a:rPr lang="en-US" smtClean="0"/>
-              <a:t>5/23/2023</a:t>
+              <a:t>5/24/2023</a:t>
             </a:fld>
             <a:endParaRPr lang="en-US" dirty="0"/>
           </a:p>
@@ -2670,7 +2754,7 @@
           <a:p>
             <a:fld id="{846CE7D5-CF57-46EF-B807-FDD0502418D4}" type="datetimeFigureOut">
               <a:rPr lang="en-US" smtClean="0"/>
-              <a:t>5/23/2023</a:t>
+              <a:t>5/24/2023</a:t>
             </a:fld>
             <a:endParaRPr lang="en-US" dirty="0"/>
           </a:p>
@@ -2926,7 +3010,7 @@
           <a:p>
             <a:fld id="{846CE7D5-CF57-46EF-B807-FDD0502418D4}" type="datetimeFigureOut">
               <a:rPr lang="en-US" smtClean="0"/>
-              <a:t>5/23/2023</a:t>
+              <a:t>5/24/2023</a:t>
             </a:fld>
             <a:endParaRPr lang="en-US" dirty="0"/>
           </a:p>
@@ -3139,7 +3223,7 @@
           <a:p>
             <a:fld id="{846CE7D5-CF57-46EF-B807-FDD0502418D4}" type="datetimeFigureOut">
               <a:rPr lang="en-US" smtClean="0"/>
-              <a:t>5/23/2023</a:t>
+              <a:t>5/24/2023</a:t>
             </a:fld>
             <a:endParaRPr lang="en-US" dirty="0"/>
           </a:p>
@@ -4085,7 +4169,7 @@
             </a:extLst>
           </p:cNvPr>
           <p:cNvSpPr>
-            <a:spLocks noGrp="1" noRot="1" noChangeAspect="1" noMove="1" noResize="1" noEditPoints="1" noAdjustHandles="1" noChangeArrowheads="1" noChangeShapeType="1" noTextEdit="1"/>
+            <a:spLocks noChangeAspect="1"/>
           </p:cNvSpPr>
           <p:nvPr>
             <p:extLst>
@@ -4174,24 +4258,42 @@
               </a:path>
             </a:pathLst>
           </a:custGeom>
-          <a:solidFill>
-            <a:schemeClr val="accent2"/>
-          </a:solidFill>
+          <a:gradFill flip="none" rotWithShape="1">
+            <a:gsLst>
+              <a:gs pos="0">
+                <a:schemeClr val="accent2">
+                  <a:lumMod val="67000"/>
+                </a:schemeClr>
+              </a:gs>
+              <a:gs pos="48000">
+                <a:schemeClr val="accent2">
+                  <a:lumMod val="97000"/>
+                  <a:lumOff val="3000"/>
+                </a:schemeClr>
+              </a:gs>
+              <a:gs pos="100000">
+                <a:schemeClr val="accent2">
+                  <a:lumMod val="60000"/>
+                  <a:lumOff val="40000"/>
+                </a:schemeClr>
+              </a:gs>
+            </a:gsLst>
+            <a:lin ang="16200000" scaled="1"/>
+            <a:tileRect/>
+          </a:gradFill>
           <a:ln>
             <a:noFill/>
           </a:ln>
         </p:spPr>
         <p:style>
-          <a:lnRef idx="2">
-            <a:schemeClr val="accent1">
-              <a:shade val="50000"/>
-            </a:schemeClr>
+          <a:lnRef idx="0">
+            <a:scrgbClr r="0" g="0" b="0"/>
           </a:lnRef>
-          <a:fillRef idx="1">
-            <a:schemeClr val="accent1"/>
+          <a:fillRef idx="0">
+            <a:scrgbClr r="0" g="0" b="0"/>
           </a:fillRef>
           <a:effectRef idx="0">
-            <a:schemeClr val="accent1"/>
+            <a:scrgbClr r="0" g="0" b="0"/>
           </a:effectRef>
           <a:fontRef idx="minor">
             <a:schemeClr val="lt1"/>
@@ -4348,6 +4450,130 @@
   <p:clrMapOvr>
     <a:masterClrMapping/>
   </p:clrMapOvr>
+  <p:timing>
+    <p:tnLst>
+      <p:par>
+        <p:cTn id="1" dur="indefinite" restart="never" nodeType="tmRoot">
+          <p:childTnLst>
+            <p:seq concurrent="1" nextAc="seek">
+              <p:cTn id="2" dur="indefinite" nodeType="mainSeq">
+                <p:childTnLst>
+                  <p:par>
+                    <p:cTn id="3" fill="hold">
+                      <p:stCondLst>
+                        <p:cond delay="indefinite"/>
+                      </p:stCondLst>
+                      <p:childTnLst>
+                        <p:par>
+                          <p:cTn id="4" fill="hold">
+                            <p:stCondLst>
+                              <p:cond delay="0"/>
+                            </p:stCondLst>
+                            <p:childTnLst>
+                              <p:par>
+                                <p:cTn id="5" presetID="2" presetClass="entr" presetSubtype="8" fill="hold" grpId="0" nodeType="clickEffect">
+                                  <p:stCondLst>
+                                    <p:cond delay="0"/>
+                                  </p:stCondLst>
+                                  <p:childTnLst>
+                                    <p:set>
+                                      <p:cBhvr>
+                                        <p:cTn id="6" dur="1" fill="hold">
+                                          <p:stCondLst>
+                                            <p:cond delay="0"/>
+                                          </p:stCondLst>
+                                        </p:cTn>
+                                        <p:tgtEl>
+                                          <p:spTgt spid="10"/>
+                                        </p:tgtEl>
+                                        <p:attrNameLst>
+                                          <p:attrName>style.visibility</p:attrName>
+                                        </p:attrNameLst>
+                                      </p:cBhvr>
+                                      <p:to>
+                                        <p:strVal val="visible"/>
+                                      </p:to>
+                                    </p:set>
+                                    <p:anim calcmode="lin" valueType="num">
+                                      <p:cBhvr additive="base">
+                                        <p:cTn id="7" dur="3500" fill="hold"/>
+                                        <p:tgtEl>
+                                          <p:spTgt spid="10"/>
+                                        </p:tgtEl>
+                                        <p:attrNameLst>
+                                          <p:attrName>ppt_x</p:attrName>
+                                        </p:attrNameLst>
+                                      </p:cBhvr>
+                                      <p:tavLst>
+                                        <p:tav tm="0">
+                                          <p:val>
+                                            <p:strVal val="0-#ppt_w/2"/>
+                                          </p:val>
+                                        </p:tav>
+                                        <p:tav tm="100000">
+                                          <p:val>
+                                            <p:strVal val="#ppt_x"/>
+                                          </p:val>
+                                        </p:tav>
+                                      </p:tavLst>
+                                    </p:anim>
+                                    <p:anim calcmode="lin" valueType="num">
+                                      <p:cBhvr additive="base">
+                                        <p:cTn id="8" dur="3500" fill="hold"/>
+                                        <p:tgtEl>
+                                          <p:spTgt spid="10"/>
+                                        </p:tgtEl>
+                                        <p:attrNameLst>
+                                          <p:attrName>ppt_y</p:attrName>
+                                        </p:attrNameLst>
+                                      </p:cBhvr>
+                                      <p:tavLst>
+                                        <p:tav tm="0">
+                                          <p:val>
+                                            <p:strVal val="#ppt_y"/>
+                                          </p:val>
+                                        </p:tav>
+                                        <p:tav tm="100000">
+                                          <p:val>
+                                            <p:strVal val="#ppt_y"/>
+                                          </p:val>
+                                        </p:tav>
+                                      </p:tavLst>
+                                    </p:anim>
+                                  </p:childTnLst>
+                                </p:cTn>
+                              </p:par>
+                            </p:childTnLst>
+                          </p:cTn>
+                        </p:par>
+                      </p:childTnLst>
+                    </p:cTn>
+                  </p:par>
+                </p:childTnLst>
+              </p:cTn>
+              <p:prevCondLst>
+                <p:cond evt="onPrev" delay="0">
+                  <p:tgtEl>
+                    <p:sldTgt/>
+                  </p:tgtEl>
+                </p:cond>
+              </p:prevCondLst>
+              <p:nextCondLst>
+                <p:cond evt="onNext" delay="0">
+                  <p:tgtEl>
+                    <p:sldTgt/>
+                  </p:tgtEl>
+                </p:cond>
+              </p:nextCondLst>
+            </p:seq>
+          </p:childTnLst>
+        </p:cTn>
+      </p:par>
+    </p:tnLst>
+    <p:bldLst>
+      <p:bldP spid="10" grpId="0" animBg="1"/>
+    </p:bldLst>
+  </p:timing>
 </p:sld>
 </file>
 

</xml_diff>

<commit_message>
add ahaslides Word Cloud
</commit_message>
<xml_diff>
--- a/ThatConference2023.pptx
+++ b/ThatConference2023.pptx
@@ -5,15 +5,16 @@
     <p:sldMasterId id="2147483660" r:id="rId1"/>
   </p:sldMasterIdLst>
   <p:notesMasterIdLst>
-    <p:notesMasterId r:id="rId8"/>
+    <p:notesMasterId r:id="rId9"/>
   </p:notesMasterIdLst>
   <p:sldIdLst>
     <p:sldId id="256" r:id="rId2"/>
     <p:sldId id="273" r:id="rId3"/>
     <p:sldId id="272" r:id="rId4"/>
     <p:sldId id="291" r:id="rId5"/>
-    <p:sldId id="266" r:id="rId6"/>
-    <p:sldId id="290" r:id="rId7"/>
+    <p:sldId id="292" r:id="rId6"/>
+    <p:sldId id="266" r:id="rId7"/>
+    <p:sldId id="290" r:id="rId8"/>
   </p:sldIdLst>
   <p:sldSz cx="12192000" cy="6858000"/>
   <p:notesSz cx="6858000" cy="9144000"/>
@@ -121,6 +122,7 @@
             <p14:sldId id="273"/>
             <p14:sldId id="272"/>
             <p14:sldId id="291"/>
+            <p14:sldId id="292"/>
             <p14:sldId id="266"/>
             <p14:sldId id="290"/>
           </p14:sldIdLst>
@@ -239,7 +241,7 @@
           <a:p>
             <a:fld id="{BA065681-88F1-4872-B208-B53BCC8B42F3}" type="datetimeFigureOut">
               <a:rPr lang="en-US" smtClean="0"/>
-              <a:t>5/24/2023</a:t>
+              <a:t>5/30/2023</a:t>
             </a:fld>
             <a:endParaRPr lang="en-US"/>
           </a:p>
@@ -811,6 +813,90 @@
           <a:bodyPr/>
           <a:lstStyle/>
           <a:p>
+            <a:endParaRPr lang="en-US" dirty="0"/>
+          </a:p>
+        </p:txBody>
+      </p:sp>
+      <p:sp>
+        <p:nvSpPr>
+          <p:cNvPr id="4" name="Slide Number Placeholder 3"/>
+          <p:cNvSpPr>
+            <a:spLocks noGrp="1"/>
+          </p:cNvSpPr>
+          <p:nvPr>
+            <p:ph type="sldNum" sz="quarter" idx="5"/>
+          </p:nvPr>
+        </p:nvSpPr>
+        <p:spPr/>
+        <p:txBody>
+          <a:bodyPr/>
+          <a:lstStyle/>
+          <a:p>
+            <a:fld id="{AAA20043-755E-4D2A-B767-23CBDFF65C2F}" type="slidenum">
+              <a:rPr lang="en-US" smtClean="0"/>
+              <a:t>5</a:t>
+            </a:fld>
+            <a:endParaRPr lang="en-US"/>
+          </a:p>
+        </p:txBody>
+      </p:sp>
+    </p:spTree>
+    <p:extLst>
+      <p:ext uri="{BB962C8B-B14F-4D97-AF65-F5344CB8AC3E}">
+        <p14:creationId xmlns:p14="http://schemas.microsoft.com/office/powerpoint/2010/main" val="3653214339"/>
+      </p:ext>
+    </p:extLst>
+  </p:cSld>
+  <p:clrMapOvr>
+    <a:masterClrMapping/>
+  </p:clrMapOvr>
+</p:notes>
+</file>
+
+<file path=ppt/notesSlides/notesSlide5.xml><?xml version="1.0" encoding="utf-8"?>
+<p:notes xmlns:a="http://schemas.openxmlformats.org/drawingml/2006/main" xmlns:r="http://schemas.openxmlformats.org/officeDocument/2006/relationships" xmlns:p="http://schemas.openxmlformats.org/presentationml/2006/main">
+  <p:cSld>
+    <p:spTree>
+      <p:nvGrpSpPr>
+        <p:cNvPr id="1" name=""/>
+        <p:cNvGrpSpPr/>
+        <p:nvPr/>
+      </p:nvGrpSpPr>
+      <p:grpSpPr>
+        <a:xfrm>
+          <a:off x="0" y="0"/>
+          <a:ext cx="0" cy="0"/>
+          <a:chOff x="0" y="0"/>
+          <a:chExt cx="0" cy="0"/>
+        </a:xfrm>
+      </p:grpSpPr>
+      <p:sp>
+        <p:nvSpPr>
+          <p:cNvPr id="2" name="Slide Image Placeholder 1"/>
+          <p:cNvSpPr>
+            <a:spLocks noGrp="1" noRot="1" noChangeAspect="1"/>
+          </p:cNvSpPr>
+          <p:nvPr>
+            <p:ph type="sldImg"/>
+          </p:nvPr>
+        </p:nvSpPr>
+        <p:spPr/>
+      </p:sp>
+      <p:sp>
+        <p:nvSpPr>
+          <p:cNvPr id="3" name="Notes Placeholder 2"/>
+          <p:cNvSpPr>
+            <a:spLocks noGrp="1"/>
+          </p:cNvSpPr>
+          <p:nvPr>
+            <p:ph type="body" idx="1"/>
+          </p:nvPr>
+        </p:nvSpPr>
+        <p:spPr/>
+        <p:txBody>
+          <a:bodyPr/>
+          <a:lstStyle/>
+          <a:p>
             <a:r>
               <a:rPr lang="en-US" dirty="0"/>
               <a:t>END 2:37</a:t>
@@ -835,7 +921,7 @@
           <a:p>
             <a:fld id="{AAA20043-755E-4D2A-B767-23CBDFF65C2F}" type="slidenum">
               <a:rPr lang="en-US" smtClean="0"/>
-              <a:t>5</a:t>
+              <a:t>6</a:t>
             </a:fld>
             <a:endParaRPr lang="en-US"/>
           </a:p>
@@ -985,7 +1071,7 @@
           <a:p>
             <a:fld id="{846CE7D5-CF57-46EF-B807-FDD0502418D4}" type="datetimeFigureOut">
               <a:rPr lang="en-US" smtClean="0"/>
-              <a:t>5/24/2023</a:t>
+              <a:t>5/30/2023</a:t>
             </a:fld>
             <a:endParaRPr lang="en-US" dirty="0"/>
           </a:p>
@@ -1155,7 +1241,7 @@
           <a:p>
             <a:fld id="{846CE7D5-CF57-46EF-B807-FDD0502418D4}" type="datetimeFigureOut">
               <a:rPr lang="en-US" smtClean="0"/>
-              <a:t>5/24/2023</a:t>
+              <a:t>5/30/2023</a:t>
             </a:fld>
             <a:endParaRPr lang="en-US" dirty="0"/>
           </a:p>
@@ -1335,7 +1421,7 @@
           <a:p>
             <a:fld id="{846CE7D5-CF57-46EF-B807-FDD0502418D4}" type="datetimeFigureOut">
               <a:rPr lang="en-US" smtClean="0"/>
-              <a:t>5/24/2023</a:t>
+              <a:t>5/30/2023</a:t>
             </a:fld>
             <a:endParaRPr lang="en-US" dirty="0"/>
           </a:p>
@@ -1505,7 +1591,7 @@
           <a:p>
             <a:fld id="{846CE7D5-CF57-46EF-B807-FDD0502418D4}" type="datetimeFigureOut">
               <a:rPr lang="en-US" smtClean="0"/>
-              <a:t>5/24/2023</a:t>
+              <a:t>5/30/2023</a:t>
             </a:fld>
             <a:endParaRPr lang="en-US" dirty="0"/>
           </a:p>
@@ -1751,7 +1837,7 @@
           <a:p>
             <a:fld id="{846CE7D5-CF57-46EF-B807-FDD0502418D4}" type="datetimeFigureOut">
               <a:rPr lang="en-US" smtClean="0"/>
-              <a:t>5/24/2023</a:t>
+              <a:t>5/30/2023</a:t>
             </a:fld>
             <a:endParaRPr lang="en-US" dirty="0"/>
           </a:p>
@@ -1983,7 +2069,7 @@
           <a:p>
             <a:fld id="{846CE7D5-CF57-46EF-B807-FDD0502418D4}" type="datetimeFigureOut">
               <a:rPr lang="en-US" smtClean="0"/>
-              <a:t>5/24/2023</a:t>
+              <a:t>5/30/2023</a:t>
             </a:fld>
             <a:endParaRPr lang="en-US" dirty="0"/>
           </a:p>
@@ -2350,7 +2436,7 @@
           <a:p>
             <a:fld id="{846CE7D5-CF57-46EF-B807-FDD0502418D4}" type="datetimeFigureOut">
               <a:rPr lang="en-US" smtClean="0"/>
-              <a:t>5/24/2023</a:t>
+              <a:t>5/30/2023</a:t>
             </a:fld>
             <a:endParaRPr lang="en-US" dirty="0"/>
           </a:p>
@@ -2468,7 +2554,7 @@
           <a:p>
             <a:fld id="{846CE7D5-CF57-46EF-B807-FDD0502418D4}" type="datetimeFigureOut">
               <a:rPr lang="en-US" smtClean="0"/>
-              <a:t>5/24/2023</a:t>
+              <a:t>5/30/2023</a:t>
             </a:fld>
             <a:endParaRPr lang="en-US" dirty="0"/>
           </a:p>
@@ -2563,7 +2649,7 @@
           <a:p>
             <a:fld id="{846CE7D5-CF57-46EF-B807-FDD0502418D4}" type="datetimeFigureOut">
               <a:rPr lang="en-US" smtClean="0"/>
-              <a:t>5/24/2023</a:t>
+              <a:t>5/30/2023</a:t>
             </a:fld>
             <a:endParaRPr lang="en-US" dirty="0"/>
           </a:p>
@@ -2840,7 +2926,7 @@
           <a:p>
             <a:fld id="{846CE7D5-CF57-46EF-B807-FDD0502418D4}" type="datetimeFigureOut">
               <a:rPr lang="en-US" smtClean="0"/>
-              <a:t>5/24/2023</a:t>
+              <a:t>5/30/2023</a:t>
             </a:fld>
             <a:endParaRPr lang="en-US" dirty="0"/>
           </a:p>
@@ -3096,7 +3182,7 @@
           <a:p>
             <a:fld id="{846CE7D5-CF57-46EF-B807-FDD0502418D4}" type="datetimeFigureOut">
               <a:rPr lang="en-US" smtClean="0"/>
-              <a:t>5/24/2023</a:t>
+              <a:t>5/30/2023</a:t>
             </a:fld>
             <a:endParaRPr lang="en-US" dirty="0"/>
           </a:p>
@@ -3309,7 +3395,7 @@
           <a:p>
             <a:fld id="{846CE7D5-CF57-46EF-B807-FDD0502418D4}" type="datetimeFigureOut">
               <a:rPr lang="en-US" smtClean="0"/>
-              <a:t>5/24/2023</a:t>
+              <a:t>5/30/2023</a:t>
             </a:fld>
             <a:endParaRPr lang="en-US" dirty="0"/>
           </a:p>
@@ -5892,6 +5978,547 @@
           <p:cNvPr id="8" name="Rectangle 7">
             <a:extLst>
               <a:ext uri="{FF2B5EF4-FFF2-40B4-BE49-F238E27FC236}">
+                <a16:creationId xmlns:a16="http://schemas.microsoft.com/office/drawing/2014/main" id="{907EF6B7-1338-4443-8C46-6A318D952DFD}"/>
+              </a:ext>
+              <a:ext uri="{C183D7F6-B498-43B3-948B-1728B52AA6E4}">
+                <adec:decorative xmlns:adec="http://schemas.microsoft.com/office/drawing/2017/decorative" val="1"/>
+              </a:ext>
+            </a:extLst>
+          </p:cNvPr>
+          <p:cNvSpPr>
+            <a:spLocks noGrp="1" noRot="1" noChangeAspect="1" noMove="1" noResize="1" noEditPoints="1" noAdjustHandles="1" noChangeArrowheads="1" noChangeShapeType="1" noTextEdit="1"/>
+          </p:cNvSpPr>
+          <p:nvPr>
+            <p:extLst>
+              <p:ext uri="{386F3935-93C4-4BCD-93E2-E3B085C9AB24}">
+                <p16:designElem xmlns:p16="http://schemas.microsoft.com/office/powerpoint/2015/main" val="1"/>
+              </p:ext>
+            </p:extLst>
+          </p:nvPr>
+        </p:nvSpPr>
+        <p:spPr>
+          <a:xfrm>
+            <a:off x="3048" y="0"/>
+            <a:ext cx="12188952" cy="6858000"/>
+          </a:xfrm>
+          <a:prstGeom prst="rect">
+            <a:avLst/>
+          </a:prstGeom>
+          <a:ln>
+            <a:noFill/>
+          </a:ln>
+        </p:spPr>
+        <p:style>
+          <a:lnRef idx="2">
+            <a:schemeClr val="accent1">
+              <a:shade val="50000"/>
+            </a:schemeClr>
+          </a:lnRef>
+          <a:fillRef idx="1">
+            <a:schemeClr val="accent1"/>
+          </a:fillRef>
+          <a:effectRef idx="0">
+            <a:schemeClr val="accent1"/>
+          </a:effectRef>
+          <a:fontRef idx="minor">
+            <a:schemeClr val="lt1"/>
+          </a:fontRef>
+        </p:style>
+        <p:txBody>
+          <a:bodyPr rtlCol="0" anchor="ctr"/>
+          <a:lstStyle/>
+          <a:p>
+            <a:pPr algn="ctr"/>
+            <a:endParaRPr lang="en-US" dirty="0"/>
+          </a:p>
+        </p:txBody>
+      </p:sp>
+      <p:sp>
+        <p:nvSpPr>
+          <p:cNvPr id="10" name="Freeform: Shape 9">
+            <a:extLst>
+              <a:ext uri="{FF2B5EF4-FFF2-40B4-BE49-F238E27FC236}">
+                <a16:creationId xmlns:a16="http://schemas.microsoft.com/office/drawing/2014/main" id="{DAAE4CDD-124C-4DCF-9584-B6033B545DD5}"/>
+              </a:ext>
+              <a:ext uri="{C183D7F6-B498-43B3-948B-1728B52AA6E4}">
+                <adec:decorative xmlns:adec="http://schemas.microsoft.com/office/drawing/2017/decorative" val="1"/>
+              </a:ext>
+            </a:extLst>
+          </p:cNvPr>
+          <p:cNvSpPr>
+            <a:spLocks noChangeAspect="1"/>
+          </p:cNvSpPr>
+          <p:nvPr>
+            <p:extLst>
+              <p:ext uri="{386F3935-93C4-4BCD-93E2-E3B085C9AB24}">
+                <p16:designElem xmlns:p16="http://schemas.microsoft.com/office/powerpoint/2015/main" val="1"/>
+              </p:ext>
+            </p:extLst>
+          </p:nvPr>
+        </p:nvSpPr>
+        <p:spPr>
+          <a:xfrm>
+            <a:off x="1" y="0"/>
+            <a:ext cx="4167271" cy="6858000"/>
+          </a:xfrm>
+          <a:custGeom>
+            <a:avLst/>
+            <a:gdLst>
+              <a:gd name="connsiteX0" fmla="*/ 0 w 4167271"/>
+              <a:gd name="connsiteY0" fmla="*/ 0 h 6858000"/>
+              <a:gd name="connsiteX1" fmla="*/ 2259550 w 4167271"/>
+              <a:gd name="connsiteY1" fmla="*/ 0 h 6858000"/>
+              <a:gd name="connsiteX2" fmla="*/ 2387803 w 4167271"/>
+              <a:gd name="connsiteY2" fmla="*/ 82222 h 6858000"/>
+              <a:gd name="connsiteX3" fmla="*/ 4167271 w 4167271"/>
+              <a:gd name="connsiteY3" fmla="*/ 3429000 h 6858000"/>
+              <a:gd name="connsiteX4" fmla="*/ 2387803 w 4167271"/>
+              <a:gd name="connsiteY4" fmla="*/ 6775779 h 6858000"/>
+              <a:gd name="connsiteX5" fmla="*/ 2259550 w 4167271"/>
+              <a:gd name="connsiteY5" fmla="*/ 6858000 h 6858000"/>
+              <a:gd name="connsiteX6" fmla="*/ 0 w 4167271"/>
+              <a:gd name="connsiteY6" fmla="*/ 6858000 h 6858000"/>
+            </a:gdLst>
+            <a:ahLst/>
+            <a:cxnLst>
+              <a:cxn ang="0">
+                <a:pos x="connsiteX0" y="connsiteY0"/>
+              </a:cxn>
+              <a:cxn ang="0">
+                <a:pos x="connsiteX1" y="connsiteY1"/>
+              </a:cxn>
+              <a:cxn ang="0">
+                <a:pos x="connsiteX2" y="connsiteY2"/>
+              </a:cxn>
+              <a:cxn ang="0">
+                <a:pos x="connsiteX3" y="connsiteY3"/>
+              </a:cxn>
+              <a:cxn ang="0">
+                <a:pos x="connsiteX4" y="connsiteY4"/>
+              </a:cxn>
+              <a:cxn ang="0">
+                <a:pos x="connsiteX5" y="connsiteY5"/>
+              </a:cxn>
+              <a:cxn ang="0">
+                <a:pos x="connsiteX6" y="connsiteY6"/>
+              </a:cxn>
+            </a:cxnLst>
+            <a:rect l="l" t="t" r="r" b="b"/>
+            <a:pathLst>
+              <a:path w="4167271" h="6858000">
+                <a:moveTo>
+                  <a:pt x="0" y="0"/>
+                </a:moveTo>
+                <a:lnTo>
+                  <a:pt x="2259550" y="0"/>
+                </a:lnTo>
+                <a:lnTo>
+                  <a:pt x="2387803" y="82222"/>
+                </a:lnTo>
+                <a:cubicBezTo>
+                  <a:pt x="3461407" y="807534"/>
+                  <a:pt x="4167271" y="2035835"/>
+                  <a:pt x="4167271" y="3429000"/>
+                </a:cubicBezTo>
+                <a:cubicBezTo>
+                  <a:pt x="4167271" y="4822165"/>
+                  <a:pt x="3461407" y="6050467"/>
+                  <a:pt x="2387803" y="6775779"/>
+                </a:cubicBezTo>
+                <a:lnTo>
+                  <a:pt x="2259550" y="6858000"/>
+                </a:lnTo>
+                <a:lnTo>
+                  <a:pt x="0" y="6858000"/>
+                </a:lnTo>
+                <a:close/>
+              </a:path>
+            </a:pathLst>
+          </a:custGeom>
+          <a:gradFill flip="none" rotWithShape="1">
+            <a:gsLst>
+              <a:gs pos="0">
+                <a:schemeClr val="accent2">
+                  <a:lumMod val="67000"/>
+                </a:schemeClr>
+              </a:gs>
+              <a:gs pos="48000">
+                <a:schemeClr val="accent2">
+                  <a:lumMod val="97000"/>
+                  <a:lumOff val="3000"/>
+                </a:schemeClr>
+              </a:gs>
+              <a:gs pos="100000">
+                <a:schemeClr val="accent2">
+                  <a:lumMod val="60000"/>
+                  <a:lumOff val="40000"/>
+                </a:schemeClr>
+              </a:gs>
+            </a:gsLst>
+            <a:lin ang="16200000" scaled="1"/>
+            <a:tileRect/>
+          </a:gradFill>
+          <a:ln>
+            <a:noFill/>
+          </a:ln>
+        </p:spPr>
+        <p:style>
+          <a:lnRef idx="0">
+            <a:scrgbClr r="0" g="0" b="0"/>
+          </a:lnRef>
+          <a:fillRef idx="0">
+            <a:scrgbClr r="0" g="0" b="0"/>
+          </a:fillRef>
+          <a:effectRef idx="0">
+            <a:scrgbClr r="0" g="0" b="0"/>
+          </a:effectRef>
+          <a:fontRef idx="minor">
+            <a:schemeClr val="lt1"/>
+          </a:fontRef>
+        </p:style>
+        <p:txBody>
+          <a:bodyPr rtlCol="0" anchor="ctr"/>
+          <a:lstStyle/>
+          <a:p>
+            <a:pPr algn="ctr"/>
+            <a:endParaRPr lang="en-US" dirty="0"/>
+          </a:p>
+        </p:txBody>
+      </p:sp>
+      <p:sp>
+        <p:nvSpPr>
+          <p:cNvPr id="2" name="Title 1">
+            <a:extLst>
+              <a:ext uri="{FF2B5EF4-FFF2-40B4-BE49-F238E27FC236}">
+                <a16:creationId xmlns:a16="http://schemas.microsoft.com/office/drawing/2014/main" id="{604CD088-9924-FDF8-32EA-64AD14C5DE41}"/>
+              </a:ext>
+            </a:extLst>
+          </p:cNvPr>
+          <p:cNvSpPr>
+            <a:spLocks noGrp="1"/>
+          </p:cNvSpPr>
+          <p:nvPr>
+            <p:ph type="title"/>
+          </p:nvPr>
+        </p:nvSpPr>
+        <p:spPr>
+          <a:xfrm>
+            <a:off x="686834" y="1153572"/>
+            <a:ext cx="3200400" cy="4461163"/>
+          </a:xfrm>
+        </p:spPr>
+        <p:txBody>
+          <a:bodyPr>
+            <a:normAutofit/>
+          </a:bodyPr>
+          <a:lstStyle/>
+          <a:p>
+            <a:r>
+              <a:rPr lang="en-US" dirty="0">
+                <a:solidFill>
+                  <a:srgbClr val="FFFFFF"/>
+                </a:solidFill>
+              </a:rPr>
+              <a:t>Sections</a:t>
+            </a:r>
+          </a:p>
+        </p:txBody>
+      </p:sp>
+      <p:sp>
+        <p:nvSpPr>
+          <p:cNvPr id="12" name="Arc 11">
+            <a:extLst>
+              <a:ext uri="{FF2B5EF4-FFF2-40B4-BE49-F238E27FC236}">
+                <a16:creationId xmlns:a16="http://schemas.microsoft.com/office/drawing/2014/main" id="{081E4A58-353D-44AE-B2FC-2A74E2E400F7}"/>
+              </a:ext>
+              <a:ext uri="{C183D7F6-B498-43B3-948B-1728B52AA6E4}">
+                <adec:decorative xmlns:adec="http://schemas.microsoft.com/office/drawing/2017/decorative" val="1"/>
+              </a:ext>
+            </a:extLst>
+          </p:cNvPr>
+          <p:cNvSpPr>
+            <a:spLocks noGrp="1" noRot="1" noChangeAspect="1" noMove="1" noResize="1" noEditPoints="1" noAdjustHandles="1" noChangeArrowheads="1" noChangeShapeType="1" noTextEdit="1"/>
+          </p:cNvSpPr>
+          <p:nvPr>
+            <p:extLst>
+              <p:ext uri="{386F3935-93C4-4BCD-93E2-E3B085C9AB24}">
+                <p16:designElem xmlns:p16="http://schemas.microsoft.com/office/powerpoint/2015/main" val="1"/>
+              </p:ext>
+            </p:extLst>
+          </p:nvPr>
+        </p:nvSpPr>
+        <p:spPr>
+          <a:xfrm flipV="1">
+            <a:off x="7550402" y="2455479"/>
+            <a:ext cx="4083433" cy="4083433"/>
+          </a:xfrm>
+          <a:prstGeom prst="arc">
+            <a:avLst/>
+          </a:prstGeom>
+          <a:ln w="127000" cap="rnd">
+            <a:solidFill>
+              <a:schemeClr val="accent4"/>
+            </a:solidFill>
+            <a:prstDash val="dash"/>
+          </a:ln>
+        </p:spPr>
+        <p:style>
+          <a:lnRef idx="1">
+            <a:schemeClr val="accent1"/>
+          </a:lnRef>
+          <a:fillRef idx="0">
+            <a:schemeClr val="accent1"/>
+          </a:fillRef>
+          <a:effectRef idx="0">
+            <a:schemeClr val="accent1"/>
+          </a:effectRef>
+          <a:fontRef idx="minor">
+            <a:schemeClr val="tx1"/>
+          </a:fontRef>
+        </p:style>
+        <p:txBody>
+          <a:bodyPr rtlCol="0" anchor="ctr"/>
+          <a:lstStyle/>
+          <a:p>
+            <a:pPr algn="ctr"/>
+            <a:endParaRPr lang="en-US" dirty="0"/>
+          </a:p>
+        </p:txBody>
+      </p:sp>
+      <mc:AlternateContent xmlns:mc="http://schemas.openxmlformats.org/markup-compatibility/2006">
+        <mc:Choice xmlns:we="http://schemas.microsoft.com/office/webextensions/webextension/2010/11" xmlns:pca="http://schemas.microsoft.com/office/powerpoint/2013/contentapp" Requires="we pca">
+          <p:graphicFrame>
+            <p:nvGraphicFramePr>
+              <p:cNvPr id="4" name="Content Placeholder 3" title="AhaSlides - Live Polls and Quizzes">
+                <a:extLst>
+                  <a:ext uri="{FF2B5EF4-FFF2-40B4-BE49-F238E27FC236}">
+                    <a16:creationId xmlns:a16="http://schemas.microsoft.com/office/drawing/2014/main" id="{21FD64C3-FF89-4914-90AF-788F2E1CD1E1}"/>
+                  </a:ext>
+                </a:extLst>
+              </p:cNvPr>
+              <p:cNvGraphicFramePr>
+                <a:graphicFrameLocks noGrp="1"/>
+              </p:cNvGraphicFramePr>
+              <p:nvPr>
+                <p:ph idx="1"/>
+                <p:extLst>
+                  <p:ext uri="{D42A27DB-BD31-4B8C-83A1-F6EECF244321}">
+                    <p14:modId xmlns:p14="http://schemas.microsoft.com/office/powerpoint/2010/main" val="1943801319"/>
+                  </p:ext>
+                </p:extLst>
+              </p:nvPr>
+            </p:nvGraphicFramePr>
+            <p:xfrm>
+              <a:off x="1" y="-676275"/>
+              <a:ext cx="12188951" cy="8224557"/>
+            </p:xfrm>
+            <a:graphic>
+              <a:graphicData uri="http://schemas.microsoft.com/office/webextensions/webextension/2010/11">
+                <we:webextensionref xmlns:we="http://schemas.microsoft.com/office/webextensions/webextension/2010/11" xmlns:r="http://schemas.openxmlformats.org/officeDocument/2006/relationships" r:id="rId3"/>
+              </a:graphicData>
+            </a:graphic>
+          </p:graphicFrame>
+        </mc:Choice>
+        <mc:Fallback>
+          <p:pic>
+            <p:nvPicPr>
+              <p:cNvPr id="4" name="Content Placeholder 3" title="AhaSlides - Live Polls and Quizzes">
+                <a:extLst>
+                  <a:ext uri="{FF2B5EF4-FFF2-40B4-BE49-F238E27FC236}">
+                    <a16:creationId xmlns:a16="http://schemas.microsoft.com/office/drawing/2014/main" id="{21FD64C3-FF89-4914-90AF-788F2E1CD1E1}"/>
+                  </a:ext>
+                </a:extLst>
+              </p:cNvPr>
+              <p:cNvPicPr>
+                <a:picLocks noGrp="1" noRot="1" noChangeAspect="1" noMove="1" noResize="1" noEditPoints="1" noAdjustHandles="1" noChangeArrowheads="1" noChangeShapeType="1"/>
+              </p:cNvPicPr>
+              <p:nvPr/>
+            </p:nvPicPr>
+            <p:blipFill>
+              <a:blip r:embed="rId4"/>
+              <a:stretch>
+                <a:fillRect/>
+              </a:stretch>
+            </p:blipFill>
+            <p:spPr>
+              <a:xfrm>
+                <a:off x="1" y="-676275"/>
+                <a:ext cx="12188951" cy="8224557"/>
+              </a:xfrm>
+              <a:prstGeom prst="rect">
+                <a:avLst/>
+              </a:prstGeom>
+            </p:spPr>
+          </p:pic>
+        </mc:Fallback>
+      </mc:AlternateContent>
+    </p:spTree>
+    <p:extLst>
+      <p:ext uri="{BB962C8B-B14F-4D97-AF65-F5344CB8AC3E}">
+        <p14:creationId xmlns:p14="http://schemas.microsoft.com/office/powerpoint/2010/main" val="886969157"/>
+      </p:ext>
+    </p:extLst>
+  </p:cSld>
+  <p:clrMapOvr>
+    <a:masterClrMapping/>
+  </p:clrMapOvr>
+  <p:timing>
+    <p:tnLst>
+      <p:par>
+        <p:cTn id="1" dur="indefinite" restart="never" nodeType="tmRoot">
+          <p:childTnLst>
+            <p:seq concurrent="1" nextAc="seek">
+              <p:cTn id="2" dur="indefinite" nodeType="mainSeq">
+                <p:childTnLst>
+                  <p:par>
+                    <p:cTn id="3" fill="hold">
+                      <p:stCondLst>
+                        <p:cond delay="indefinite"/>
+                      </p:stCondLst>
+                      <p:childTnLst>
+                        <p:par>
+                          <p:cTn id="4" fill="hold">
+                            <p:stCondLst>
+                              <p:cond delay="0"/>
+                            </p:stCondLst>
+                            <p:childTnLst>
+                              <p:par>
+                                <p:cTn id="5" presetID="2" presetClass="entr" presetSubtype="8" fill="hold" grpId="0" nodeType="clickEffect">
+                                  <p:stCondLst>
+                                    <p:cond delay="0"/>
+                                  </p:stCondLst>
+                                  <p:childTnLst>
+                                    <p:set>
+                                      <p:cBhvr>
+                                        <p:cTn id="6" dur="1" fill="hold">
+                                          <p:stCondLst>
+                                            <p:cond delay="0"/>
+                                          </p:stCondLst>
+                                        </p:cTn>
+                                        <p:tgtEl>
+                                          <p:spTgt spid="10"/>
+                                        </p:tgtEl>
+                                        <p:attrNameLst>
+                                          <p:attrName>style.visibility</p:attrName>
+                                        </p:attrNameLst>
+                                      </p:cBhvr>
+                                      <p:to>
+                                        <p:strVal val="visible"/>
+                                      </p:to>
+                                    </p:set>
+                                    <p:anim calcmode="lin" valueType="num">
+                                      <p:cBhvr additive="base">
+                                        <p:cTn id="7" dur="3500" fill="hold"/>
+                                        <p:tgtEl>
+                                          <p:spTgt spid="10"/>
+                                        </p:tgtEl>
+                                        <p:attrNameLst>
+                                          <p:attrName>ppt_x</p:attrName>
+                                        </p:attrNameLst>
+                                      </p:cBhvr>
+                                      <p:tavLst>
+                                        <p:tav tm="0">
+                                          <p:val>
+                                            <p:strVal val="0-#ppt_w/2"/>
+                                          </p:val>
+                                        </p:tav>
+                                        <p:tav tm="100000">
+                                          <p:val>
+                                            <p:strVal val="#ppt_x"/>
+                                          </p:val>
+                                        </p:tav>
+                                      </p:tavLst>
+                                    </p:anim>
+                                    <p:anim calcmode="lin" valueType="num">
+                                      <p:cBhvr additive="base">
+                                        <p:cTn id="8" dur="3500" fill="hold"/>
+                                        <p:tgtEl>
+                                          <p:spTgt spid="10"/>
+                                        </p:tgtEl>
+                                        <p:attrNameLst>
+                                          <p:attrName>ppt_y</p:attrName>
+                                        </p:attrNameLst>
+                                      </p:cBhvr>
+                                      <p:tavLst>
+                                        <p:tav tm="0">
+                                          <p:val>
+                                            <p:strVal val="#ppt_y"/>
+                                          </p:val>
+                                        </p:tav>
+                                        <p:tav tm="100000">
+                                          <p:val>
+                                            <p:strVal val="#ppt_y"/>
+                                          </p:val>
+                                        </p:tav>
+                                      </p:tavLst>
+                                    </p:anim>
+                                  </p:childTnLst>
+                                </p:cTn>
+                              </p:par>
+                            </p:childTnLst>
+                          </p:cTn>
+                        </p:par>
+                      </p:childTnLst>
+                    </p:cTn>
+                  </p:par>
+                </p:childTnLst>
+              </p:cTn>
+              <p:prevCondLst>
+                <p:cond evt="onPrev" delay="0">
+                  <p:tgtEl>
+                    <p:sldTgt/>
+                  </p:tgtEl>
+                </p:cond>
+              </p:prevCondLst>
+              <p:nextCondLst>
+                <p:cond evt="onNext" delay="0">
+                  <p:tgtEl>
+                    <p:sldTgt/>
+                  </p:tgtEl>
+                </p:cond>
+              </p:nextCondLst>
+            </p:seq>
+          </p:childTnLst>
+        </p:cTn>
+      </p:par>
+    </p:tnLst>
+    <p:bldLst>
+      <p:bldP spid="10" grpId="0" animBg="1"/>
+    </p:bldLst>
+  </p:timing>
+</p:sld>
+</file>
+
+<file path=ppt/slides/slide6.xml><?xml version="1.0" encoding="utf-8"?>
+<p:sld xmlns:a="http://schemas.openxmlformats.org/drawingml/2006/main" xmlns:r="http://schemas.openxmlformats.org/officeDocument/2006/relationships" xmlns:p="http://schemas.openxmlformats.org/presentationml/2006/main">
+  <p:cSld>
+    <p:bg>
+      <p:bgPr>
+        <a:solidFill>
+          <a:schemeClr val="bg1"/>
+        </a:solidFill>
+        <a:effectLst/>
+      </p:bgPr>
+    </p:bg>
+    <p:spTree>
+      <p:nvGrpSpPr>
+        <p:cNvPr id="1" name=""/>
+        <p:cNvGrpSpPr/>
+        <p:nvPr/>
+      </p:nvGrpSpPr>
+      <p:grpSpPr>
+        <a:xfrm>
+          <a:off x="0" y="0"/>
+          <a:ext cx="0" cy="0"/>
+          <a:chOff x="0" y="0"/>
+          <a:chExt cx="0" cy="0"/>
+        </a:xfrm>
+      </p:grpSpPr>
+      <p:sp useBgFill="1">
+        <p:nvSpPr>
+          <p:cNvPr id="8" name="Rectangle 7">
+            <a:extLst>
+              <a:ext uri="{FF2B5EF4-FFF2-40B4-BE49-F238E27FC236}">
                 <a16:creationId xmlns:a16="http://schemas.microsoft.com/office/drawing/2014/main" id="{DAF1966E-FD40-4A4A-B61B-C4DF7FA05F06}"/>
               </a:ext>
               <a:ext uri="{C183D7F6-B498-43B3-948B-1728B52AA6E4}">
@@ -6370,7 +6997,7 @@
 </p:sld>
 </file>
 
-<file path=ppt/slides/slide6.xml><?xml version="1.0" encoding="utf-8"?>
+<file path=ppt/slides/slide7.xml><?xml version="1.0" encoding="utf-8"?>
 <p:sld xmlns:a="http://schemas.openxmlformats.org/drawingml/2006/main" xmlns:r="http://schemas.openxmlformats.org/officeDocument/2006/relationships" xmlns:p="http://schemas.openxmlformats.org/presentationml/2006/main">
   <p:cSld>
     <p:bg>
@@ -7367,4 +7994,18 @@
     </a:ext>
   </a:extLst>
 </a:theme>
+</file>
+
+<file path=ppt/webextensions/webextension1.xml><?xml version="1.0" encoding="utf-8"?>
+<we:webextension xmlns:we="http://schemas.microsoft.com/office/webextensions/webextension/2010/11" id="{E6A629F0-986D-4F72-AB22-D1874F787E33}">
+  <we:reference id="wa200004824" version="1.0.0.0" store="en-US" storeType="OMEX"/>
+  <we:alternateReferences>
+    <we:reference id="wa200004824" version="1.0.0.0" store="wa200004824" storeType="OMEX"/>
+  </we:alternateReferences>
+  <we:properties>
+    <we:property name="aha-slide" value="{&quot;slideId&quot;:&quot;92808901&quot;}"/>
+  </we:properties>
+  <we:bindings/>
+  <we:snapshot xmlns:r="http://schemas.openxmlformats.org/officeDocument/2006/relationships" r:embed="rId1"/>
+</we:webextension>
 </file>
</xml_diff>

<commit_message>
notes about presentation for demo
</commit_message>
<xml_diff>
--- a/ThatConference2023.pptx
+++ b/ThatConference2023.pptx
@@ -5,7 +5,7 @@
     <p:sldMasterId id="2147483660" r:id="rId1"/>
   </p:sldMasterIdLst>
   <p:notesMasterIdLst>
-    <p:notesMasterId r:id="rId24"/>
+    <p:notesMasterId r:id="rId25"/>
   </p:notesMasterIdLst>
   <p:sldIdLst>
     <p:sldId id="256" r:id="rId2"/>
@@ -18,18 +18,19 @@
     <p:sldId id="297" r:id="rId9"/>
     <p:sldId id="298" r:id="rId10"/>
     <p:sldId id="296" r:id="rId11"/>
-    <p:sldId id="295" r:id="rId12"/>
-    <p:sldId id="299" r:id="rId13"/>
-    <p:sldId id="301" r:id="rId14"/>
+    <p:sldId id="301" r:id="rId12"/>
+    <p:sldId id="295" r:id="rId13"/>
+    <p:sldId id="299" r:id="rId14"/>
     <p:sldId id="304" r:id="rId15"/>
     <p:sldId id="302" r:id="rId16"/>
     <p:sldId id="306" r:id="rId17"/>
     <p:sldId id="307" r:id="rId18"/>
     <p:sldId id="308" r:id="rId19"/>
     <p:sldId id="305" r:id="rId20"/>
-    <p:sldId id="310" r:id="rId21"/>
-    <p:sldId id="303" r:id="rId22"/>
-    <p:sldId id="300" r:id="rId23"/>
+    <p:sldId id="311" r:id="rId21"/>
+    <p:sldId id="310" r:id="rId22"/>
+    <p:sldId id="303" r:id="rId23"/>
+    <p:sldId id="300" r:id="rId24"/>
   </p:sldIdLst>
   <p:sldSz cx="12192000" cy="6858000"/>
   <p:notesSz cx="6858000" cy="9144000"/>
@@ -143,15 +144,16 @@
             <p14:sldId id="297"/>
             <p14:sldId id="298"/>
             <p14:sldId id="296"/>
+            <p14:sldId id="301"/>
             <p14:sldId id="295"/>
             <p14:sldId id="299"/>
-            <p14:sldId id="301"/>
             <p14:sldId id="304"/>
             <p14:sldId id="302"/>
             <p14:sldId id="306"/>
             <p14:sldId id="307"/>
             <p14:sldId id="308"/>
             <p14:sldId id="305"/>
+            <p14:sldId id="311"/>
             <p14:sldId id="310"/>
             <p14:sldId id="303"/>
             <p14:sldId id="300"/>
@@ -677,53 +679,7 @@
           <a:p>
             <a:r>
               <a:rPr lang="en-US" dirty="0"/>
-              <a:t>TDD many times leads to hyperfocus on the unit of code.  </a:t>
-            </a:r>
-          </a:p>
-          <a:p>
-            <a:pPr marL="0" marR="0" lvl="0" indent="0" algn="l" defTabSz="914400" rtl="0" eaLnBrk="1" fontAlgn="auto" latinLnBrk="0" hangingPunct="1">
-              <a:lnSpc>
-                <a:spcPct val="100000"/>
-              </a:lnSpc>
-              <a:spcBef>
-                <a:spcPts val="0"/>
-              </a:spcBef>
-              <a:spcAft>
-                <a:spcPts val="0"/>
-              </a:spcAft>
-              <a:buClrTx/>
-              <a:buSzTx/>
-              <a:buFontTx/>
-              <a:buNone/>
-              <a:tabLst/>
-              <a:defRPr/>
-            </a:pPr>
-            <a:r>
-              <a:rPr lang="en-US" dirty="0"/>
-              <a:t>TDD -&gt; Great coverage (side effect – not goal)</a:t>
-            </a:r>
-          </a:p>
-          <a:p>
-            <a:pPr marL="0" marR="0" lvl="0" indent="0" algn="l" defTabSz="914400" rtl="0" eaLnBrk="1" fontAlgn="auto" latinLnBrk="0" hangingPunct="1">
-              <a:lnSpc>
-                <a:spcPct val="100000"/>
-              </a:lnSpc>
-              <a:spcBef>
-                <a:spcPts val="0"/>
-              </a:spcBef>
-              <a:spcAft>
-                <a:spcPts val="0"/>
-              </a:spcAft>
-              <a:buClrTx/>
-              <a:buSzTx/>
-              <a:buFontTx/>
-              <a:buNone/>
-              <a:tabLst/>
-              <a:defRPr/>
-            </a:pPr>
-            <a:r>
-              <a:rPr lang="en-US" dirty="0"/>
-              <a:t>	TDD is about drive development from tests (initiating force / driver)</a:t>
+              <a:t>END 2:37</a:t>
             </a:r>
           </a:p>
         </p:txBody>
@@ -754,7 +710,7 @@
     </p:spTree>
     <p:extLst>
       <p:ext uri="{BB962C8B-B14F-4D97-AF65-F5344CB8AC3E}">
-        <p14:creationId xmlns:p14="http://schemas.microsoft.com/office/powerpoint/2010/main" val="3634205570"/>
+        <p14:creationId xmlns:p14="http://schemas.microsoft.com/office/powerpoint/2010/main" val="2326540985"/>
       </p:ext>
     </p:extLst>
   </p:cSld>
@@ -810,19 +766,7 @@
           <a:p>
             <a:r>
               <a:rPr lang="en-US" dirty="0"/>
-              <a:t>BDD sounds like TDD</a:t>
-            </a:r>
-          </a:p>
-          <a:p>
-            <a:r>
-              <a:rPr lang="en-US" dirty="0"/>
               <a:t>TDD many times leads to hyperfocus on the unit of code.  </a:t>
-            </a:r>
-          </a:p>
-          <a:p>
-            <a:r>
-              <a:rPr lang="en-US" dirty="0"/>
-              <a:t>BDD tries to focus on Acceptance tests from an </a:t>
             </a:r>
           </a:p>
           <a:p>
@@ -871,167 +815,6 @@
               <a:t>	TDD is about drive development from tests (initiating force / driver)</a:t>
             </a:r>
           </a:p>
-          <a:p>
-            <a:pPr marL="0" marR="0" lvl="0" indent="0" algn="l" defTabSz="914400" rtl="0" eaLnBrk="1" fontAlgn="auto" latinLnBrk="0" hangingPunct="1">
-              <a:lnSpc>
-                <a:spcPct val="100000"/>
-              </a:lnSpc>
-              <a:spcBef>
-                <a:spcPts val="0"/>
-              </a:spcBef>
-              <a:spcAft>
-                <a:spcPts val="0"/>
-              </a:spcAft>
-              <a:buClrTx/>
-              <a:buSzTx/>
-              <a:buFontTx/>
-              <a:buNone/>
-              <a:tabLst/>
-              <a:defRPr/>
-            </a:pPr>
-            <a:r>
-              <a:rPr lang="en-US" dirty="0"/>
-              <a:t>Obvious change the concept / words that make up how to do proper TDD  (What do you test?)</a:t>
-            </a:r>
-          </a:p>
-          <a:p>
-            <a:pPr marL="0" marR="0" lvl="0" indent="0" algn="l" defTabSz="914400" rtl="0" eaLnBrk="1" fontAlgn="auto" latinLnBrk="0" hangingPunct="1">
-              <a:lnSpc>
-                <a:spcPct val="100000"/>
-              </a:lnSpc>
-              <a:spcBef>
-                <a:spcPts val="0"/>
-              </a:spcBef>
-              <a:spcAft>
-                <a:spcPts val="0"/>
-              </a:spcAft>
-              <a:buClrTx/>
-              <a:buSzTx/>
-              <a:buFontTx/>
-              <a:buNone/>
-              <a:tabLst/>
-              <a:defRPr/>
-            </a:pPr>
-            <a:r>
-              <a:rPr lang="en-US" dirty="0"/>
-              <a:t>	It should be more about design and development than tests</a:t>
-            </a:r>
-          </a:p>
-          <a:p>
-            <a:pPr marL="0" marR="0" lvl="0" indent="0" algn="l" defTabSz="914400" rtl="0" eaLnBrk="1" fontAlgn="auto" latinLnBrk="0" hangingPunct="1">
-              <a:lnSpc>
-                <a:spcPct val="100000"/>
-              </a:lnSpc>
-              <a:spcBef>
-                <a:spcPts val="0"/>
-              </a:spcBef>
-              <a:spcAft>
-                <a:spcPts val="0"/>
-              </a:spcAft>
-              <a:buClrTx/>
-              <a:buSzTx/>
-              <a:buFontTx/>
-              <a:buNone/>
-              <a:tabLst/>
-              <a:defRPr/>
-            </a:pPr>
-            <a:r>
-              <a:rPr lang="en-US" dirty="0"/>
-              <a:t>	We shouldn’t ask how to test the implementation DETAIL of the code.</a:t>
-            </a:r>
-          </a:p>
-          <a:p>
-            <a:pPr marL="0" marR="0" lvl="0" indent="0" algn="l" defTabSz="914400" rtl="0" eaLnBrk="1" fontAlgn="auto" latinLnBrk="0" hangingPunct="1">
-              <a:lnSpc>
-                <a:spcPct val="100000"/>
-              </a:lnSpc>
-              <a:spcBef>
-                <a:spcPts val="0"/>
-              </a:spcBef>
-              <a:spcAft>
-                <a:spcPts val="0"/>
-              </a:spcAft>
-              <a:buClrTx/>
-              <a:buSzTx/>
-              <a:buFontTx/>
-              <a:buNone/>
-              <a:tabLst/>
-              <a:defRPr/>
-            </a:pPr>
-            <a:r>
-              <a:rPr lang="en-US" dirty="0"/>
-              <a:t>BDD changes thought from:</a:t>
-            </a:r>
-          </a:p>
-          <a:p>
-            <a:pPr marL="0" marR="0" lvl="0" indent="0" algn="l" defTabSz="914400" rtl="0" eaLnBrk="1" fontAlgn="auto" latinLnBrk="0" hangingPunct="1">
-              <a:lnSpc>
-                <a:spcPct val="100000"/>
-              </a:lnSpc>
-              <a:spcBef>
-                <a:spcPts val="0"/>
-              </a:spcBef>
-              <a:spcAft>
-                <a:spcPts val="0"/>
-              </a:spcAft>
-              <a:buClrTx/>
-              <a:buSzTx/>
-              <a:buFontTx/>
-              <a:buNone/>
-              <a:tabLst/>
-              <a:defRPr/>
-            </a:pPr>
-            <a:r>
-              <a:rPr lang="en-US" dirty="0"/>
-              <a:t>	Test Cases -&gt; Specifications</a:t>
-            </a:r>
-          </a:p>
-          <a:p>
-            <a:pPr marL="0" marR="0" lvl="0" indent="0" algn="l" defTabSz="914400" rtl="0" eaLnBrk="1" fontAlgn="auto" latinLnBrk="0" hangingPunct="1">
-              <a:lnSpc>
-                <a:spcPct val="100000"/>
-              </a:lnSpc>
-              <a:spcBef>
-                <a:spcPts val="0"/>
-              </a:spcBef>
-              <a:spcAft>
-                <a:spcPts val="0"/>
-              </a:spcAft>
-              <a:buClrTx/>
-              <a:buSzTx/>
-              <a:buFontTx/>
-              <a:buNone/>
-              <a:tabLst/>
-              <a:defRPr/>
-            </a:pPr>
-            <a:r>
-              <a:rPr lang="en-US" dirty="0"/>
-              <a:t>	Tests -&gt; Scenarios</a:t>
-            </a:r>
-          </a:p>
-          <a:p>
-            <a:pPr marL="0" marR="0" lvl="0" indent="0" algn="l" defTabSz="914400" rtl="0" eaLnBrk="1" fontAlgn="auto" latinLnBrk="0" hangingPunct="1">
-              <a:lnSpc>
-                <a:spcPct val="100000"/>
-              </a:lnSpc>
-              <a:spcBef>
-                <a:spcPts val="0"/>
-              </a:spcBef>
-              <a:spcAft>
-                <a:spcPts val="0"/>
-              </a:spcAft>
-              <a:buClrTx/>
-              <a:buSzTx/>
-              <a:buFontTx/>
-              <a:buNone/>
-              <a:tabLst/>
-              <a:defRPr/>
-            </a:pPr>
-            <a:r>
-              <a:rPr lang="en-US" dirty="0"/>
-              <a:t>         Stop thinking how software works, think about what the users want to achieve</a:t>
-            </a:r>
-          </a:p>
         </p:txBody>
       </p:sp>
       <p:sp>
@@ -1060,7 +843,7 @@
     </p:spTree>
     <p:extLst>
       <p:ext uri="{BB962C8B-B14F-4D97-AF65-F5344CB8AC3E}">
-        <p14:creationId xmlns:p14="http://schemas.microsoft.com/office/powerpoint/2010/main" val="352182948"/>
+        <p14:creationId xmlns:p14="http://schemas.microsoft.com/office/powerpoint/2010/main" val="3634205570"/>
       </p:ext>
     </p:extLst>
   </p:cSld>
@@ -1116,7 +899,226 @@
           <a:p>
             <a:r>
               <a:rPr lang="en-US" dirty="0"/>
-              <a:t>END 2:37</a:t>
+              <a:t>BDD sounds like TDD</a:t>
+            </a:r>
+          </a:p>
+          <a:p>
+            <a:r>
+              <a:rPr lang="en-US" dirty="0"/>
+              <a:t>TDD many times leads to hyperfocus on the unit of code.  </a:t>
+            </a:r>
+          </a:p>
+          <a:p>
+            <a:r>
+              <a:rPr lang="en-US" dirty="0"/>
+              <a:t>BDD tries to focus on Acceptance tests from an </a:t>
+            </a:r>
+          </a:p>
+          <a:p>
+            <a:pPr marL="0" marR="0" lvl="0" indent="0" algn="l" defTabSz="914400" rtl="0" eaLnBrk="1" fontAlgn="auto" latinLnBrk="0" hangingPunct="1">
+              <a:lnSpc>
+                <a:spcPct val="100000"/>
+              </a:lnSpc>
+              <a:spcBef>
+                <a:spcPts val="0"/>
+              </a:spcBef>
+              <a:spcAft>
+                <a:spcPts val="0"/>
+              </a:spcAft>
+              <a:buClrTx/>
+              <a:buSzTx/>
+              <a:buFontTx/>
+              <a:buNone/>
+              <a:tabLst/>
+              <a:defRPr/>
+            </a:pPr>
+            <a:r>
+              <a:rPr lang="en-US" dirty="0"/>
+              <a:t>TDD -&gt; Great coverage (side effect – not goal)</a:t>
+            </a:r>
+          </a:p>
+          <a:p>
+            <a:pPr marL="0" marR="0" lvl="0" indent="0" algn="l" defTabSz="914400" rtl="0" eaLnBrk="1" fontAlgn="auto" latinLnBrk="0" hangingPunct="1">
+              <a:lnSpc>
+                <a:spcPct val="100000"/>
+              </a:lnSpc>
+              <a:spcBef>
+                <a:spcPts val="0"/>
+              </a:spcBef>
+              <a:spcAft>
+                <a:spcPts val="0"/>
+              </a:spcAft>
+              <a:buClrTx/>
+              <a:buSzTx/>
+              <a:buFontTx/>
+              <a:buNone/>
+              <a:tabLst/>
+              <a:defRPr/>
+            </a:pPr>
+            <a:r>
+              <a:rPr lang="en-US" dirty="0"/>
+              <a:t>	TDD is about drive development from tests (initiating force / driver)</a:t>
+            </a:r>
+          </a:p>
+          <a:p>
+            <a:pPr marL="0" marR="0" lvl="0" indent="0" algn="l" defTabSz="914400" rtl="0" eaLnBrk="1" fontAlgn="auto" latinLnBrk="0" hangingPunct="1">
+              <a:lnSpc>
+                <a:spcPct val="100000"/>
+              </a:lnSpc>
+              <a:spcBef>
+                <a:spcPts val="0"/>
+              </a:spcBef>
+              <a:spcAft>
+                <a:spcPts val="0"/>
+              </a:spcAft>
+              <a:buClrTx/>
+              <a:buSzTx/>
+              <a:buFontTx/>
+              <a:buNone/>
+              <a:tabLst/>
+              <a:defRPr/>
+            </a:pPr>
+            <a:r>
+              <a:rPr lang="en-US" dirty="0"/>
+              <a:t>Obvious change the concept / words that make up how to do proper TDD  (What do you test?)</a:t>
+            </a:r>
+          </a:p>
+          <a:p>
+            <a:pPr marL="0" marR="0" lvl="0" indent="0" algn="l" defTabSz="914400" rtl="0" eaLnBrk="1" fontAlgn="auto" latinLnBrk="0" hangingPunct="1">
+              <a:lnSpc>
+                <a:spcPct val="100000"/>
+              </a:lnSpc>
+              <a:spcBef>
+                <a:spcPts val="0"/>
+              </a:spcBef>
+              <a:spcAft>
+                <a:spcPts val="0"/>
+              </a:spcAft>
+              <a:buClrTx/>
+              <a:buSzTx/>
+              <a:buFontTx/>
+              <a:buNone/>
+              <a:tabLst/>
+              <a:defRPr/>
+            </a:pPr>
+            <a:r>
+              <a:rPr lang="en-US" dirty="0"/>
+              <a:t>	It should be more about design and development than tests</a:t>
+            </a:r>
+          </a:p>
+          <a:p>
+            <a:pPr marL="0" marR="0" lvl="0" indent="0" algn="l" defTabSz="914400" rtl="0" eaLnBrk="1" fontAlgn="auto" latinLnBrk="0" hangingPunct="1">
+              <a:lnSpc>
+                <a:spcPct val="100000"/>
+              </a:lnSpc>
+              <a:spcBef>
+                <a:spcPts val="0"/>
+              </a:spcBef>
+              <a:spcAft>
+                <a:spcPts val="0"/>
+              </a:spcAft>
+              <a:buClrTx/>
+              <a:buSzTx/>
+              <a:buFontTx/>
+              <a:buNone/>
+              <a:tabLst/>
+              <a:defRPr/>
+            </a:pPr>
+            <a:r>
+              <a:rPr lang="en-US" dirty="0"/>
+              <a:t>	We shouldn’t ask how to test the implementation DETAIL of the code.</a:t>
+            </a:r>
+          </a:p>
+          <a:p>
+            <a:pPr marL="0" marR="0" lvl="0" indent="0" algn="l" defTabSz="914400" rtl="0" eaLnBrk="1" fontAlgn="auto" latinLnBrk="0" hangingPunct="1">
+              <a:lnSpc>
+                <a:spcPct val="100000"/>
+              </a:lnSpc>
+              <a:spcBef>
+                <a:spcPts val="0"/>
+              </a:spcBef>
+              <a:spcAft>
+                <a:spcPts val="0"/>
+              </a:spcAft>
+              <a:buClrTx/>
+              <a:buSzTx/>
+              <a:buFontTx/>
+              <a:buNone/>
+              <a:tabLst/>
+              <a:defRPr/>
+            </a:pPr>
+            <a:r>
+              <a:rPr lang="en-US" dirty="0"/>
+              <a:t>BDD changes thought from:</a:t>
+            </a:r>
+          </a:p>
+          <a:p>
+            <a:pPr marL="0" marR="0" lvl="0" indent="0" algn="l" defTabSz="914400" rtl="0" eaLnBrk="1" fontAlgn="auto" latinLnBrk="0" hangingPunct="1">
+              <a:lnSpc>
+                <a:spcPct val="100000"/>
+              </a:lnSpc>
+              <a:spcBef>
+                <a:spcPts val="0"/>
+              </a:spcBef>
+              <a:spcAft>
+                <a:spcPts val="0"/>
+              </a:spcAft>
+              <a:buClrTx/>
+              <a:buSzTx/>
+              <a:buFontTx/>
+              <a:buNone/>
+              <a:tabLst/>
+              <a:defRPr/>
+            </a:pPr>
+            <a:r>
+              <a:rPr lang="en-US" dirty="0"/>
+              <a:t>	Test Cases -&gt; Specifications</a:t>
+            </a:r>
+          </a:p>
+          <a:p>
+            <a:pPr marL="0" marR="0" lvl="0" indent="0" algn="l" defTabSz="914400" rtl="0" eaLnBrk="1" fontAlgn="auto" latinLnBrk="0" hangingPunct="1">
+              <a:lnSpc>
+                <a:spcPct val="100000"/>
+              </a:lnSpc>
+              <a:spcBef>
+                <a:spcPts val="0"/>
+              </a:spcBef>
+              <a:spcAft>
+                <a:spcPts val="0"/>
+              </a:spcAft>
+              <a:buClrTx/>
+              <a:buSzTx/>
+              <a:buFontTx/>
+              <a:buNone/>
+              <a:tabLst/>
+              <a:defRPr/>
+            </a:pPr>
+            <a:r>
+              <a:rPr lang="en-US" dirty="0"/>
+              <a:t>	Tests -&gt; Scenarios</a:t>
+            </a:r>
+          </a:p>
+          <a:p>
+            <a:pPr marL="0" marR="0" lvl="0" indent="0" algn="l" defTabSz="914400" rtl="0" eaLnBrk="1" fontAlgn="auto" latinLnBrk="0" hangingPunct="1">
+              <a:lnSpc>
+                <a:spcPct val="100000"/>
+              </a:lnSpc>
+              <a:spcBef>
+                <a:spcPts val="0"/>
+              </a:spcBef>
+              <a:spcAft>
+                <a:spcPts val="0"/>
+              </a:spcAft>
+              <a:buClrTx/>
+              <a:buSzTx/>
+              <a:buFontTx/>
+              <a:buNone/>
+              <a:tabLst/>
+              <a:defRPr/>
+            </a:pPr>
+            <a:r>
+              <a:rPr lang="en-US" dirty="0"/>
+              <a:t>         Stop thinking how software works, think about what the users want to achieve</a:t>
             </a:r>
           </a:p>
         </p:txBody>
@@ -1147,7 +1149,7 @@
     </p:spTree>
     <p:extLst>
       <p:ext uri="{BB962C8B-B14F-4D97-AF65-F5344CB8AC3E}">
-        <p14:creationId xmlns:p14="http://schemas.microsoft.com/office/powerpoint/2010/main" val="2326540985"/>
+        <p14:creationId xmlns:p14="http://schemas.microsoft.com/office/powerpoint/2010/main" val="352182948"/>
       </p:ext>
     </p:extLst>
   </p:cSld>
@@ -1237,6 +1239,22 @@
             <a:r>
               <a:rPr lang="en-US" dirty="0" err="1"/>
               <a:t>TimeOffDateRange.feature</a:t>
+            </a:r>
+            <a:endParaRPr lang="en-US" dirty="0"/>
+          </a:p>
+          <a:p>
+            <a:endParaRPr lang="en-US" dirty="0"/>
+          </a:p>
+          <a:p>
+            <a:r>
+              <a:rPr lang="en-US" b="0" i="0" dirty="0">
+                <a:solidFill>
+                  <a:srgbClr val="36394D"/>
+                </a:solidFill>
+                <a:effectLst/>
+                <a:latin typeface="Open Sans" panose="020F0502020204030204" pitchFamily="34" charset="0"/>
+              </a:rPr>
+              <a:t>The purpose of feature files is to create readable specifications that can be understood by the whole team, not to provide test coverage</a:t>
             </a:r>
             <a:endParaRPr lang="en-US" dirty="0"/>
           </a:p>
@@ -1658,10 +1676,7 @@
           <a:bodyPr/>
           <a:lstStyle/>
           <a:p>
-            <a:r>
-              <a:rPr lang="en-US" dirty="0"/>
-              <a:t>END 2:37</a:t>
-            </a:r>
+            <a:endParaRPr lang="en-US" dirty="0"/>
           </a:p>
         </p:txBody>
       </p:sp>
@@ -1682,7 +1697,7 @@
           <a:p>
             <a:fld id="{AAA20043-755E-4D2A-B767-23CBDFF65C2F}" type="slidenum">
               <a:rPr lang="en-US" smtClean="0"/>
-              <a:t>21</a:t>
+              <a:t>19</a:t>
             </a:fld>
             <a:endParaRPr lang="en-US"/>
           </a:p>
@@ -1691,7 +1706,245 @@
     </p:spTree>
     <p:extLst>
       <p:ext uri="{BB962C8B-B14F-4D97-AF65-F5344CB8AC3E}">
-        <p14:creationId xmlns:p14="http://schemas.microsoft.com/office/powerpoint/2010/main" val="1729981770"/>
+        <p14:creationId xmlns:p14="http://schemas.microsoft.com/office/powerpoint/2010/main" val="2982868590"/>
+      </p:ext>
+    </p:extLst>
+  </p:cSld>
+  <p:clrMapOvr>
+    <a:masterClrMapping/>
+  </p:clrMapOvr>
+</p:notes>
+</file>
+
+<file path=ppt/notesSlides/notesSlide19.xml><?xml version="1.0" encoding="utf-8"?>
+<p:notes xmlns:a="http://schemas.openxmlformats.org/drawingml/2006/main" xmlns:r="http://schemas.openxmlformats.org/officeDocument/2006/relationships" xmlns:p="http://schemas.openxmlformats.org/presentationml/2006/main">
+  <p:cSld>
+    <p:spTree>
+      <p:nvGrpSpPr>
+        <p:cNvPr id="1" name=""/>
+        <p:cNvGrpSpPr/>
+        <p:nvPr/>
+      </p:nvGrpSpPr>
+      <p:grpSpPr>
+        <a:xfrm>
+          <a:off x="0" y="0"/>
+          <a:ext cx="0" cy="0"/>
+          <a:chOff x="0" y="0"/>
+          <a:chExt cx="0" cy="0"/>
+        </a:xfrm>
+      </p:grpSpPr>
+      <p:sp>
+        <p:nvSpPr>
+          <p:cNvPr id="2" name="Slide Image Placeholder 1"/>
+          <p:cNvSpPr>
+            <a:spLocks noGrp="1" noRot="1" noChangeAspect="1"/>
+          </p:cNvSpPr>
+          <p:nvPr>
+            <p:ph type="sldImg"/>
+          </p:nvPr>
+        </p:nvSpPr>
+        <p:spPr/>
+      </p:sp>
+      <p:sp>
+        <p:nvSpPr>
+          <p:cNvPr id="3" name="Notes Placeholder 2"/>
+          <p:cNvSpPr>
+            <a:spLocks noGrp="1"/>
+          </p:cNvSpPr>
+          <p:nvPr>
+            <p:ph type="body" idx="1"/>
+          </p:nvPr>
+        </p:nvSpPr>
+        <p:spPr/>
+        <p:txBody>
+          <a:bodyPr/>
+          <a:lstStyle/>
+          <a:p>
+            <a:r>
+              <a:rPr lang="en-US" dirty="0"/>
+              <a:t>Start with creating a new </a:t>
+            </a:r>
+            <a:r>
+              <a:rPr lang="en-US" dirty="0" err="1"/>
+              <a:t>SuperHero.Feature</a:t>
+            </a:r>
+            <a:r>
+              <a:rPr lang="en-US" dirty="0"/>
+              <a:t> and then generate the step definitions</a:t>
+            </a:r>
+          </a:p>
+          <a:p>
+            <a:r>
+              <a:rPr lang="en-US" dirty="0"/>
+              <a:t>Show </a:t>
+            </a:r>
+            <a:r>
+              <a:rPr lang="en-US" dirty="0" err="1"/>
+              <a:t>TimeOffValidator</a:t>
+            </a:r>
+            <a:r>
+              <a:rPr lang="en-US" dirty="0"/>
+              <a:t> to show</a:t>
+            </a:r>
+          </a:p>
+          <a:p>
+            <a:r>
+              <a:rPr lang="en-US" dirty="0"/>
+              <a:t>	- Same Given used on multiple scenarios</a:t>
+            </a:r>
+          </a:p>
+          <a:p>
+            <a:r>
+              <a:rPr lang="en-US" dirty="0"/>
+              <a:t>	- Introduce parameters on the error strings</a:t>
+            </a:r>
+          </a:p>
+          <a:p>
+            <a:r>
+              <a:rPr lang="en-US" dirty="0"/>
+              <a:t>		-Show Attribute using Regular Expressions</a:t>
+            </a:r>
+          </a:p>
+          <a:p>
+            <a:r>
+              <a:rPr lang="en-US" dirty="0"/>
+              <a:t>Show </a:t>
+            </a:r>
+            <a:r>
+              <a:rPr lang="en-US" dirty="0" err="1"/>
+              <a:t>UserYearInfo</a:t>
+            </a:r>
+            <a:r>
+              <a:rPr lang="en-US" dirty="0"/>
+              <a:t> to show</a:t>
+            </a:r>
+          </a:p>
+          <a:p>
+            <a:r>
+              <a:rPr lang="en-US" dirty="0"/>
+              <a:t>	- numeric parameters</a:t>
+            </a:r>
+          </a:p>
+          <a:p>
+            <a:r>
+              <a:rPr lang="en-US" dirty="0"/>
+              <a:t>Show </a:t>
+            </a:r>
+            <a:r>
+              <a:rPr lang="en-US" dirty="0" err="1"/>
+              <a:t>TimeOffDateRange</a:t>
+            </a:r>
+            <a:r>
+              <a:rPr lang="en-US" dirty="0"/>
+              <a:t> to show</a:t>
+            </a:r>
+          </a:p>
+          <a:p>
+            <a:r>
+              <a:rPr lang="en-US" dirty="0"/>
+              <a:t>	- Tables</a:t>
+            </a:r>
+          </a:p>
+          <a:p>
+            <a:r>
+              <a:rPr lang="en-US" dirty="0"/>
+              <a:t>	- And</a:t>
+            </a:r>
+          </a:p>
+          <a:p>
+            <a:r>
+              <a:rPr lang="en-US" dirty="0"/>
+              <a:t>Show </a:t>
+            </a:r>
+            <a:r>
+              <a:rPr lang="en-US" dirty="0" err="1"/>
+              <a:t>CalendarViewModel</a:t>
+            </a:r>
+            <a:r>
+              <a:rPr lang="en-US" dirty="0"/>
+              <a:t> to show</a:t>
+            </a:r>
+          </a:p>
+          <a:p>
+            <a:r>
+              <a:rPr lang="en-US" dirty="0"/>
+              <a:t>	- *</a:t>
+            </a:r>
+          </a:p>
+          <a:p>
+            <a:r>
+              <a:rPr lang="en-US" dirty="0"/>
+              <a:t>Mention the </a:t>
+            </a:r>
+            <a:r>
+              <a:rPr lang="en-US" dirty="0" err="1"/>
+              <a:t>Specflow.Assist</a:t>
+            </a:r>
+            <a:r>
+              <a:rPr lang="en-US" dirty="0"/>
+              <a:t> helper </a:t>
+            </a:r>
+            <a:r>
+              <a:rPr lang="en-US" dirty="0" err="1"/>
+              <a:t>Nuget</a:t>
+            </a:r>
+            <a:endParaRPr lang="en-US" dirty="0"/>
+          </a:p>
+          <a:p>
+            <a:endParaRPr lang="en-US" dirty="0"/>
+          </a:p>
+          <a:p>
+            <a:r>
+              <a:rPr lang="en-US" dirty="0"/>
+              <a:t>Show persistence methods in </a:t>
+            </a:r>
+            <a:r>
+              <a:rPr lang="en-US"/>
+              <a:t>the class</a:t>
+            </a:r>
+            <a:endParaRPr lang="en-US" dirty="0"/>
+          </a:p>
+          <a:p>
+            <a:endParaRPr lang="en-US" dirty="0"/>
+          </a:p>
+          <a:p>
+            <a:r>
+              <a:rPr lang="en-US" dirty="0"/>
+              <a:t>Living Documentation</a:t>
+            </a:r>
+          </a:p>
+          <a:p>
+            <a:endParaRPr lang="en-US" dirty="0"/>
+          </a:p>
+        </p:txBody>
+      </p:sp>
+      <p:sp>
+        <p:nvSpPr>
+          <p:cNvPr id="4" name="Slide Number Placeholder 3"/>
+          <p:cNvSpPr>
+            <a:spLocks noGrp="1"/>
+          </p:cNvSpPr>
+          <p:nvPr>
+            <p:ph type="sldNum" sz="quarter" idx="5"/>
+          </p:nvPr>
+        </p:nvSpPr>
+        <p:spPr/>
+        <p:txBody>
+          <a:bodyPr/>
+          <a:lstStyle/>
+          <a:p>
+            <a:fld id="{AAA20043-755E-4D2A-B767-23CBDFF65C2F}" type="slidenum">
+              <a:rPr lang="en-US" smtClean="0"/>
+              <a:t>20</a:t>
+            </a:fld>
+            <a:endParaRPr lang="en-US"/>
+          </a:p>
+        </p:txBody>
+      </p:sp>
+    </p:spTree>
+    <p:extLst>
+      <p:ext uri="{BB962C8B-B14F-4D97-AF65-F5344CB8AC3E}">
+        <p14:creationId xmlns:p14="http://schemas.microsoft.com/office/powerpoint/2010/main" val="3661640459"/>
       </p:ext>
     </p:extLst>
   </p:cSld>
@@ -1776,6 +2029,177 @@
     <p:extLst>
       <p:ext uri="{BB962C8B-B14F-4D97-AF65-F5344CB8AC3E}">
         <p14:creationId xmlns:p14="http://schemas.microsoft.com/office/powerpoint/2010/main" val="670499103"/>
+      </p:ext>
+    </p:extLst>
+  </p:cSld>
+  <p:clrMapOvr>
+    <a:masterClrMapping/>
+  </p:clrMapOvr>
+</p:notes>
+</file>
+
+<file path=ppt/notesSlides/notesSlide20.xml><?xml version="1.0" encoding="utf-8"?>
+<p:notes xmlns:a="http://schemas.openxmlformats.org/drawingml/2006/main" xmlns:r="http://schemas.openxmlformats.org/officeDocument/2006/relationships" xmlns:p="http://schemas.openxmlformats.org/presentationml/2006/main">
+  <p:cSld>
+    <p:spTree>
+      <p:nvGrpSpPr>
+        <p:cNvPr id="1" name=""/>
+        <p:cNvGrpSpPr/>
+        <p:nvPr/>
+      </p:nvGrpSpPr>
+      <p:grpSpPr>
+        <a:xfrm>
+          <a:off x="0" y="0"/>
+          <a:ext cx="0" cy="0"/>
+          <a:chOff x="0" y="0"/>
+          <a:chExt cx="0" cy="0"/>
+        </a:xfrm>
+      </p:grpSpPr>
+      <p:sp>
+        <p:nvSpPr>
+          <p:cNvPr id="2" name="Slide Image Placeholder 1"/>
+          <p:cNvSpPr>
+            <a:spLocks noGrp="1" noRot="1" noChangeAspect="1"/>
+          </p:cNvSpPr>
+          <p:nvPr>
+            <p:ph type="sldImg"/>
+          </p:nvPr>
+        </p:nvSpPr>
+        <p:spPr/>
+      </p:sp>
+      <p:sp>
+        <p:nvSpPr>
+          <p:cNvPr id="3" name="Notes Placeholder 2"/>
+          <p:cNvSpPr>
+            <a:spLocks noGrp="1"/>
+          </p:cNvSpPr>
+          <p:nvPr>
+            <p:ph type="body" idx="1"/>
+          </p:nvPr>
+        </p:nvSpPr>
+        <p:spPr/>
+        <p:txBody>
+          <a:bodyPr/>
+          <a:lstStyle/>
+          <a:p>
+            <a:endParaRPr lang="en-US" dirty="0"/>
+          </a:p>
+        </p:txBody>
+      </p:sp>
+      <p:sp>
+        <p:nvSpPr>
+          <p:cNvPr id="4" name="Slide Number Placeholder 3"/>
+          <p:cNvSpPr>
+            <a:spLocks noGrp="1"/>
+          </p:cNvSpPr>
+          <p:nvPr>
+            <p:ph type="sldNum" sz="quarter" idx="5"/>
+          </p:nvPr>
+        </p:nvSpPr>
+        <p:spPr/>
+        <p:txBody>
+          <a:bodyPr/>
+          <a:lstStyle/>
+          <a:p>
+            <a:fld id="{AAA20043-755E-4D2A-B767-23CBDFF65C2F}" type="slidenum">
+              <a:rPr lang="en-US" smtClean="0"/>
+              <a:t>21</a:t>
+            </a:fld>
+            <a:endParaRPr lang="en-US"/>
+          </a:p>
+        </p:txBody>
+      </p:sp>
+    </p:spTree>
+    <p:extLst>
+      <p:ext uri="{BB962C8B-B14F-4D97-AF65-F5344CB8AC3E}">
+        <p14:creationId xmlns:p14="http://schemas.microsoft.com/office/powerpoint/2010/main" val="2977206080"/>
+      </p:ext>
+    </p:extLst>
+  </p:cSld>
+  <p:clrMapOvr>
+    <a:masterClrMapping/>
+  </p:clrMapOvr>
+</p:notes>
+</file>
+
+<file path=ppt/notesSlides/notesSlide21.xml><?xml version="1.0" encoding="utf-8"?>
+<p:notes xmlns:a="http://schemas.openxmlformats.org/drawingml/2006/main" xmlns:r="http://schemas.openxmlformats.org/officeDocument/2006/relationships" xmlns:p="http://schemas.openxmlformats.org/presentationml/2006/main">
+  <p:cSld>
+    <p:spTree>
+      <p:nvGrpSpPr>
+        <p:cNvPr id="1" name=""/>
+        <p:cNvGrpSpPr/>
+        <p:nvPr/>
+      </p:nvGrpSpPr>
+      <p:grpSpPr>
+        <a:xfrm>
+          <a:off x="0" y="0"/>
+          <a:ext cx="0" cy="0"/>
+          <a:chOff x="0" y="0"/>
+          <a:chExt cx="0" cy="0"/>
+        </a:xfrm>
+      </p:grpSpPr>
+      <p:sp>
+        <p:nvSpPr>
+          <p:cNvPr id="2" name="Slide Image Placeholder 1"/>
+          <p:cNvSpPr>
+            <a:spLocks noGrp="1" noRot="1" noChangeAspect="1"/>
+          </p:cNvSpPr>
+          <p:nvPr>
+            <p:ph type="sldImg"/>
+          </p:nvPr>
+        </p:nvSpPr>
+        <p:spPr/>
+      </p:sp>
+      <p:sp>
+        <p:nvSpPr>
+          <p:cNvPr id="3" name="Notes Placeholder 2"/>
+          <p:cNvSpPr>
+            <a:spLocks noGrp="1"/>
+          </p:cNvSpPr>
+          <p:nvPr>
+            <p:ph type="body" idx="1"/>
+          </p:nvPr>
+        </p:nvSpPr>
+        <p:spPr/>
+        <p:txBody>
+          <a:bodyPr/>
+          <a:lstStyle/>
+          <a:p>
+            <a:r>
+              <a:rPr lang="en-US" dirty="0"/>
+              <a:t>END 2:37</a:t>
+            </a:r>
+          </a:p>
+        </p:txBody>
+      </p:sp>
+      <p:sp>
+        <p:nvSpPr>
+          <p:cNvPr id="4" name="Slide Number Placeholder 3"/>
+          <p:cNvSpPr>
+            <a:spLocks noGrp="1"/>
+          </p:cNvSpPr>
+          <p:nvPr>
+            <p:ph type="sldNum" sz="quarter" idx="5"/>
+          </p:nvPr>
+        </p:nvSpPr>
+        <p:spPr/>
+        <p:txBody>
+          <a:bodyPr/>
+          <a:lstStyle/>
+          <a:p>
+            <a:fld id="{AAA20043-755E-4D2A-B767-23CBDFF65C2F}" type="slidenum">
+              <a:rPr lang="en-US" smtClean="0"/>
+              <a:t>22</a:t>
+            </a:fld>
+            <a:endParaRPr lang="en-US"/>
+          </a:p>
+        </p:txBody>
+      </p:sp>
+    </p:spTree>
+    <p:extLst>
+      <p:ext uri="{BB962C8B-B14F-4D97-AF65-F5344CB8AC3E}">
+        <p14:creationId xmlns:p14="http://schemas.microsoft.com/office/powerpoint/2010/main" val="1729981770"/>
       </p:ext>
     </p:extLst>
   </p:cSld>
@@ -7011,6 +7435,547 @@
           <p:cNvPr id="8" name="Rectangle 7">
             <a:extLst>
               <a:ext uri="{FF2B5EF4-FFF2-40B4-BE49-F238E27FC236}">
+                <a16:creationId xmlns:a16="http://schemas.microsoft.com/office/drawing/2014/main" id="{DAF1966E-FD40-4A4A-B61B-C4DF7FA05F06}"/>
+              </a:ext>
+              <a:ext uri="{C183D7F6-B498-43B3-948B-1728B52AA6E4}">
+                <adec:decorative xmlns:adec="http://schemas.microsoft.com/office/drawing/2017/decorative" val="1"/>
+              </a:ext>
+            </a:extLst>
+          </p:cNvPr>
+          <p:cNvSpPr>
+            <a:spLocks noGrp="1" noRot="1" noChangeAspect="1" noMove="1" noResize="1" noEditPoints="1" noAdjustHandles="1" noChangeArrowheads="1" noChangeShapeType="1" noTextEdit="1"/>
+          </p:cNvSpPr>
+          <p:nvPr>
+            <p:extLst>
+              <p:ext uri="{386F3935-93C4-4BCD-93E2-E3B085C9AB24}">
+                <p16:designElem xmlns:p16="http://schemas.microsoft.com/office/powerpoint/2015/main" val="1"/>
+              </p:ext>
+            </p:extLst>
+          </p:nvPr>
+        </p:nvSpPr>
+        <p:spPr>
+          <a:xfrm>
+            <a:off x="0" y="0"/>
+            <a:ext cx="12192000" cy="6858000"/>
+          </a:xfrm>
+          <a:prstGeom prst="rect">
+            <a:avLst/>
+          </a:prstGeom>
+          <a:ln>
+            <a:noFill/>
+          </a:ln>
+        </p:spPr>
+        <p:style>
+          <a:lnRef idx="2">
+            <a:schemeClr val="accent1">
+              <a:shade val="50000"/>
+            </a:schemeClr>
+          </a:lnRef>
+          <a:fillRef idx="1">
+            <a:schemeClr val="accent1"/>
+          </a:fillRef>
+          <a:effectRef idx="0">
+            <a:schemeClr val="accent1"/>
+          </a:effectRef>
+          <a:fontRef idx="minor">
+            <a:schemeClr val="lt1"/>
+          </a:fontRef>
+        </p:style>
+        <p:txBody>
+          <a:bodyPr rtlCol="0" anchor="ctr"/>
+          <a:lstStyle/>
+          <a:p>
+            <a:pPr algn="ctr"/>
+            <a:endParaRPr lang="en-US" dirty="0"/>
+          </a:p>
+        </p:txBody>
+      </p:sp>
+      <p:sp useBgFill="1">
+        <p:nvSpPr>
+          <p:cNvPr id="10" name="Rectangle 9">
+            <a:extLst>
+              <a:ext uri="{FF2B5EF4-FFF2-40B4-BE49-F238E27FC236}">
+                <a16:creationId xmlns:a16="http://schemas.microsoft.com/office/drawing/2014/main" id="{047BFA19-D45E-416B-A404-7AF2F3F27017}"/>
+              </a:ext>
+              <a:ext uri="{C183D7F6-B498-43B3-948B-1728B52AA6E4}">
+                <adec:decorative xmlns:adec="http://schemas.microsoft.com/office/drawing/2017/decorative" val="1"/>
+              </a:ext>
+            </a:extLst>
+          </p:cNvPr>
+          <p:cNvSpPr>
+            <a:spLocks noGrp="1" noRot="1" noChangeAspect="1" noMove="1" noResize="1" noEditPoints="1" noAdjustHandles="1" noChangeArrowheads="1" noChangeShapeType="1" noTextEdit="1"/>
+          </p:cNvSpPr>
+          <p:nvPr>
+            <p:extLst>
+              <p:ext uri="{386F3935-93C4-4BCD-93E2-E3B085C9AB24}">
+                <p16:designElem xmlns:p16="http://schemas.microsoft.com/office/powerpoint/2015/main" val="1"/>
+              </p:ext>
+            </p:extLst>
+          </p:nvPr>
+        </p:nvSpPr>
+        <p:spPr>
+          <a:xfrm>
+            <a:off x="558209" y="0"/>
+            <a:ext cx="11167447" cy="2018806"/>
+          </a:xfrm>
+          <a:prstGeom prst="rect">
+            <a:avLst/>
+          </a:prstGeom>
+          <a:ln w="9525">
+            <a:solidFill>
+              <a:srgbClr val="E1E1E1"/>
+            </a:solidFill>
+          </a:ln>
+          <a:effectLst>
+            <a:outerShdw blurRad="50800" dist="38100" dir="2700000" algn="tl" rotWithShape="0">
+              <a:schemeClr val="bg1">
+                <a:lumMod val="85000"/>
+                <a:alpha val="50000"/>
+              </a:schemeClr>
+            </a:outerShdw>
+          </a:effectLst>
+        </p:spPr>
+        <p:style>
+          <a:lnRef idx="2">
+            <a:schemeClr val="accent1">
+              <a:shade val="50000"/>
+            </a:schemeClr>
+          </a:lnRef>
+          <a:fillRef idx="1">
+            <a:schemeClr val="accent1"/>
+          </a:fillRef>
+          <a:effectRef idx="0">
+            <a:schemeClr val="accent1"/>
+          </a:effectRef>
+          <a:fontRef idx="minor">
+            <a:schemeClr val="lt1"/>
+          </a:fontRef>
+        </p:style>
+        <p:txBody>
+          <a:bodyPr rtlCol="0" anchor="ctr"/>
+          <a:lstStyle/>
+          <a:p>
+            <a:pPr marL="0" marR="0" lvl="0" indent="0" algn="ctr" defTabSz="914400" rtl="0" eaLnBrk="1" fontAlgn="auto" latinLnBrk="0" hangingPunct="1">
+              <a:lnSpc>
+                <a:spcPct val="100000"/>
+              </a:lnSpc>
+              <a:spcBef>
+                <a:spcPts val="0"/>
+              </a:spcBef>
+              <a:spcAft>
+                <a:spcPts val="0"/>
+              </a:spcAft>
+              <a:buClrTx/>
+              <a:buSzTx/>
+              <a:buFontTx/>
+              <a:buNone/>
+              <a:tabLst/>
+              <a:defRPr/>
+            </a:pPr>
+            <a:endParaRPr kumimoji="0" lang="en-US" sz="1800" b="0" i="0" u="none" strike="noStrike" kern="1200" cap="none" spc="0" normalizeH="0" baseline="0" noProof="0" dirty="0">
+              <a:ln>
+                <a:noFill/>
+              </a:ln>
+              <a:solidFill>
+                <a:prstClr val="white"/>
+              </a:solidFill>
+              <a:effectLst/>
+              <a:uLnTx/>
+              <a:uFillTx/>
+              <a:latin typeface="Calibri" panose="020F0502020204030204"/>
+              <a:ea typeface="+mn-ea"/>
+              <a:cs typeface="+mn-cs"/>
+            </a:endParaRPr>
+          </a:p>
+        </p:txBody>
+      </p:sp>
+      <p:sp useBgFill="1">
+        <p:nvSpPr>
+          <p:cNvPr id="12" name="Rectangle 11">
+            <a:extLst>
+              <a:ext uri="{FF2B5EF4-FFF2-40B4-BE49-F238E27FC236}">
+                <a16:creationId xmlns:a16="http://schemas.microsoft.com/office/drawing/2014/main" id="{8E0105E7-23DB-4CF2-8258-FF47C7620F6E}"/>
+              </a:ext>
+              <a:ext uri="{C183D7F6-B498-43B3-948B-1728B52AA6E4}">
+                <adec:decorative xmlns:adec="http://schemas.microsoft.com/office/drawing/2017/decorative" val="1"/>
+              </a:ext>
+            </a:extLst>
+          </p:cNvPr>
+          <p:cNvSpPr>
+            <a:spLocks noGrp="1" noRot="1" noChangeAspect="1" noMove="1" noResize="1" noEditPoints="1" noAdjustHandles="1" noChangeArrowheads="1" noChangeShapeType="1" noTextEdit="1"/>
+          </p:cNvSpPr>
+          <p:nvPr>
+            <p:extLst>
+              <p:ext uri="{386F3935-93C4-4BCD-93E2-E3B085C9AB24}">
+                <p16:designElem xmlns:p16="http://schemas.microsoft.com/office/powerpoint/2015/main" val="1"/>
+              </p:ext>
+            </p:extLst>
+          </p:nvPr>
+        </p:nvSpPr>
+        <p:spPr>
+          <a:xfrm>
+            <a:off x="566928" y="0"/>
+            <a:ext cx="11155680" cy="2011680"/>
+          </a:xfrm>
+          <a:prstGeom prst="rect">
+            <a:avLst/>
+          </a:prstGeom>
+          <a:ln w="9525">
+            <a:noFill/>
+          </a:ln>
+          <a:effectLst/>
+        </p:spPr>
+        <p:style>
+          <a:lnRef idx="2">
+            <a:schemeClr val="accent1">
+              <a:shade val="50000"/>
+            </a:schemeClr>
+          </a:lnRef>
+          <a:fillRef idx="1">
+            <a:schemeClr val="accent1"/>
+          </a:fillRef>
+          <a:effectRef idx="0">
+            <a:schemeClr val="accent1"/>
+          </a:effectRef>
+          <a:fontRef idx="minor">
+            <a:schemeClr val="lt1"/>
+          </a:fontRef>
+        </p:style>
+        <p:txBody>
+          <a:bodyPr rtlCol="0" anchor="ctr"/>
+          <a:lstStyle/>
+          <a:p>
+            <a:pPr marL="0" marR="0" lvl="0" indent="0" algn="ctr" defTabSz="914400" rtl="0" eaLnBrk="1" fontAlgn="auto" latinLnBrk="0" hangingPunct="1">
+              <a:lnSpc>
+                <a:spcPct val="100000"/>
+              </a:lnSpc>
+              <a:spcBef>
+                <a:spcPts val="0"/>
+              </a:spcBef>
+              <a:spcAft>
+                <a:spcPts val="0"/>
+              </a:spcAft>
+              <a:buClrTx/>
+              <a:buSzTx/>
+              <a:buFontTx/>
+              <a:buNone/>
+              <a:tabLst/>
+              <a:defRPr/>
+            </a:pPr>
+            <a:endParaRPr kumimoji="0" lang="en-US" sz="1800" b="0" i="0" u="none" strike="noStrike" kern="1200" cap="none" spc="0" normalizeH="0" baseline="0" noProof="0" dirty="0">
+              <a:ln>
+                <a:noFill/>
+              </a:ln>
+              <a:solidFill>
+                <a:prstClr val="white"/>
+              </a:solidFill>
+              <a:effectLst/>
+              <a:uLnTx/>
+              <a:uFillTx/>
+              <a:latin typeface="Calibri" panose="020F0502020204030204"/>
+              <a:ea typeface="+mn-ea"/>
+              <a:cs typeface="+mn-cs"/>
+            </a:endParaRPr>
+          </a:p>
+        </p:txBody>
+      </p:sp>
+      <p:sp>
+        <p:nvSpPr>
+          <p:cNvPr id="2" name="Title 1">
+            <a:extLst>
+              <a:ext uri="{FF2B5EF4-FFF2-40B4-BE49-F238E27FC236}">
+                <a16:creationId xmlns:a16="http://schemas.microsoft.com/office/drawing/2014/main" id="{82CF4B60-062A-25CD-E448-6C8255EEF9CC}"/>
+              </a:ext>
+            </a:extLst>
+          </p:cNvPr>
+          <p:cNvSpPr>
+            <a:spLocks noGrp="1"/>
+          </p:cNvSpPr>
+          <p:nvPr>
+            <p:ph type="title"/>
+          </p:nvPr>
+        </p:nvSpPr>
+        <p:spPr>
+          <a:xfrm>
+            <a:off x="1115568" y="548640"/>
+            <a:ext cx="10168128" cy="1252266"/>
+          </a:xfrm>
+        </p:spPr>
+        <p:txBody>
+          <a:bodyPr>
+            <a:normAutofit/>
+          </a:bodyPr>
+          <a:lstStyle/>
+          <a:p>
+            <a:r>
+              <a:rPr lang="en-US" sz="4000" dirty="0"/>
+              <a:t>Office Space</a:t>
+            </a:r>
+          </a:p>
+        </p:txBody>
+      </p:sp>
+      <p:sp>
+        <p:nvSpPr>
+          <p:cNvPr id="14" name="Rectangle 13">
+            <a:extLst>
+              <a:ext uri="{FF2B5EF4-FFF2-40B4-BE49-F238E27FC236}">
+                <a16:creationId xmlns:a16="http://schemas.microsoft.com/office/drawing/2014/main" id="{074B4F7D-14B2-478B-8BF5-01E4E0C5D263}"/>
+              </a:ext>
+              <a:ext uri="{C183D7F6-B498-43B3-948B-1728B52AA6E4}">
+                <adec:decorative xmlns:adec="http://schemas.microsoft.com/office/drawing/2017/decorative" val="1"/>
+              </a:ext>
+            </a:extLst>
+          </p:cNvPr>
+          <p:cNvSpPr>
+            <a:spLocks noGrp="1" noRot="1" noChangeAspect="1" noMove="1" noResize="1" noEditPoints="1" noAdjustHandles="1" noChangeArrowheads="1" noChangeShapeType="1" noTextEdit="1"/>
+          </p:cNvSpPr>
+          <p:nvPr>
+            <p:extLst>
+              <p:ext uri="{386F3935-93C4-4BCD-93E2-E3B085C9AB24}">
+                <p16:designElem xmlns:p16="http://schemas.microsoft.com/office/powerpoint/2015/main" val="1"/>
+              </p:ext>
+            </p:extLst>
+          </p:nvPr>
+        </p:nvSpPr>
+        <p:spPr>
+          <a:xfrm>
+            <a:off x="498834" y="758952"/>
+            <a:ext cx="128016" cy="704088"/>
+          </a:xfrm>
+          <a:prstGeom prst="rect">
+            <a:avLst/>
+          </a:prstGeom>
+          <a:solidFill>
+            <a:schemeClr val="accent2"/>
+          </a:solidFill>
+          <a:ln>
+            <a:noFill/>
+          </a:ln>
+        </p:spPr>
+        <p:style>
+          <a:lnRef idx="2">
+            <a:schemeClr val="accent1">
+              <a:shade val="50000"/>
+            </a:schemeClr>
+          </a:lnRef>
+          <a:fillRef idx="1">
+            <a:schemeClr val="accent1"/>
+          </a:fillRef>
+          <a:effectRef idx="0">
+            <a:schemeClr val="accent1"/>
+          </a:effectRef>
+          <a:fontRef idx="minor">
+            <a:schemeClr val="lt1"/>
+          </a:fontRef>
+        </p:style>
+        <p:txBody>
+          <a:bodyPr rtlCol="0" anchor="ctr"/>
+          <a:lstStyle/>
+          <a:p>
+            <a:pPr algn="ctr"/>
+            <a:endParaRPr lang="en-US" dirty="0">
+              <a:solidFill>
+                <a:prstClr val="white"/>
+              </a:solidFill>
+              <a:latin typeface="Calibri" panose="020F0502020204030204"/>
+            </a:endParaRPr>
+          </a:p>
+        </p:txBody>
+      </p:sp>
+      <p:sp>
+        <p:nvSpPr>
+          <p:cNvPr id="3" name="Content Placeholder 2">
+            <a:extLst>
+              <a:ext uri="{FF2B5EF4-FFF2-40B4-BE49-F238E27FC236}">
+                <a16:creationId xmlns:a16="http://schemas.microsoft.com/office/drawing/2014/main" id="{E43BD06B-906D-5C9C-E517-52B27F705E94}"/>
+              </a:ext>
+            </a:extLst>
+          </p:cNvPr>
+          <p:cNvSpPr>
+            <a:spLocks noGrp="1"/>
+          </p:cNvSpPr>
+          <p:nvPr>
+            <p:ph idx="1"/>
+          </p:nvPr>
+        </p:nvSpPr>
+        <p:spPr>
+          <a:xfrm>
+            <a:off x="1115568" y="2481943"/>
+            <a:ext cx="10168128" cy="3695020"/>
+          </a:xfrm>
+        </p:spPr>
+        <p:txBody>
+          <a:bodyPr>
+            <a:normAutofit/>
+          </a:bodyPr>
+          <a:lstStyle/>
+          <a:p>
+            <a:pPr marL="457200" indent="-457200">
+              <a:buFont typeface="+mj-lt"/>
+              <a:buAutoNum type="arabicPeriod"/>
+            </a:pPr>
+            <a:endParaRPr lang="en-US" sz="2200" dirty="0"/>
+          </a:p>
+          <a:p>
+            <a:pPr marL="457200" indent="-457200">
+              <a:buFont typeface="+mj-lt"/>
+              <a:buAutoNum type="arabicPeriod"/>
+            </a:pPr>
+            <a:endParaRPr lang="en-US" sz="2200" dirty="0"/>
+          </a:p>
+          <a:p>
+            <a:pPr marL="457200" indent="-457200">
+              <a:buFont typeface="+mj-lt"/>
+              <a:buAutoNum type="arabicPeriod"/>
+            </a:pPr>
+            <a:endParaRPr lang="en-US" sz="2200" dirty="0"/>
+          </a:p>
+        </p:txBody>
+      </p:sp>
+      <p:pic>
+        <p:nvPicPr>
+          <p:cNvPr id="6" name="Picture 5">
+            <a:extLst>
+              <a:ext uri="{FF2B5EF4-FFF2-40B4-BE49-F238E27FC236}">
+                <a16:creationId xmlns:a16="http://schemas.microsoft.com/office/drawing/2014/main" id="{6B466854-812D-E478-AD6C-8C7B4941D51F}"/>
+              </a:ext>
+            </a:extLst>
+          </p:cNvPr>
+          <p:cNvPicPr>
+            <a:picLocks noChangeAspect="1"/>
+          </p:cNvPicPr>
+          <p:nvPr/>
+        </p:nvPicPr>
+        <p:blipFill>
+          <a:blip r:embed="rId3"/>
+          <a:stretch>
+            <a:fillRect/>
+          </a:stretch>
+        </p:blipFill>
+        <p:spPr>
+          <a:xfrm>
+            <a:off x="1858107" y="2154304"/>
+            <a:ext cx="8475785" cy="4591050"/>
+          </a:xfrm>
+          <a:prstGeom prst="rect">
+            <a:avLst/>
+          </a:prstGeom>
+        </p:spPr>
+      </p:pic>
+    </p:spTree>
+    <p:extLst>
+      <p:ext uri="{BB962C8B-B14F-4D97-AF65-F5344CB8AC3E}">
+        <p14:creationId xmlns:p14="http://schemas.microsoft.com/office/powerpoint/2010/main" val="2258248356"/>
+      </p:ext>
+    </p:extLst>
+  </p:cSld>
+  <p:clrMapOvr>
+    <a:masterClrMapping/>
+  </p:clrMapOvr>
+  <p:timing>
+    <p:tnLst>
+      <p:par>
+        <p:cTn id="1" dur="indefinite" restart="never" nodeType="tmRoot">
+          <p:childTnLst>
+            <p:seq concurrent="1" nextAc="seek">
+              <p:cTn id="2" dur="indefinite" nodeType="mainSeq">
+                <p:childTnLst>
+                  <p:par>
+                    <p:cTn id="3" fill="hold">
+                      <p:stCondLst>
+                        <p:cond delay="indefinite"/>
+                      </p:stCondLst>
+                      <p:childTnLst>
+                        <p:par>
+                          <p:cTn id="4" fill="hold">
+                            <p:stCondLst>
+                              <p:cond delay="0"/>
+                            </p:stCondLst>
+                            <p:childTnLst>
+                              <p:par>
+                                <p:cTn id="5" presetID="8" presetClass="emph" presetSubtype="0" fill="hold" grpId="0" nodeType="clickEffect">
+                                  <p:stCondLst>
+                                    <p:cond delay="0"/>
+                                  </p:stCondLst>
+                                  <p:childTnLst>
+                                    <p:animRot by="21600000">
+                                      <p:cBhvr>
+                                        <p:cTn id="6" dur="2000" fill="hold"/>
+                                        <p:tgtEl>
+                                          <p:spTgt spid="14"/>
+                                        </p:tgtEl>
+                                        <p:attrNameLst>
+                                          <p:attrName>r</p:attrName>
+                                        </p:attrNameLst>
+                                      </p:cBhvr>
+                                    </p:animRot>
+                                  </p:childTnLst>
+                                </p:cTn>
+                              </p:par>
+                            </p:childTnLst>
+                          </p:cTn>
+                        </p:par>
+                      </p:childTnLst>
+                    </p:cTn>
+                  </p:par>
+                </p:childTnLst>
+              </p:cTn>
+              <p:prevCondLst>
+                <p:cond evt="onPrev" delay="0">
+                  <p:tgtEl>
+                    <p:sldTgt/>
+                  </p:tgtEl>
+                </p:cond>
+              </p:prevCondLst>
+              <p:nextCondLst>
+                <p:cond evt="onNext" delay="0">
+                  <p:tgtEl>
+                    <p:sldTgt/>
+                  </p:tgtEl>
+                </p:cond>
+              </p:nextCondLst>
+            </p:seq>
+          </p:childTnLst>
+        </p:cTn>
+      </p:par>
+    </p:tnLst>
+    <p:bldLst>
+      <p:bldP spid="14" grpId="0" animBg="1"/>
+    </p:bldLst>
+  </p:timing>
+</p:sld>
+</file>
+
+<file path=ppt/slides/slide12.xml><?xml version="1.0" encoding="utf-8"?>
+<p:sld xmlns:a="http://schemas.openxmlformats.org/drawingml/2006/main" xmlns:r="http://schemas.openxmlformats.org/officeDocument/2006/relationships" xmlns:p="http://schemas.openxmlformats.org/presentationml/2006/main">
+  <p:cSld>
+    <p:bg>
+      <p:bgPr>
+        <a:solidFill>
+          <a:schemeClr val="bg1"/>
+        </a:solidFill>
+        <a:effectLst/>
+      </p:bgPr>
+    </p:bg>
+    <p:spTree>
+      <p:nvGrpSpPr>
+        <p:cNvPr id="1" name=""/>
+        <p:cNvGrpSpPr/>
+        <p:nvPr/>
+      </p:nvGrpSpPr>
+      <p:grpSpPr>
+        <a:xfrm>
+          <a:off x="0" y="0"/>
+          <a:ext cx="0" cy="0"/>
+          <a:chOff x="0" y="0"/>
+          <a:chExt cx="0" cy="0"/>
+        </a:xfrm>
+      </p:grpSpPr>
+      <p:sp useBgFill="1">
+        <p:nvSpPr>
+          <p:cNvPr id="8" name="Rectangle 7">
+            <a:extLst>
+              <a:ext uri="{FF2B5EF4-FFF2-40B4-BE49-F238E27FC236}">
                 <a16:creationId xmlns:a16="http://schemas.microsoft.com/office/drawing/2014/main" id="{907EF6B7-1338-4443-8C46-6A318D952DFD}"/>
               </a:ext>
               <a:ext uri="{C183D7F6-B498-43B3-948B-1728B52AA6E4}">
@@ -7453,565 +8418,6 @@
     <p:extLst>
       <p:ext uri="{BB962C8B-B14F-4D97-AF65-F5344CB8AC3E}">
         <p14:creationId xmlns:p14="http://schemas.microsoft.com/office/powerpoint/2010/main" val="3707692299"/>
-      </p:ext>
-    </p:extLst>
-  </p:cSld>
-  <p:clrMapOvr>
-    <a:masterClrMapping/>
-  </p:clrMapOvr>
-  <p:timing>
-    <p:tnLst>
-      <p:par>
-        <p:cTn id="1" dur="indefinite" restart="never" nodeType="tmRoot">
-          <p:childTnLst>
-            <p:seq concurrent="1" nextAc="seek">
-              <p:cTn id="2" dur="indefinite" nodeType="mainSeq">
-                <p:childTnLst>
-                  <p:par>
-                    <p:cTn id="3" fill="hold">
-                      <p:stCondLst>
-                        <p:cond delay="indefinite"/>
-                      </p:stCondLst>
-                      <p:childTnLst>
-                        <p:par>
-                          <p:cTn id="4" fill="hold">
-                            <p:stCondLst>
-                              <p:cond delay="0"/>
-                            </p:stCondLst>
-                            <p:childTnLst>
-                              <p:par>
-                                <p:cTn id="5" presetID="2" presetClass="entr" presetSubtype="8" fill="hold" grpId="0" nodeType="clickEffect">
-                                  <p:stCondLst>
-                                    <p:cond delay="0"/>
-                                  </p:stCondLst>
-                                  <p:childTnLst>
-                                    <p:set>
-                                      <p:cBhvr>
-                                        <p:cTn id="6" dur="1" fill="hold">
-                                          <p:stCondLst>
-                                            <p:cond delay="0"/>
-                                          </p:stCondLst>
-                                        </p:cTn>
-                                        <p:tgtEl>
-                                          <p:spTgt spid="10"/>
-                                        </p:tgtEl>
-                                        <p:attrNameLst>
-                                          <p:attrName>style.visibility</p:attrName>
-                                        </p:attrNameLst>
-                                      </p:cBhvr>
-                                      <p:to>
-                                        <p:strVal val="visible"/>
-                                      </p:to>
-                                    </p:set>
-                                    <p:anim calcmode="lin" valueType="num">
-                                      <p:cBhvr additive="base">
-                                        <p:cTn id="7" dur="3500" fill="hold"/>
-                                        <p:tgtEl>
-                                          <p:spTgt spid="10"/>
-                                        </p:tgtEl>
-                                        <p:attrNameLst>
-                                          <p:attrName>ppt_x</p:attrName>
-                                        </p:attrNameLst>
-                                      </p:cBhvr>
-                                      <p:tavLst>
-                                        <p:tav tm="0">
-                                          <p:val>
-                                            <p:strVal val="0-#ppt_w/2"/>
-                                          </p:val>
-                                        </p:tav>
-                                        <p:tav tm="100000">
-                                          <p:val>
-                                            <p:strVal val="#ppt_x"/>
-                                          </p:val>
-                                        </p:tav>
-                                      </p:tavLst>
-                                    </p:anim>
-                                    <p:anim calcmode="lin" valueType="num">
-                                      <p:cBhvr additive="base">
-                                        <p:cTn id="8" dur="3500" fill="hold"/>
-                                        <p:tgtEl>
-                                          <p:spTgt spid="10"/>
-                                        </p:tgtEl>
-                                        <p:attrNameLst>
-                                          <p:attrName>ppt_y</p:attrName>
-                                        </p:attrNameLst>
-                                      </p:cBhvr>
-                                      <p:tavLst>
-                                        <p:tav tm="0">
-                                          <p:val>
-                                            <p:strVal val="#ppt_y"/>
-                                          </p:val>
-                                        </p:tav>
-                                        <p:tav tm="100000">
-                                          <p:val>
-                                            <p:strVal val="#ppt_y"/>
-                                          </p:val>
-                                        </p:tav>
-                                      </p:tavLst>
-                                    </p:anim>
-                                  </p:childTnLst>
-                                </p:cTn>
-                              </p:par>
-                            </p:childTnLst>
-                          </p:cTn>
-                        </p:par>
-                      </p:childTnLst>
-                    </p:cTn>
-                  </p:par>
-                </p:childTnLst>
-              </p:cTn>
-              <p:prevCondLst>
-                <p:cond evt="onPrev" delay="0">
-                  <p:tgtEl>
-                    <p:sldTgt/>
-                  </p:tgtEl>
-                </p:cond>
-              </p:prevCondLst>
-              <p:nextCondLst>
-                <p:cond evt="onNext" delay="0">
-                  <p:tgtEl>
-                    <p:sldTgt/>
-                  </p:tgtEl>
-                </p:cond>
-              </p:nextCondLst>
-            </p:seq>
-          </p:childTnLst>
-        </p:cTn>
-      </p:par>
-    </p:tnLst>
-    <p:bldLst>
-      <p:bldP spid="10" grpId="0" animBg="1"/>
-    </p:bldLst>
-  </p:timing>
-</p:sld>
-</file>
-
-<file path=ppt/slides/slide12.xml><?xml version="1.0" encoding="utf-8"?>
-<p:sld xmlns:a="http://schemas.openxmlformats.org/drawingml/2006/main" xmlns:r="http://schemas.openxmlformats.org/officeDocument/2006/relationships" xmlns:p="http://schemas.openxmlformats.org/presentationml/2006/main">
-  <p:cSld>
-    <p:bg>
-      <p:bgPr>
-        <a:solidFill>
-          <a:schemeClr val="bg1"/>
-        </a:solidFill>
-        <a:effectLst/>
-      </p:bgPr>
-    </p:bg>
-    <p:spTree>
-      <p:nvGrpSpPr>
-        <p:cNvPr id="1" name=""/>
-        <p:cNvGrpSpPr/>
-        <p:nvPr/>
-      </p:nvGrpSpPr>
-      <p:grpSpPr>
-        <a:xfrm>
-          <a:off x="0" y="0"/>
-          <a:ext cx="0" cy="0"/>
-          <a:chOff x="0" y="0"/>
-          <a:chExt cx="0" cy="0"/>
-        </a:xfrm>
-      </p:grpSpPr>
-      <p:sp useBgFill="1">
-        <p:nvSpPr>
-          <p:cNvPr id="8" name="Rectangle 7">
-            <a:extLst>
-              <a:ext uri="{FF2B5EF4-FFF2-40B4-BE49-F238E27FC236}">
-                <a16:creationId xmlns:a16="http://schemas.microsoft.com/office/drawing/2014/main" id="{907EF6B7-1338-4443-8C46-6A318D952DFD}"/>
-              </a:ext>
-              <a:ext uri="{C183D7F6-B498-43B3-948B-1728B52AA6E4}">
-                <adec:decorative xmlns:adec="http://schemas.microsoft.com/office/drawing/2017/decorative" val="1"/>
-              </a:ext>
-            </a:extLst>
-          </p:cNvPr>
-          <p:cNvSpPr>
-            <a:spLocks noGrp="1" noRot="1" noChangeAspect="1" noMove="1" noResize="1" noEditPoints="1" noAdjustHandles="1" noChangeArrowheads="1" noChangeShapeType="1" noTextEdit="1"/>
-          </p:cNvSpPr>
-          <p:nvPr>
-            <p:extLst>
-              <p:ext uri="{386F3935-93C4-4BCD-93E2-E3B085C9AB24}">
-                <p16:designElem xmlns:p16="http://schemas.microsoft.com/office/powerpoint/2015/main" val="1"/>
-              </p:ext>
-            </p:extLst>
-          </p:nvPr>
-        </p:nvSpPr>
-        <p:spPr>
-          <a:xfrm>
-            <a:off x="3048" y="0"/>
-            <a:ext cx="12188952" cy="6858000"/>
-          </a:xfrm>
-          <a:prstGeom prst="rect">
-            <a:avLst/>
-          </a:prstGeom>
-          <a:ln>
-            <a:noFill/>
-          </a:ln>
-        </p:spPr>
-        <p:style>
-          <a:lnRef idx="2">
-            <a:schemeClr val="accent1">
-              <a:shade val="50000"/>
-            </a:schemeClr>
-          </a:lnRef>
-          <a:fillRef idx="1">
-            <a:schemeClr val="accent1"/>
-          </a:fillRef>
-          <a:effectRef idx="0">
-            <a:schemeClr val="accent1"/>
-          </a:effectRef>
-          <a:fontRef idx="minor">
-            <a:schemeClr val="lt1"/>
-          </a:fontRef>
-        </p:style>
-        <p:txBody>
-          <a:bodyPr rtlCol="0" anchor="ctr"/>
-          <a:lstStyle/>
-          <a:p>
-            <a:pPr algn="ctr"/>
-            <a:endParaRPr lang="en-US" dirty="0"/>
-          </a:p>
-        </p:txBody>
-      </p:sp>
-      <p:sp>
-        <p:nvSpPr>
-          <p:cNvPr id="10" name="Freeform: Shape 9">
-            <a:extLst>
-              <a:ext uri="{FF2B5EF4-FFF2-40B4-BE49-F238E27FC236}">
-                <a16:creationId xmlns:a16="http://schemas.microsoft.com/office/drawing/2014/main" id="{DAAE4CDD-124C-4DCF-9584-B6033B545DD5}"/>
-              </a:ext>
-              <a:ext uri="{C183D7F6-B498-43B3-948B-1728B52AA6E4}">
-                <adec:decorative xmlns:adec="http://schemas.microsoft.com/office/drawing/2017/decorative" val="1"/>
-              </a:ext>
-            </a:extLst>
-          </p:cNvPr>
-          <p:cNvSpPr>
-            <a:spLocks noChangeAspect="1"/>
-          </p:cNvSpPr>
-          <p:nvPr>
-            <p:extLst>
-              <p:ext uri="{386F3935-93C4-4BCD-93E2-E3B085C9AB24}">
-                <p16:designElem xmlns:p16="http://schemas.microsoft.com/office/powerpoint/2015/main" val="1"/>
-              </p:ext>
-            </p:extLst>
-          </p:nvPr>
-        </p:nvSpPr>
-        <p:spPr>
-          <a:xfrm>
-            <a:off x="1" y="0"/>
-            <a:ext cx="4167271" cy="6858000"/>
-          </a:xfrm>
-          <a:custGeom>
-            <a:avLst/>
-            <a:gdLst>
-              <a:gd name="connsiteX0" fmla="*/ 0 w 4167271"/>
-              <a:gd name="connsiteY0" fmla="*/ 0 h 6858000"/>
-              <a:gd name="connsiteX1" fmla="*/ 2259550 w 4167271"/>
-              <a:gd name="connsiteY1" fmla="*/ 0 h 6858000"/>
-              <a:gd name="connsiteX2" fmla="*/ 2387803 w 4167271"/>
-              <a:gd name="connsiteY2" fmla="*/ 82222 h 6858000"/>
-              <a:gd name="connsiteX3" fmla="*/ 4167271 w 4167271"/>
-              <a:gd name="connsiteY3" fmla="*/ 3429000 h 6858000"/>
-              <a:gd name="connsiteX4" fmla="*/ 2387803 w 4167271"/>
-              <a:gd name="connsiteY4" fmla="*/ 6775779 h 6858000"/>
-              <a:gd name="connsiteX5" fmla="*/ 2259550 w 4167271"/>
-              <a:gd name="connsiteY5" fmla="*/ 6858000 h 6858000"/>
-              <a:gd name="connsiteX6" fmla="*/ 0 w 4167271"/>
-              <a:gd name="connsiteY6" fmla="*/ 6858000 h 6858000"/>
-            </a:gdLst>
-            <a:ahLst/>
-            <a:cxnLst>
-              <a:cxn ang="0">
-                <a:pos x="connsiteX0" y="connsiteY0"/>
-              </a:cxn>
-              <a:cxn ang="0">
-                <a:pos x="connsiteX1" y="connsiteY1"/>
-              </a:cxn>
-              <a:cxn ang="0">
-                <a:pos x="connsiteX2" y="connsiteY2"/>
-              </a:cxn>
-              <a:cxn ang="0">
-                <a:pos x="connsiteX3" y="connsiteY3"/>
-              </a:cxn>
-              <a:cxn ang="0">
-                <a:pos x="connsiteX4" y="connsiteY4"/>
-              </a:cxn>
-              <a:cxn ang="0">
-                <a:pos x="connsiteX5" y="connsiteY5"/>
-              </a:cxn>
-              <a:cxn ang="0">
-                <a:pos x="connsiteX6" y="connsiteY6"/>
-              </a:cxn>
-            </a:cxnLst>
-            <a:rect l="l" t="t" r="r" b="b"/>
-            <a:pathLst>
-              <a:path w="4167271" h="6858000">
-                <a:moveTo>
-                  <a:pt x="0" y="0"/>
-                </a:moveTo>
-                <a:lnTo>
-                  <a:pt x="2259550" y="0"/>
-                </a:lnTo>
-                <a:lnTo>
-                  <a:pt x="2387803" y="82222"/>
-                </a:lnTo>
-                <a:cubicBezTo>
-                  <a:pt x="3461407" y="807534"/>
-                  <a:pt x="4167271" y="2035835"/>
-                  <a:pt x="4167271" y="3429000"/>
-                </a:cubicBezTo>
-                <a:cubicBezTo>
-                  <a:pt x="4167271" y="4822165"/>
-                  <a:pt x="3461407" y="6050467"/>
-                  <a:pt x="2387803" y="6775779"/>
-                </a:cubicBezTo>
-                <a:lnTo>
-                  <a:pt x="2259550" y="6858000"/>
-                </a:lnTo>
-                <a:lnTo>
-                  <a:pt x="0" y="6858000"/>
-                </a:lnTo>
-                <a:close/>
-              </a:path>
-            </a:pathLst>
-          </a:custGeom>
-          <a:gradFill flip="none" rotWithShape="1">
-            <a:gsLst>
-              <a:gs pos="0">
-                <a:schemeClr val="accent2">
-                  <a:lumMod val="67000"/>
-                </a:schemeClr>
-              </a:gs>
-              <a:gs pos="48000">
-                <a:schemeClr val="accent2">
-                  <a:lumMod val="97000"/>
-                  <a:lumOff val="3000"/>
-                </a:schemeClr>
-              </a:gs>
-              <a:gs pos="100000">
-                <a:schemeClr val="accent2">
-                  <a:lumMod val="60000"/>
-                  <a:lumOff val="40000"/>
-                </a:schemeClr>
-              </a:gs>
-            </a:gsLst>
-            <a:lin ang="16200000" scaled="1"/>
-            <a:tileRect/>
-          </a:gradFill>
-          <a:ln>
-            <a:noFill/>
-          </a:ln>
-        </p:spPr>
-        <p:style>
-          <a:lnRef idx="0">
-            <a:scrgbClr r="0" g="0" b="0"/>
-          </a:lnRef>
-          <a:fillRef idx="0">
-            <a:scrgbClr r="0" g="0" b="0"/>
-          </a:fillRef>
-          <a:effectRef idx="0">
-            <a:scrgbClr r="0" g="0" b="0"/>
-          </a:effectRef>
-          <a:fontRef idx="minor">
-            <a:schemeClr val="lt1"/>
-          </a:fontRef>
-        </p:style>
-        <p:txBody>
-          <a:bodyPr rtlCol="0" anchor="ctr"/>
-          <a:lstStyle/>
-          <a:p>
-            <a:pPr algn="ctr"/>
-            <a:endParaRPr lang="en-US" dirty="0"/>
-          </a:p>
-        </p:txBody>
-      </p:sp>
-      <p:sp>
-        <p:nvSpPr>
-          <p:cNvPr id="2" name="Title 1">
-            <a:extLst>
-              <a:ext uri="{FF2B5EF4-FFF2-40B4-BE49-F238E27FC236}">
-                <a16:creationId xmlns:a16="http://schemas.microsoft.com/office/drawing/2014/main" id="{604CD088-9924-FDF8-32EA-64AD14C5DE41}"/>
-              </a:ext>
-            </a:extLst>
-          </p:cNvPr>
-          <p:cNvSpPr>
-            <a:spLocks noGrp="1"/>
-          </p:cNvSpPr>
-          <p:nvPr>
-            <p:ph type="title"/>
-          </p:nvPr>
-        </p:nvSpPr>
-        <p:spPr>
-          <a:xfrm>
-            <a:off x="686834" y="1153572"/>
-            <a:ext cx="3200400" cy="4461163"/>
-          </a:xfrm>
-        </p:spPr>
-        <p:txBody>
-          <a:bodyPr>
-            <a:normAutofit/>
-          </a:bodyPr>
-          <a:lstStyle/>
-          <a:p>
-            <a:r>
-              <a:rPr lang="en-US" dirty="0">
-                <a:solidFill>
-                  <a:srgbClr val="FFFFFF"/>
-                </a:solidFill>
-              </a:rPr>
-              <a:t>BDD</a:t>
-            </a:r>
-          </a:p>
-        </p:txBody>
-      </p:sp>
-      <p:sp>
-        <p:nvSpPr>
-          <p:cNvPr id="12" name="Arc 11">
-            <a:extLst>
-              <a:ext uri="{FF2B5EF4-FFF2-40B4-BE49-F238E27FC236}">
-                <a16:creationId xmlns:a16="http://schemas.microsoft.com/office/drawing/2014/main" id="{081E4A58-353D-44AE-B2FC-2A74E2E400F7}"/>
-              </a:ext>
-              <a:ext uri="{C183D7F6-B498-43B3-948B-1728B52AA6E4}">
-                <adec:decorative xmlns:adec="http://schemas.microsoft.com/office/drawing/2017/decorative" val="1"/>
-              </a:ext>
-            </a:extLst>
-          </p:cNvPr>
-          <p:cNvSpPr>
-            <a:spLocks noGrp="1" noRot="1" noChangeAspect="1" noMove="1" noResize="1" noEditPoints="1" noAdjustHandles="1" noChangeArrowheads="1" noChangeShapeType="1" noTextEdit="1"/>
-          </p:cNvSpPr>
-          <p:nvPr>
-            <p:extLst>
-              <p:ext uri="{386F3935-93C4-4BCD-93E2-E3B085C9AB24}">
-                <p16:designElem xmlns:p16="http://schemas.microsoft.com/office/powerpoint/2015/main" val="1"/>
-              </p:ext>
-            </p:extLst>
-          </p:nvPr>
-        </p:nvSpPr>
-        <p:spPr>
-          <a:xfrm flipV="1">
-            <a:off x="7550402" y="2455479"/>
-            <a:ext cx="4083433" cy="4083433"/>
-          </a:xfrm>
-          <a:prstGeom prst="arc">
-            <a:avLst/>
-          </a:prstGeom>
-          <a:ln w="127000" cap="rnd">
-            <a:solidFill>
-              <a:schemeClr val="accent4"/>
-            </a:solidFill>
-            <a:prstDash val="dash"/>
-          </a:ln>
-        </p:spPr>
-        <p:style>
-          <a:lnRef idx="1">
-            <a:schemeClr val="accent1"/>
-          </a:lnRef>
-          <a:fillRef idx="0">
-            <a:schemeClr val="accent1"/>
-          </a:fillRef>
-          <a:effectRef idx="0">
-            <a:schemeClr val="accent1"/>
-          </a:effectRef>
-          <a:fontRef idx="minor">
-            <a:schemeClr val="tx1"/>
-          </a:fontRef>
-        </p:style>
-        <p:txBody>
-          <a:bodyPr rtlCol="0" anchor="ctr"/>
-          <a:lstStyle/>
-          <a:p>
-            <a:pPr algn="ctr"/>
-            <a:endParaRPr lang="en-US" dirty="0"/>
-          </a:p>
-        </p:txBody>
-      </p:sp>
-      <p:sp>
-        <p:nvSpPr>
-          <p:cNvPr id="3" name="Content Placeholder 2">
-            <a:extLst>
-              <a:ext uri="{FF2B5EF4-FFF2-40B4-BE49-F238E27FC236}">
-                <a16:creationId xmlns:a16="http://schemas.microsoft.com/office/drawing/2014/main" id="{506ECF03-3832-CE61-45EB-6C148D597A92}"/>
-              </a:ext>
-            </a:extLst>
-          </p:cNvPr>
-          <p:cNvSpPr>
-            <a:spLocks noGrp="1"/>
-          </p:cNvSpPr>
-          <p:nvPr>
-            <p:ph idx="1"/>
-          </p:nvPr>
-        </p:nvSpPr>
-        <p:spPr>
-          <a:xfrm>
-            <a:off x="4447308" y="787400"/>
-            <a:ext cx="6906491" cy="5389563"/>
-          </a:xfrm>
-        </p:spPr>
-        <p:txBody>
-          <a:bodyPr anchor="ctr">
-            <a:normAutofit/>
-          </a:bodyPr>
-          <a:lstStyle/>
-          <a:p>
-            <a:r>
-              <a:rPr lang="en-US" dirty="0"/>
-              <a:t>Tries to do TDD, but better</a:t>
-            </a:r>
-          </a:p>
-          <a:p>
-            <a:pPr lvl="1"/>
-            <a:r>
-              <a:rPr lang="en-US" dirty="0"/>
-              <a:t>Not TDD’s fault</a:t>
-            </a:r>
-          </a:p>
-          <a:p>
-            <a:pPr lvl="1"/>
-            <a:r>
-              <a:rPr lang="en-US" dirty="0"/>
-              <a:t>Avoid misunderstandings of adopting TDD</a:t>
-            </a:r>
-          </a:p>
-          <a:p>
-            <a:pPr lvl="1"/>
-            <a:r>
-              <a:rPr lang="en-US" dirty="0"/>
-              <a:t>Move focus to behaviors instead of tests</a:t>
-            </a:r>
-          </a:p>
-          <a:p>
-            <a:pPr lvl="1"/>
-            <a:r>
-              <a:rPr lang="en-US" dirty="0"/>
-              <a:t>Avoid complex slow and tightly coupled tests</a:t>
-            </a:r>
-          </a:p>
-          <a:p>
-            <a:pPr lvl="1"/>
-            <a:r>
-              <a:rPr lang="en-US" dirty="0"/>
-              <a:t>Start from end user perspective</a:t>
-            </a:r>
-          </a:p>
-          <a:p>
-            <a:pPr lvl="1"/>
-            <a:r>
-              <a:rPr lang="en-US" dirty="0"/>
-              <a:t>Get business and technical teams on the same page</a:t>
-            </a:r>
-          </a:p>
-          <a:p>
-            <a:pPr lvl="2"/>
-            <a:r>
-              <a:rPr lang="en-US"/>
-              <a:t>Three Amigos</a:t>
-            </a:r>
-            <a:endParaRPr lang="en-US" dirty="0"/>
-          </a:p>
-        </p:txBody>
-      </p:sp>
-    </p:spTree>
-    <p:extLst>
-      <p:ext uri="{BB962C8B-B14F-4D97-AF65-F5344CB8AC3E}">
-        <p14:creationId xmlns:p14="http://schemas.microsoft.com/office/powerpoint/2010/main" val="828508002"/>
       </p:ext>
     </p:extLst>
   </p:cSld>
@@ -8175,547 +8581,6 @@
           <p:cNvPr id="8" name="Rectangle 7">
             <a:extLst>
               <a:ext uri="{FF2B5EF4-FFF2-40B4-BE49-F238E27FC236}">
-                <a16:creationId xmlns:a16="http://schemas.microsoft.com/office/drawing/2014/main" id="{DAF1966E-FD40-4A4A-B61B-C4DF7FA05F06}"/>
-              </a:ext>
-              <a:ext uri="{C183D7F6-B498-43B3-948B-1728B52AA6E4}">
-                <adec:decorative xmlns:adec="http://schemas.microsoft.com/office/drawing/2017/decorative" val="1"/>
-              </a:ext>
-            </a:extLst>
-          </p:cNvPr>
-          <p:cNvSpPr>
-            <a:spLocks noGrp="1" noRot="1" noChangeAspect="1" noMove="1" noResize="1" noEditPoints="1" noAdjustHandles="1" noChangeArrowheads="1" noChangeShapeType="1" noTextEdit="1"/>
-          </p:cNvSpPr>
-          <p:nvPr>
-            <p:extLst>
-              <p:ext uri="{386F3935-93C4-4BCD-93E2-E3B085C9AB24}">
-                <p16:designElem xmlns:p16="http://schemas.microsoft.com/office/powerpoint/2015/main" val="1"/>
-              </p:ext>
-            </p:extLst>
-          </p:nvPr>
-        </p:nvSpPr>
-        <p:spPr>
-          <a:xfrm>
-            <a:off x="0" y="0"/>
-            <a:ext cx="12192000" cy="6858000"/>
-          </a:xfrm>
-          <a:prstGeom prst="rect">
-            <a:avLst/>
-          </a:prstGeom>
-          <a:ln>
-            <a:noFill/>
-          </a:ln>
-        </p:spPr>
-        <p:style>
-          <a:lnRef idx="2">
-            <a:schemeClr val="accent1">
-              <a:shade val="50000"/>
-            </a:schemeClr>
-          </a:lnRef>
-          <a:fillRef idx="1">
-            <a:schemeClr val="accent1"/>
-          </a:fillRef>
-          <a:effectRef idx="0">
-            <a:schemeClr val="accent1"/>
-          </a:effectRef>
-          <a:fontRef idx="minor">
-            <a:schemeClr val="lt1"/>
-          </a:fontRef>
-        </p:style>
-        <p:txBody>
-          <a:bodyPr rtlCol="0" anchor="ctr"/>
-          <a:lstStyle/>
-          <a:p>
-            <a:pPr algn="ctr"/>
-            <a:endParaRPr lang="en-US" dirty="0"/>
-          </a:p>
-        </p:txBody>
-      </p:sp>
-      <p:sp useBgFill="1">
-        <p:nvSpPr>
-          <p:cNvPr id="10" name="Rectangle 9">
-            <a:extLst>
-              <a:ext uri="{FF2B5EF4-FFF2-40B4-BE49-F238E27FC236}">
-                <a16:creationId xmlns:a16="http://schemas.microsoft.com/office/drawing/2014/main" id="{047BFA19-D45E-416B-A404-7AF2F3F27017}"/>
-              </a:ext>
-              <a:ext uri="{C183D7F6-B498-43B3-948B-1728B52AA6E4}">
-                <adec:decorative xmlns:adec="http://schemas.microsoft.com/office/drawing/2017/decorative" val="1"/>
-              </a:ext>
-            </a:extLst>
-          </p:cNvPr>
-          <p:cNvSpPr>
-            <a:spLocks noGrp="1" noRot="1" noChangeAspect="1" noMove="1" noResize="1" noEditPoints="1" noAdjustHandles="1" noChangeArrowheads="1" noChangeShapeType="1" noTextEdit="1"/>
-          </p:cNvSpPr>
-          <p:nvPr>
-            <p:extLst>
-              <p:ext uri="{386F3935-93C4-4BCD-93E2-E3B085C9AB24}">
-                <p16:designElem xmlns:p16="http://schemas.microsoft.com/office/powerpoint/2015/main" val="1"/>
-              </p:ext>
-            </p:extLst>
-          </p:nvPr>
-        </p:nvSpPr>
-        <p:spPr>
-          <a:xfrm>
-            <a:off x="558209" y="0"/>
-            <a:ext cx="11167447" cy="2018806"/>
-          </a:xfrm>
-          <a:prstGeom prst="rect">
-            <a:avLst/>
-          </a:prstGeom>
-          <a:ln w="9525">
-            <a:solidFill>
-              <a:srgbClr val="E1E1E1"/>
-            </a:solidFill>
-          </a:ln>
-          <a:effectLst>
-            <a:outerShdw blurRad="50800" dist="38100" dir="2700000" algn="tl" rotWithShape="0">
-              <a:schemeClr val="bg1">
-                <a:lumMod val="85000"/>
-                <a:alpha val="50000"/>
-              </a:schemeClr>
-            </a:outerShdw>
-          </a:effectLst>
-        </p:spPr>
-        <p:style>
-          <a:lnRef idx="2">
-            <a:schemeClr val="accent1">
-              <a:shade val="50000"/>
-            </a:schemeClr>
-          </a:lnRef>
-          <a:fillRef idx="1">
-            <a:schemeClr val="accent1"/>
-          </a:fillRef>
-          <a:effectRef idx="0">
-            <a:schemeClr val="accent1"/>
-          </a:effectRef>
-          <a:fontRef idx="minor">
-            <a:schemeClr val="lt1"/>
-          </a:fontRef>
-        </p:style>
-        <p:txBody>
-          <a:bodyPr rtlCol="0" anchor="ctr"/>
-          <a:lstStyle/>
-          <a:p>
-            <a:pPr marL="0" marR="0" lvl="0" indent="0" algn="ctr" defTabSz="914400" rtl="0" eaLnBrk="1" fontAlgn="auto" latinLnBrk="0" hangingPunct="1">
-              <a:lnSpc>
-                <a:spcPct val="100000"/>
-              </a:lnSpc>
-              <a:spcBef>
-                <a:spcPts val="0"/>
-              </a:spcBef>
-              <a:spcAft>
-                <a:spcPts val="0"/>
-              </a:spcAft>
-              <a:buClrTx/>
-              <a:buSzTx/>
-              <a:buFontTx/>
-              <a:buNone/>
-              <a:tabLst/>
-              <a:defRPr/>
-            </a:pPr>
-            <a:endParaRPr kumimoji="0" lang="en-US" sz="1800" b="0" i="0" u="none" strike="noStrike" kern="1200" cap="none" spc="0" normalizeH="0" baseline="0" noProof="0" dirty="0">
-              <a:ln>
-                <a:noFill/>
-              </a:ln>
-              <a:solidFill>
-                <a:prstClr val="white"/>
-              </a:solidFill>
-              <a:effectLst/>
-              <a:uLnTx/>
-              <a:uFillTx/>
-              <a:latin typeface="Calibri" panose="020F0502020204030204"/>
-              <a:ea typeface="+mn-ea"/>
-              <a:cs typeface="+mn-cs"/>
-            </a:endParaRPr>
-          </a:p>
-        </p:txBody>
-      </p:sp>
-      <p:sp useBgFill="1">
-        <p:nvSpPr>
-          <p:cNvPr id="12" name="Rectangle 11">
-            <a:extLst>
-              <a:ext uri="{FF2B5EF4-FFF2-40B4-BE49-F238E27FC236}">
-                <a16:creationId xmlns:a16="http://schemas.microsoft.com/office/drawing/2014/main" id="{8E0105E7-23DB-4CF2-8258-FF47C7620F6E}"/>
-              </a:ext>
-              <a:ext uri="{C183D7F6-B498-43B3-948B-1728B52AA6E4}">
-                <adec:decorative xmlns:adec="http://schemas.microsoft.com/office/drawing/2017/decorative" val="1"/>
-              </a:ext>
-            </a:extLst>
-          </p:cNvPr>
-          <p:cNvSpPr>
-            <a:spLocks noGrp="1" noRot="1" noChangeAspect="1" noMove="1" noResize="1" noEditPoints="1" noAdjustHandles="1" noChangeArrowheads="1" noChangeShapeType="1" noTextEdit="1"/>
-          </p:cNvSpPr>
-          <p:nvPr>
-            <p:extLst>
-              <p:ext uri="{386F3935-93C4-4BCD-93E2-E3B085C9AB24}">
-                <p16:designElem xmlns:p16="http://schemas.microsoft.com/office/powerpoint/2015/main" val="1"/>
-              </p:ext>
-            </p:extLst>
-          </p:nvPr>
-        </p:nvSpPr>
-        <p:spPr>
-          <a:xfrm>
-            <a:off x="566928" y="0"/>
-            <a:ext cx="11155680" cy="2011680"/>
-          </a:xfrm>
-          <a:prstGeom prst="rect">
-            <a:avLst/>
-          </a:prstGeom>
-          <a:ln w="9525">
-            <a:noFill/>
-          </a:ln>
-          <a:effectLst/>
-        </p:spPr>
-        <p:style>
-          <a:lnRef idx="2">
-            <a:schemeClr val="accent1">
-              <a:shade val="50000"/>
-            </a:schemeClr>
-          </a:lnRef>
-          <a:fillRef idx="1">
-            <a:schemeClr val="accent1"/>
-          </a:fillRef>
-          <a:effectRef idx="0">
-            <a:schemeClr val="accent1"/>
-          </a:effectRef>
-          <a:fontRef idx="minor">
-            <a:schemeClr val="lt1"/>
-          </a:fontRef>
-        </p:style>
-        <p:txBody>
-          <a:bodyPr rtlCol="0" anchor="ctr"/>
-          <a:lstStyle/>
-          <a:p>
-            <a:pPr marL="0" marR="0" lvl="0" indent="0" algn="ctr" defTabSz="914400" rtl="0" eaLnBrk="1" fontAlgn="auto" latinLnBrk="0" hangingPunct="1">
-              <a:lnSpc>
-                <a:spcPct val="100000"/>
-              </a:lnSpc>
-              <a:spcBef>
-                <a:spcPts val="0"/>
-              </a:spcBef>
-              <a:spcAft>
-                <a:spcPts val="0"/>
-              </a:spcAft>
-              <a:buClrTx/>
-              <a:buSzTx/>
-              <a:buFontTx/>
-              <a:buNone/>
-              <a:tabLst/>
-              <a:defRPr/>
-            </a:pPr>
-            <a:endParaRPr kumimoji="0" lang="en-US" sz="1800" b="0" i="0" u="none" strike="noStrike" kern="1200" cap="none" spc="0" normalizeH="0" baseline="0" noProof="0" dirty="0">
-              <a:ln>
-                <a:noFill/>
-              </a:ln>
-              <a:solidFill>
-                <a:prstClr val="white"/>
-              </a:solidFill>
-              <a:effectLst/>
-              <a:uLnTx/>
-              <a:uFillTx/>
-              <a:latin typeface="Calibri" panose="020F0502020204030204"/>
-              <a:ea typeface="+mn-ea"/>
-              <a:cs typeface="+mn-cs"/>
-            </a:endParaRPr>
-          </a:p>
-        </p:txBody>
-      </p:sp>
-      <p:sp>
-        <p:nvSpPr>
-          <p:cNvPr id="2" name="Title 1">
-            <a:extLst>
-              <a:ext uri="{FF2B5EF4-FFF2-40B4-BE49-F238E27FC236}">
-                <a16:creationId xmlns:a16="http://schemas.microsoft.com/office/drawing/2014/main" id="{82CF4B60-062A-25CD-E448-6C8255EEF9CC}"/>
-              </a:ext>
-            </a:extLst>
-          </p:cNvPr>
-          <p:cNvSpPr>
-            <a:spLocks noGrp="1"/>
-          </p:cNvSpPr>
-          <p:nvPr>
-            <p:ph type="title"/>
-          </p:nvPr>
-        </p:nvSpPr>
-        <p:spPr>
-          <a:xfrm>
-            <a:off x="1115568" y="548640"/>
-            <a:ext cx="10168128" cy="1252266"/>
-          </a:xfrm>
-        </p:spPr>
-        <p:txBody>
-          <a:bodyPr>
-            <a:normAutofit/>
-          </a:bodyPr>
-          <a:lstStyle/>
-          <a:p>
-            <a:r>
-              <a:rPr lang="en-US" sz="4000" dirty="0"/>
-              <a:t>Office Space</a:t>
-            </a:r>
-          </a:p>
-        </p:txBody>
-      </p:sp>
-      <p:sp>
-        <p:nvSpPr>
-          <p:cNvPr id="14" name="Rectangle 13">
-            <a:extLst>
-              <a:ext uri="{FF2B5EF4-FFF2-40B4-BE49-F238E27FC236}">
-                <a16:creationId xmlns:a16="http://schemas.microsoft.com/office/drawing/2014/main" id="{074B4F7D-14B2-478B-8BF5-01E4E0C5D263}"/>
-              </a:ext>
-              <a:ext uri="{C183D7F6-B498-43B3-948B-1728B52AA6E4}">
-                <adec:decorative xmlns:adec="http://schemas.microsoft.com/office/drawing/2017/decorative" val="1"/>
-              </a:ext>
-            </a:extLst>
-          </p:cNvPr>
-          <p:cNvSpPr>
-            <a:spLocks noGrp="1" noRot="1" noChangeAspect="1" noMove="1" noResize="1" noEditPoints="1" noAdjustHandles="1" noChangeArrowheads="1" noChangeShapeType="1" noTextEdit="1"/>
-          </p:cNvSpPr>
-          <p:nvPr>
-            <p:extLst>
-              <p:ext uri="{386F3935-93C4-4BCD-93E2-E3B085C9AB24}">
-                <p16:designElem xmlns:p16="http://schemas.microsoft.com/office/powerpoint/2015/main" val="1"/>
-              </p:ext>
-            </p:extLst>
-          </p:nvPr>
-        </p:nvSpPr>
-        <p:spPr>
-          <a:xfrm>
-            <a:off x="498834" y="758952"/>
-            <a:ext cx="128016" cy="704088"/>
-          </a:xfrm>
-          <a:prstGeom prst="rect">
-            <a:avLst/>
-          </a:prstGeom>
-          <a:solidFill>
-            <a:schemeClr val="accent2"/>
-          </a:solidFill>
-          <a:ln>
-            <a:noFill/>
-          </a:ln>
-        </p:spPr>
-        <p:style>
-          <a:lnRef idx="2">
-            <a:schemeClr val="accent1">
-              <a:shade val="50000"/>
-            </a:schemeClr>
-          </a:lnRef>
-          <a:fillRef idx="1">
-            <a:schemeClr val="accent1"/>
-          </a:fillRef>
-          <a:effectRef idx="0">
-            <a:schemeClr val="accent1"/>
-          </a:effectRef>
-          <a:fontRef idx="minor">
-            <a:schemeClr val="lt1"/>
-          </a:fontRef>
-        </p:style>
-        <p:txBody>
-          <a:bodyPr rtlCol="0" anchor="ctr"/>
-          <a:lstStyle/>
-          <a:p>
-            <a:pPr algn="ctr"/>
-            <a:endParaRPr lang="en-US" dirty="0">
-              <a:solidFill>
-                <a:prstClr val="white"/>
-              </a:solidFill>
-              <a:latin typeface="Calibri" panose="020F0502020204030204"/>
-            </a:endParaRPr>
-          </a:p>
-        </p:txBody>
-      </p:sp>
-      <p:sp>
-        <p:nvSpPr>
-          <p:cNvPr id="3" name="Content Placeholder 2">
-            <a:extLst>
-              <a:ext uri="{FF2B5EF4-FFF2-40B4-BE49-F238E27FC236}">
-                <a16:creationId xmlns:a16="http://schemas.microsoft.com/office/drawing/2014/main" id="{E43BD06B-906D-5C9C-E517-52B27F705E94}"/>
-              </a:ext>
-            </a:extLst>
-          </p:cNvPr>
-          <p:cNvSpPr>
-            <a:spLocks noGrp="1"/>
-          </p:cNvSpPr>
-          <p:nvPr>
-            <p:ph idx="1"/>
-          </p:nvPr>
-        </p:nvSpPr>
-        <p:spPr>
-          <a:xfrm>
-            <a:off x="1115568" y="2481943"/>
-            <a:ext cx="10168128" cy="3695020"/>
-          </a:xfrm>
-        </p:spPr>
-        <p:txBody>
-          <a:bodyPr>
-            <a:normAutofit/>
-          </a:bodyPr>
-          <a:lstStyle/>
-          <a:p>
-            <a:pPr marL="457200" indent="-457200">
-              <a:buFont typeface="+mj-lt"/>
-              <a:buAutoNum type="arabicPeriod"/>
-            </a:pPr>
-            <a:endParaRPr lang="en-US" sz="2200" dirty="0"/>
-          </a:p>
-          <a:p>
-            <a:pPr marL="457200" indent="-457200">
-              <a:buFont typeface="+mj-lt"/>
-              <a:buAutoNum type="arabicPeriod"/>
-            </a:pPr>
-            <a:endParaRPr lang="en-US" sz="2200" dirty="0"/>
-          </a:p>
-          <a:p>
-            <a:pPr marL="457200" indent="-457200">
-              <a:buFont typeface="+mj-lt"/>
-              <a:buAutoNum type="arabicPeriod"/>
-            </a:pPr>
-            <a:endParaRPr lang="en-US" sz="2200" dirty="0"/>
-          </a:p>
-        </p:txBody>
-      </p:sp>
-      <p:pic>
-        <p:nvPicPr>
-          <p:cNvPr id="6" name="Picture 5">
-            <a:extLst>
-              <a:ext uri="{FF2B5EF4-FFF2-40B4-BE49-F238E27FC236}">
-                <a16:creationId xmlns:a16="http://schemas.microsoft.com/office/drawing/2014/main" id="{6B466854-812D-E478-AD6C-8C7B4941D51F}"/>
-              </a:ext>
-            </a:extLst>
-          </p:cNvPr>
-          <p:cNvPicPr>
-            <a:picLocks noChangeAspect="1"/>
-          </p:cNvPicPr>
-          <p:nvPr/>
-        </p:nvPicPr>
-        <p:blipFill>
-          <a:blip r:embed="rId3"/>
-          <a:stretch>
-            <a:fillRect/>
-          </a:stretch>
-        </p:blipFill>
-        <p:spPr>
-          <a:xfrm>
-            <a:off x="1858107" y="2154304"/>
-            <a:ext cx="8475785" cy="4591050"/>
-          </a:xfrm>
-          <a:prstGeom prst="rect">
-            <a:avLst/>
-          </a:prstGeom>
-        </p:spPr>
-      </p:pic>
-    </p:spTree>
-    <p:extLst>
-      <p:ext uri="{BB962C8B-B14F-4D97-AF65-F5344CB8AC3E}">
-        <p14:creationId xmlns:p14="http://schemas.microsoft.com/office/powerpoint/2010/main" val="2258248356"/>
-      </p:ext>
-    </p:extLst>
-  </p:cSld>
-  <p:clrMapOvr>
-    <a:masterClrMapping/>
-  </p:clrMapOvr>
-  <p:timing>
-    <p:tnLst>
-      <p:par>
-        <p:cTn id="1" dur="indefinite" restart="never" nodeType="tmRoot">
-          <p:childTnLst>
-            <p:seq concurrent="1" nextAc="seek">
-              <p:cTn id="2" dur="indefinite" nodeType="mainSeq">
-                <p:childTnLst>
-                  <p:par>
-                    <p:cTn id="3" fill="hold">
-                      <p:stCondLst>
-                        <p:cond delay="indefinite"/>
-                      </p:stCondLst>
-                      <p:childTnLst>
-                        <p:par>
-                          <p:cTn id="4" fill="hold">
-                            <p:stCondLst>
-                              <p:cond delay="0"/>
-                            </p:stCondLst>
-                            <p:childTnLst>
-                              <p:par>
-                                <p:cTn id="5" presetID="8" presetClass="emph" presetSubtype="0" fill="hold" grpId="0" nodeType="clickEffect">
-                                  <p:stCondLst>
-                                    <p:cond delay="0"/>
-                                  </p:stCondLst>
-                                  <p:childTnLst>
-                                    <p:animRot by="21600000">
-                                      <p:cBhvr>
-                                        <p:cTn id="6" dur="2000" fill="hold"/>
-                                        <p:tgtEl>
-                                          <p:spTgt spid="14"/>
-                                        </p:tgtEl>
-                                        <p:attrNameLst>
-                                          <p:attrName>r</p:attrName>
-                                        </p:attrNameLst>
-                                      </p:cBhvr>
-                                    </p:animRot>
-                                  </p:childTnLst>
-                                </p:cTn>
-                              </p:par>
-                            </p:childTnLst>
-                          </p:cTn>
-                        </p:par>
-                      </p:childTnLst>
-                    </p:cTn>
-                  </p:par>
-                </p:childTnLst>
-              </p:cTn>
-              <p:prevCondLst>
-                <p:cond evt="onPrev" delay="0">
-                  <p:tgtEl>
-                    <p:sldTgt/>
-                  </p:tgtEl>
-                </p:cond>
-              </p:prevCondLst>
-              <p:nextCondLst>
-                <p:cond evt="onNext" delay="0">
-                  <p:tgtEl>
-                    <p:sldTgt/>
-                  </p:tgtEl>
-                </p:cond>
-              </p:nextCondLst>
-            </p:seq>
-          </p:childTnLst>
-        </p:cTn>
-      </p:par>
-    </p:tnLst>
-    <p:bldLst>
-      <p:bldP spid="14" grpId="0" animBg="1"/>
-    </p:bldLst>
-  </p:timing>
-</p:sld>
-</file>
-
-<file path=ppt/slides/slide14.xml><?xml version="1.0" encoding="utf-8"?>
-<p:sld xmlns:a="http://schemas.openxmlformats.org/drawingml/2006/main" xmlns:r="http://schemas.openxmlformats.org/officeDocument/2006/relationships" xmlns:p="http://schemas.openxmlformats.org/presentationml/2006/main">
-  <p:cSld>
-    <p:bg>
-      <p:bgPr>
-        <a:solidFill>
-          <a:schemeClr val="bg1"/>
-        </a:solidFill>
-        <a:effectLst/>
-      </p:bgPr>
-    </p:bg>
-    <p:spTree>
-      <p:nvGrpSpPr>
-        <p:cNvPr id="1" name=""/>
-        <p:cNvGrpSpPr/>
-        <p:nvPr/>
-      </p:nvGrpSpPr>
-      <p:grpSpPr>
-        <a:xfrm>
-          <a:off x="0" y="0"/>
-          <a:ext cx="0" cy="0"/>
-          <a:chOff x="0" y="0"/>
-          <a:chExt cx="0" cy="0"/>
-        </a:xfrm>
-      </p:grpSpPr>
-      <p:sp useBgFill="1">
-        <p:nvSpPr>
-          <p:cNvPr id="8" name="Rectangle 7">
-            <a:extLst>
-              <a:ext uri="{FF2B5EF4-FFF2-40B4-BE49-F238E27FC236}">
                 <a16:creationId xmlns:a16="http://schemas.microsoft.com/office/drawing/2014/main" id="{907EF6B7-1338-4443-8C46-6A318D952DFD}"/>
               </a:ext>
               <a:ext uri="{C183D7F6-B498-43B3-948B-1728B52AA6E4}">
@@ -8957,7 +8822,7 @@
                   <a:srgbClr val="FFFFFF"/>
                 </a:solidFill>
               </a:rPr>
-              <a:t>Gherkin</a:t>
+              <a:t>BDD</a:t>
             </a:r>
           </a:p>
         </p:txBody>
@@ -9041,6 +8906,565 @@
         </p:nvSpPr>
         <p:spPr>
           <a:xfrm>
+            <a:off x="4447308" y="787400"/>
+            <a:ext cx="6906491" cy="5389563"/>
+          </a:xfrm>
+        </p:spPr>
+        <p:txBody>
+          <a:bodyPr anchor="ctr">
+            <a:normAutofit/>
+          </a:bodyPr>
+          <a:lstStyle/>
+          <a:p>
+            <a:r>
+              <a:rPr lang="en-US" dirty="0"/>
+              <a:t>Tries to do TDD, but better</a:t>
+            </a:r>
+          </a:p>
+          <a:p>
+            <a:pPr lvl="1"/>
+            <a:r>
+              <a:rPr lang="en-US" dirty="0"/>
+              <a:t>Not TDD’s fault</a:t>
+            </a:r>
+          </a:p>
+          <a:p>
+            <a:pPr lvl="1"/>
+            <a:r>
+              <a:rPr lang="en-US" dirty="0"/>
+              <a:t>Avoid misunderstandings of adopting TDD</a:t>
+            </a:r>
+          </a:p>
+          <a:p>
+            <a:pPr lvl="1"/>
+            <a:r>
+              <a:rPr lang="en-US" dirty="0"/>
+              <a:t>Move focus to behaviors instead of tests</a:t>
+            </a:r>
+          </a:p>
+          <a:p>
+            <a:pPr lvl="1"/>
+            <a:r>
+              <a:rPr lang="en-US" dirty="0"/>
+              <a:t>Avoid complex slow and tightly coupled tests</a:t>
+            </a:r>
+          </a:p>
+          <a:p>
+            <a:pPr lvl="1"/>
+            <a:r>
+              <a:rPr lang="en-US" dirty="0"/>
+              <a:t>Start from end user perspective</a:t>
+            </a:r>
+          </a:p>
+          <a:p>
+            <a:pPr lvl="1"/>
+            <a:r>
+              <a:rPr lang="en-US" dirty="0"/>
+              <a:t>Get business and technical teams on the same page</a:t>
+            </a:r>
+          </a:p>
+          <a:p>
+            <a:pPr lvl="2"/>
+            <a:r>
+              <a:rPr lang="en-US"/>
+              <a:t>Three Amigos</a:t>
+            </a:r>
+            <a:endParaRPr lang="en-US" dirty="0"/>
+          </a:p>
+        </p:txBody>
+      </p:sp>
+    </p:spTree>
+    <p:extLst>
+      <p:ext uri="{BB962C8B-B14F-4D97-AF65-F5344CB8AC3E}">
+        <p14:creationId xmlns:p14="http://schemas.microsoft.com/office/powerpoint/2010/main" val="828508002"/>
+      </p:ext>
+    </p:extLst>
+  </p:cSld>
+  <p:clrMapOvr>
+    <a:masterClrMapping/>
+  </p:clrMapOvr>
+  <p:timing>
+    <p:tnLst>
+      <p:par>
+        <p:cTn id="1" dur="indefinite" restart="never" nodeType="tmRoot">
+          <p:childTnLst>
+            <p:seq concurrent="1" nextAc="seek">
+              <p:cTn id="2" dur="indefinite" nodeType="mainSeq">
+                <p:childTnLst>
+                  <p:par>
+                    <p:cTn id="3" fill="hold">
+                      <p:stCondLst>
+                        <p:cond delay="indefinite"/>
+                      </p:stCondLst>
+                      <p:childTnLst>
+                        <p:par>
+                          <p:cTn id="4" fill="hold">
+                            <p:stCondLst>
+                              <p:cond delay="0"/>
+                            </p:stCondLst>
+                            <p:childTnLst>
+                              <p:par>
+                                <p:cTn id="5" presetID="2" presetClass="entr" presetSubtype="8" fill="hold" grpId="0" nodeType="clickEffect">
+                                  <p:stCondLst>
+                                    <p:cond delay="0"/>
+                                  </p:stCondLst>
+                                  <p:childTnLst>
+                                    <p:set>
+                                      <p:cBhvr>
+                                        <p:cTn id="6" dur="1" fill="hold">
+                                          <p:stCondLst>
+                                            <p:cond delay="0"/>
+                                          </p:stCondLst>
+                                        </p:cTn>
+                                        <p:tgtEl>
+                                          <p:spTgt spid="10"/>
+                                        </p:tgtEl>
+                                        <p:attrNameLst>
+                                          <p:attrName>style.visibility</p:attrName>
+                                        </p:attrNameLst>
+                                      </p:cBhvr>
+                                      <p:to>
+                                        <p:strVal val="visible"/>
+                                      </p:to>
+                                    </p:set>
+                                    <p:anim calcmode="lin" valueType="num">
+                                      <p:cBhvr additive="base">
+                                        <p:cTn id="7" dur="3500" fill="hold"/>
+                                        <p:tgtEl>
+                                          <p:spTgt spid="10"/>
+                                        </p:tgtEl>
+                                        <p:attrNameLst>
+                                          <p:attrName>ppt_x</p:attrName>
+                                        </p:attrNameLst>
+                                      </p:cBhvr>
+                                      <p:tavLst>
+                                        <p:tav tm="0">
+                                          <p:val>
+                                            <p:strVal val="0-#ppt_w/2"/>
+                                          </p:val>
+                                        </p:tav>
+                                        <p:tav tm="100000">
+                                          <p:val>
+                                            <p:strVal val="#ppt_x"/>
+                                          </p:val>
+                                        </p:tav>
+                                      </p:tavLst>
+                                    </p:anim>
+                                    <p:anim calcmode="lin" valueType="num">
+                                      <p:cBhvr additive="base">
+                                        <p:cTn id="8" dur="3500" fill="hold"/>
+                                        <p:tgtEl>
+                                          <p:spTgt spid="10"/>
+                                        </p:tgtEl>
+                                        <p:attrNameLst>
+                                          <p:attrName>ppt_y</p:attrName>
+                                        </p:attrNameLst>
+                                      </p:cBhvr>
+                                      <p:tavLst>
+                                        <p:tav tm="0">
+                                          <p:val>
+                                            <p:strVal val="#ppt_y"/>
+                                          </p:val>
+                                        </p:tav>
+                                        <p:tav tm="100000">
+                                          <p:val>
+                                            <p:strVal val="#ppt_y"/>
+                                          </p:val>
+                                        </p:tav>
+                                      </p:tavLst>
+                                    </p:anim>
+                                  </p:childTnLst>
+                                </p:cTn>
+                              </p:par>
+                            </p:childTnLst>
+                          </p:cTn>
+                        </p:par>
+                      </p:childTnLst>
+                    </p:cTn>
+                  </p:par>
+                </p:childTnLst>
+              </p:cTn>
+              <p:prevCondLst>
+                <p:cond evt="onPrev" delay="0">
+                  <p:tgtEl>
+                    <p:sldTgt/>
+                  </p:tgtEl>
+                </p:cond>
+              </p:prevCondLst>
+              <p:nextCondLst>
+                <p:cond evt="onNext" delay="0">
+                  <p:tgtEl>
+                    <p:sldTgt/>
+                  </p:tgtEl>
+                </p:cond>
+              </p:nextCondLst>
+            </p:seq>
+          </p:childTnLst>
+        </p:cTn>
+      </p:par>
+    </p:tnLst>
+    <p:bldLst>
+      <p:bldP spid="10" grpId="0" animBg="1"/>
+    </p:bldLst>
+  </p:timing>
+</p:sld>
+</file>
+
+<file path=ppt/slides/slide14.xml><?xml version="1.0" encoding="utf-8"?>
+<p:sld xmlns:a="http://schemas.openxmlformats.org/drawingml/2006/main" xmlns:r="http://schemas.openxmlformats.org/officeDocument/2006/relationships" xmlns:p="http://schemas.openxmlformats.org/presentationml/2006/main">
+  <p:cSld>
+    <p:bg>
+      <p:bgPr>
+        <a:solidFill>
+          <a:schemeClr val="bg1"/>
+        </a:solidFill>
+        <a:effectLst/>
+      </p:bgPr>
+    </p:bg>
+    <p:spTree>
+      <p:nvGrpSpPr>
+        <p:cNvPr id="1" name=""/>
+        <p:cNvGrpSpPr/>
+        <p:nvPr/>
+      </p:nvGrpSpPr>
+      <p:grpSpPr>
+        <a:xfrm>
+          <a:off x="0" y="0"/>
+          <a:ext cx="0" cy="0"/>
+          <a:chOff x="0" y="0"/>
+          <a:chExt cx="0" cy="0"/>
+        </a:xfrm>
+      </p:grpSpPr>
+      <p:sp useBgFill="1">
+        <p:nvSpPr>
+          <p:cNvPr id="8" name="Rectangle 7">
+            <a:extLst>
+              <a:ext uri="{FF2B5EF4-FFF2-40B4-BE49-F238E27FC236}">
+                <a16:creationId xmlns:a16="http://schemas.microsoft.com/office/drawing/2014/main" id="{907EF6B7-1338-4443-8C46-6A318D952DFD}"/>
+              </a:ext>
+              <a:ext uri="{C183D7F6-B498-43B3-948B-1728B52AA6E4}">
+                <adec:decorative xmlns:adec="http://schemas.microsoft.com/office/drawing/2017/decorative" val="1"/>
+              </a:ext>
+            </a:extLst>
+          </p:cNvPr>
+          <p:cNvSpPr>
+            <a:spLocks noGrp="1" noRot="1" noChangeAspect="1" noMove="1" noResize="1" noEditPoints="1" noAdjustHandles="1" noChangeArrowheads="1" noChangeShapeType="1" noTextEdit="1"/>
+          </p:cNvSpPr>
+          <p:nvPr>
+            <p:extLst>
+              <p:ext uri="{386F3935-93C4-4BCD-93E2-E3B085C9AB24}">
+                <p16:designElem xmlns:p16="http://schemas.microsoft.com/office/powerpoint/2015/main" val="1"/>
+              </p:ext>
+            </p:extLst>
+          </p:nvPr>
+        </p:nvSpPr>
+        <p:spPr>
+          <a:xfrm>
+            <a:off x="3048" y="0"/>
+            <a:ext cx="12188952" cy="6858000"/>
+          </a:xfrm>
+          <a:prstGeom prst="rect">
+            <a:avLst/>
+          </a:prstGeom>
+          <a:ln>
+            <a:noFill/>
+          </a:ln>
+        </p:spPr>
+        <p:style>
+          <a:lnRef idx="2">
+            <a:schemeClr val="accent1">
+              <a:shade val="50000"/>
+            </a:schemeClr>
+          </a:lnRef>
+          <a:fillRef idx="1">
+            <a:schemeClr val="accent1"/>
+          </a:fillRef>
+          <a:effectRef idx="0">
+            <a:schemeClr val="accent1"/>
+          </a:effectRef>
+          <a:fontRef idx="minor">
+            <a:schemeClr val="lt1"/>
+          </a:fontRef>
+        </p:style>
+        <p:txBody>
+          <a:bodyPr rtlCol="0" anchor="ctr"/>
+          <a:lstStyle/>
+          <a:p>
+            <a:pPr algn="ctr"/>
+            <a:endParaRPr lang="en-US" dirty="0"/>
+          </a:p>
+        </p:txBody>
+      </p:sp>
+      <p:sp>
+        <p:nvSpPr>
+          <p:cNvPr id="10" name="Freeform: Shape 9">
+            <a:extLst>
+              <a:ext uri="{FF2B5EF4-FFF2-40B4-BE49-F238E27FC236}">
+                <a16:creationId xmlns:a16="http://schemas.microsoft.com/office/drawing/2014/main" id="{DAAE4CDD-124C-4DCF-9584-B6033B545DD5}"/>
+              </a:ext>
+              <a:ext uri="{C183D7F6-B498-43B3-948B-1728B52AA6E4}">
+                <adec:decorative xmlns:adec="http://schemas.microsoft.com/office/drawing/2017/decorative" val="1"/>
+              </a:ext>
+            </a:extLst>
+          </p:cNvPr>
+          <p:cNvSpPr>
+            <a:spLocks noChangeAspect="1"/>
+          </p:cNvSpPr>
+          <p:nvPr>
+            <p:extLst>
+              <p:ext uri="{386F3935-93C4-4BCD-93E2-E3B085C9AB24}">
+                <p16:designElem xmlns:p16="http://schemas.microsoft.com/office/powerpoint/2015/main" val="1"/>
+              </p:ext>
+            </p:extLst>
+          </p:nvPr>
+        </p:nvSpPr>
+        <p:spPr>
+          <a:xfrm>
+            <a:off x="1" y="0"/>
+            <a:ext cx="4167271" cy="6858000"/>
+          </a:xfrm>
+          <a:custGeom>
+            <a:avLst/>
+            <a:gdLst>
+              <a:gd name="connsiteX0" fmla="*/ 0 w 4167271"/>
+              <a:gd name="connsiteY0" fmla="*/ 0 h 6858000"/>
+              <a:gd name="connsiteX1" fmla="*/ 2259550 w 4167271"/>
+              <a:gd name="connsiteY1" fmla="*/ 0 h 6858000"/>
+              <a:gd name="connsiteX2" fmla="*/ 2387803 w 4167271"/>
+              <a:gd name="connsiteY2" fmla="*/ 82222 h 6858000"/>
+              <a:gd name="connsiteX3" fmla="*/ 4167271 w 4167271"/>
+              <a:gd name="connsiteY3" fmla="*/ 3429000 h 6858000"/>
+              <a:gd name="connsiteX4" fmla="*/ 2387803 w 4167271"/>
+              <a:gd name="connsiteY4" fmla="*/ 6775779 h 6858000"/>
+              <a:gd name="connsiteX5" fmla="*/ 2259550 w 4167271"/>
+              <a:gd name="connsiteY5" fmla="*/ 6858000 h 6858000"/>
+              <a:gd name="connsiteX6" fmla="*/ 0 w 4167271"/>
+              <a:gd name="connsiteY6" fmla="*/ 6858000 h 6858000"/>
+            </a:gdLst>
+            <a:ahLst/>
+            <a:cxnLst>
+              <a:cxn ang="0">
+                <a:pos x="connsiteX0" y="connsiteY0"/>
+              </a:cxn>
+              <a:cxn ang="0">
+                <a:pos x="connsiteX1" y="connsiteY1"/>
+              </a:cxn>
+              <a:cxn ang="0">
+                <a:pos x="connsiteX2" y="connsiteY2"/>
+              </a:cxn>
+              <a:cxn ang="0">
+                <a:pos x="connsiteX3" y="connsiteY3"/>
+              </a:cxn>
+              <a:cxn ang="0">
+                <a:pos x="connsiteX4" y="connsiteY4"/>
+              </a:cxn>
+              <a:cxn ang="0">
+                <a:pos x="connsiteX5" y="connsiteY5"/>
+              </a:cxn>
+              <a:cxn ang="0">
+                <a:pos x="connsiteX6" y="connsiteY6"/>
+              </a:cxn>
+            </a:cxnLst>
+            <a:rect l="l" t="t" r="r" b="b"/>
+            <a:pathLst>
+              <a:path w="4167271" h="6858000">
+                <a:moveTo>
+                  <a:pt x="0" y="0"/>
+                </a:moveTo>
+                <a:lnTo>
+                  <a:pt x="2259550" y="0"/>
+                </a:lnTo>
+                <a:lnTo>
+                  <a:pt x="2387803" y="82222"/>
+                </a:lnTo>
+                <a:cubicBezTo>
+                  <a:pt x="3461407" y="807534"/>
+                  <a:pt x="4167271" y="2035835"/>
+                  <a:pt x="4167271" y="3429000"/>
+                </a:cubicBezTo>
+                <a:cubicBezTo>
+                  <a:pt x="4167271" y="4822165"/>
+                  <a:pt x="3461407" y="6050467"/>
+                  <a:pt x="2387803" y="6775779"/>
+                </a:cubicBezTo>
+                <a:lnTo>
+                  <a:pt x="2259550" y="6858000"/>
+                </a:lnTo>
+                <a:lnTo>
+                  <a:pt x="0" y="6858000"/>
+                </a:lnTo>
+                <a:close/>
+              </a:path>
+            </a:pathLst>
+          </a:custGeom>
+          <a:gradFill flip="none" rotWithShape="1">
+            <a:gsLst>
+              <a:gs pos="0">
+                <a:schemeClr val="accent2">
+                  <a:lumMod val="67000"/>
+                </a:schemeClr>
+              </a:gs>
+              <a:gs pos="48000">
+                <a:schemeClr val="accent2">
+                  <a:lumMod val="97000"/>
+                  <a:lumOff val="3000"/>
+                </a:schemeClr>
+              </a:gs>
+              <a:gs pos="100000">
+                <a:schemeClr val="accent2">
+                  <a:lumMod val="60000"/>
+                  <a:lumOff val="40000"/>
+                </a:schemeClr>
+              </a:gs>
+            </a:gsLst>
+            <a:lin ang="16200000" scaled="1"/>
+            <a:tileRect/>
+          </a:gradFill>
+          <a:ln>
+            <a:noFill/>
+          </a:ln>
+        </p:spPr>
+        <p:style>
+          <a:lnRef idx="0">
+            <a:scrgbClr r="0" g="0" b="0"/>
+          </a:lnRef>
+          <a:fillRef idx="0">
+            <a:scrgbClr r="0" g="0" b="0"/>
+          </a:fillRef>
+          <a:effectRef idx="0">
+            <a:scrgbClr r="0" g="0" b="0"/>
+          </a:effectRef>
+          <a:fontRef idx="minor">
+            <a:schemeClr val="lt1"/>
+          </a:fontRef>
+        </p:style>
+        <p:txBody>
+          <a:bodyPr rtlCol="0" anchor="ctr"/>
+          <a:lstStyle/>
+          <a:p>
+            <a:pPr algn="ctr"/>
+            <a:endParaRPr lang="en-US" dirty="0"/>
+          </a:p>
+        </p:txBody>
+      </p:sp>
+      <p:sp>
+        <p:nvSpPr>
+          <p:cNvPr id="2" name="Title 1">
+            <a:extLst>
+              <a:ext uri="{FF2B5EF4-FFF2-40B4-BE49-F238E27FC236}">
+                <a16:creationId xmlns:a16="http://schemas.microsoft.com/office/drawing/2014/main" id="{604CD088-9924-FDF8-32EA-64AD14C5DE41}"/>
+              </a:ext>
+            </a:extLst>
+          </p:cNvPr>
+          <p:cNvSpPr>
+            <a:spLocks noGrp="1"/>
+          </p:cNvSpPr>
+          <p:nvPr>
+            <p:ph type="title"/>
+          </p:nvPr>
+        </p:nvSpPr>
+        <p:spPr>
+          <a:xfrm>
+            <a:off x="686834" y="1153572"/>
+            <a:ext cx="3200400" cy="4461163"/>
+          </a:xfrm>
+        </p:spPr>
+        <p:txBody>
+          <a:bodyPr>
+            <a:normAutofit/>
+          </a:bodyPr>
+          <a:lstStyle/>
+          <a:p>
+            <a:r>
+              <a:rPr lang="en-US" dirty="0">
+                <a:solidFill>
+                  <a:srgbClr val="FFFFFF"/>
+                </a:solidFill>
+              </a:rPr>
+              <a:t>Gherkin</a:t>
+            </a:r>
+          </a:p>
+        </p:txBody>
+      </p:sp>
+      <p:sp>
+        <p:nvSpPr>
+          <p:cNvPr id="12" name="Arc 11">
+            <a:extLst>
+              <a:ext uri="{FF2B5EF4-FFF2-40B4-BE49-F238E27FC236}">
+                <a16:creationId xmlns:a16="http://schemas.microsoft.com/office/drawing/2014/main" id="{081E4A58-353D-44AE-B2FC-2A74E2E400F7}"/>
+              </a:ext>
+              <a:ext uri="{C183D7F6-B498-43B3-948B-1728B52AA6E4}">
+                <adec:decorative xmlns:adec="http://schemas.microsoft.com/office/drawing/2017/decorative" val="1"/>
+              </a:ext>
+            </a:extLst>
+          </p:cNvPr>
+          <p:cNvSpPr>
+            <a:spLocks noGrp="1" noRot="1" noChangeAspect="1" noMove="1" noResize="1" noEditPoints="1" noAdjustHandles="1" noChangeArrowheads="1" noChangeShapeType="1" noTextEdit="1"/>
+          </p:cNvSpPr>
+          <p:nvPr>
+            <p:extLst>
+              <p:ext uri="{386F3935-93C4-4BCD-93E2-E3B085C9AB24}">
+                <p16:designElem xmlns:p16="http://schemas.microsoft.com/office/powerpoint/2015/main" val="1"/>
+              </p:ext>
+            </p:extLst>
+          </p:nvPr>
+        </p:nvSpPr>
+        <p:spPr>
+          <a:xfrm flipV="1">
+            <a:off x="7550402" y="2455479"/>
+            <a:ext cx="4083433" cy="4083433"/>
+          </a:xfrm>
+          <a:prstGeom prst="arc">
+            <a:avLst/>
+          </a:prstGeom>
+          <a:ln w="127000" cap="rnd">
+            <a:solidFill>
+              <a:schemeClr val="accent4"/>
+            </a:solidFill>
+            <a:prstDash val="dash"/>
+          </a:ln>
+        </p:spPr>
+        <p:style>
+          <a:lnRef idx="1">
+            <a:schemeClr val="accent1"/>
+          </a:lnRef>
+          <a:fillRef idx="0">
+            <a:schemeClr val="accent1"/>
+          </a:fillRef>
+          <a:effectRef idx="0">
+            <a:schemeClr val="accent1"/>
+          </a:effectRef>
+          <a:fontRef idx="minor">
+            <a:schemeClr val="tx1"/>
+          </a:fontRef>
+        </p:style>
+        <p:txBody>
+          <a:bodyPr rtlCol="0" anchor="ctr"/>
+          <a:lstStyle/>
+          <a:p>
+            <a:pPr algn="ctr"/>
+            <a:endParaRPr lang="en-US" dirty="0"/>
+          </a:p>
+        </p:txBody>
+      </p:sp>
+      <p:sp>
+        <p:nvSpPr>
+          <p:cNvPr id="3" name="Content Placeholder 2">
+            <a:extLst>
+              <a:ext uri="{FF2B5EF4-FFF2-40B4-BE49-F238E27FC236}">
+                <a16:creationId xmlns:a16="http://schemas.microsoft.com/office/drawing/2014/main" id="{506ECF03-3832-CE61-45EB-6C148D597A92}"/>
+              </a:ext>
+            </a:extLst>
+          </p:cNvPr>
+          <p:cNvSpPr>
+            <a:spLocks noGrp="1"/>
+          </p:cNvSpPr>
+          <p:nvPr>
+            <p:ph idx="1"/>
+          </p:nvPr>
+        </p:nvSpPr>
+        <p:spPr>
+          <a:xfrm>
             <a:off x="4167272" y="787400"/>
             <a:ext cx="7945215" cy="5389563"/>
           </a:xfrm>
@@ -9053,7 +9477,7 @@
           <a:p>
             <a:r>
               <a:rPr lang="en-US" dirty="0"/>
-              <a:t>Way of writing test cases in natural language</a:t>
+              <a:t>Way of writing test cases in natural language (SHARED UNDERSTANDING)</a:t>
             </a:r>
           </a:p>
           <a:p>
@@ -11535,7 +11959,7 @@
           <p:nvPr/>
         </p:nvPicPr>
         <p:blipFill>
-          <a:blip r:embed="rId2">
+          <a:blip r:embed="rId3">
             <a:extLst>
               <a:ext uri="{28A0092B-C50C-407E-A947-70E740481C1C}">
                 <a14:useLocalDpi xmlns:a14="http://schemas.microsoft.com/office/drawing/2010/main" val="0"/>
@@ -11570,7 +11994,7 @@
           <p:nvPr/>
         </p:nvPicPr>
         <p:blipFill>
-          <a:blip r:embed="rId3">
+          <a:blip r:embed="rId4">
             <a:extLst>
               <a:ext uri="{28A0092B-C50C-407E-A947-70E740481C1C}">
                 <a14:useLocalDpi xmlns:a14="http://schemas.microsoft.com/office/drawing/2010/main" val="0"/>
@@ -11696,6 +12120,14 @@
 <file path=ppt/slides/slide20.xml><?xml version="1.0" encoding="utf-8"?>
 <p:sld xmlns:a="http://schemas.openxmlformats.org/drawingml/2006/main" xmlns:r="http://schemas.openxmlformats.org/officeDocument/2006/relationships" xmlns:p="http://schemas.openxmlformats.org/presentationml/2006/main">
   <p:cSld>
+    <p:bg>
+      <p:bgPr>
+        <a:solidFill>
+          <a:schemeClr val="bg1"/>
+        </a:solidFill>
+        <a:effectLst/>
+      </p:bgPr>
+    </p:bg>
     <p:spTree>
       <p:nvGrpSpPr>
         <p:cNvPr id="1" name=""/>
@@ -11710,6 +12142,527 @@
           <a:chExt cx="0" cy="0"/>
         </a:xfrm>
       </p:grpSpPr>
+      <p:sp useBgFill="1">
+        <p:nvSpPr>
+          <p:cNvPr id="8" name="Rectangle 7">
+            <a:extLst>
+              <a:ext uri="{FF2B5EF4-FFF2-40B4-BE49-F238E27FC236}">
+                <a16:creationId xmlns:a16="http://schemas.microsoft.com/office/drawing/2014/main" id="{907EF6B7-1338-4443-8C46-6A318D952DFD}"/>
+              </a:ext>
+              <a:ext uri="{C183D7F6-B498-43B3-948B-1728B52AA6E4}">
+                <adec:decorative xmlns:adec="http://schemas.microsoft.com/office/drawing/2017/decorative" val="1"/>
+              </a:ext>
+            </a:extLst>
+          </p:cNvPr>
+          <p:cNvSpPr>
+            <a:spLocks noGrp="1" noRot="1" noChangeAspect="1" noMove="1" noResize="1" noEditPoints="1" noAdjustHandles="1" noChangeArrowheads="1" noChangeShapeType="1" noTextEdit="1"/>
+          </p:cNvSpPr>
+          <p:nvPr>
+            <p:extLst>
+              <p:ext uri="{386F3935-93C4-4BCD-93E2-E3B085C9AB24}">
+                <p16:designElem xmlns:p16="http://schemas.microsoft.com/office/powerpoint/2015/main" val="1"/>
+              </p:ext>
+            </p:extLst>
+          </p:nvPr>
+        </p:nvSpPr>
+        <p:spPr>
+          <a:xfrm>
+            <a:off x="3048" y="0"/>
+            <a:ext cx="12188952" cy="6858000"/>
+          </a:xfrm>
+          <a:prstGeom prst="rect">
+            <a:avLst/>
+          </a:prstGeom>
+          <a:ln>
+            <a:noFill/>
+          </a:ln>
+        </p:spPr>
+        <p:style>
+          <a:lnRef idx="2">
+            <a:schemeClr val="accent1">
+              <a:shade val="50000"/>
+            </a:schemeClr>
+          </a:lnRef>
+          <a:fillRef idx="1">
+            <a:schemeClr val="accent1"/>
+          </a:fillRef>
+          <a:effectRef idx="0">
+            <a:schemeClr val="accent1"/>
+          </a:effectRef>
+          <a:fontRef idx="minor">
+            <a:schemeClr val="lt1"/>
+          </a:fontRef>
+        </p:style>
+        <p:txBody>
+          <a:bodyPr rtlCol="0" anchor="ctr"/>
+          <a:lstStyle/>
+          <a:p>
+            <a:pPr algn="ctr"/>
+            <a:endParaRPr lang="en-US" dirty="0"/>
+          </a:p>
+        </p:txBody>
+      </p:sp>
+      <p:sp>
+        <p:nvSpPr>
+          <p:cNvPr id="10" name="Freeform: Shape 9">
+            <a:extLst>
+              <a:ext uri="{FF2B5EF4-FFF2-40B4-BE49-F238E27FC236}">
+                <a16:creationId xmlns:a16="http://schemas.microsoft.com/office/drawing/2014/main" id="{DAAE4CDD-124C-4DCF-9584-B6033B545DD5}"/>
+              </a:ext>
+              <a:ext uri="{C183D7F6-B498-43B3-948B-1728B52AA6E4}">
+                <adec:decorative xmlns:adec="http://schemas.microsoft.com/office/drawing/2017/decorative" val="1"/>
+              </a:ext>
+            </a:extLst>
+          </p:cNvPr>
+          <p:cNvSpPr>
+            <a:spLocks noChangeAspect="1"/>
+          </p:cNvSpPr>
+          <p:nvPr>
+            <p:extLst>
+              <p:ext uri="{386F3935-93C4-4BCD-93E2-E3B085C9AB24}">
+                <p16:designElem xmlns:p16="http://schemas.microsoft.com/office/powerpoint/2015/main" val="1"/>
+              </p:ext>
+            </p:extLst>
+          </p:nvPr>
+        </p:nvSpPr>
+        <p:spPr>
+          <a:xfrm>
+            <a:off x="1" y="0"/>
+            <a:ext cx="4167271" cy="6858000"/>
+          </a:xfrm>
+          <a:custGeom>
+            <a:avLst/>
+            <a:gdLst>
+              <a:gd name="connsiteX0" fmla="*/ 0 w 4167271"/>
+              <a:gd name="connsiteY0" fmla="*/ 0 h 6858000"/>
+              <a:gd name="connsiteX1" fmla="*/ 2259550 w 4167271"/>
+              <a:gd name="connsiteY1" fmla="*/ 0 h 6858000"/>
+              <a:gd name="connsiteX2" fmla="*/ 2387803 w 4167271"/>
+              <a:gd name="connsiteY2" fmla="*/ 82222 h 6858000"/>
+              <a:gd name="connsiteX3" fmla="*/ 4167271 w 4167271"/>
+              <a:gd name="connsiteY3" fmla="*/ 3429000 h 6858000"/>
+              <a:gd name="connsiteX4" fmla="*/ 2387803 w 4167271"/>
+              <a:gd name="connsiteY4" fmla="*/ 6775779 h 6858000"/>
+              <a:gd name="connsiteX5" fmla="*/ 2259550 w 4167271"/>
+              <a:gd name="connsiteY5" fmla="*/ 6858000 h 6858000"/>
+              <a:gd name="connsiteX6" fmla="*/ 0 w 4167271"/>
+              <a:gd name="connsiteY6" fmla="*/ 6858000 h 6858000"/>
+            </a:gdLst>
+            <a:ahLst/>
+            <a:cxnLst>
+              <a:cxn ang="0">
+                <a:pos x="connsiteX0" y="connsiteY0"/>
+              </a:cxn>
+              <a:cxn ang="0">
+                <a:pos x="connsiteX1" y="connsiteY1"/>
+              </a:cxn>
+              <a:cxn ang="0">
+                <a:pos x="connsiteX2" y="connsiteY2"/>
+              </a:cxn>
+              <a:cxn ang="0">
+                <a:pos x="connsiteX3" y="connsiteY3"/>
+              </a:cxn>
+              <a:cxn ang="0">
+                <a:pos x="connsiteX4" y="connsiteY4"/>
+              </a:cxn>
+              <a:cxn ang="0">
+                <a:pos x="connsiteX5" y="connsiteY5"/>
+              </a:cxn>
+              <a:cxn ang="0">
+                <a:pos x="connsiteX6" y="connsiteY6"/>
+              </a:cxn>
+            </a:cxnLst>
+            <a:rect l="l" t="t" r="r" b="b"/>
+            <a:pathLst>
+              <a:path w="4167271" h="6858000">
+                <a:moveTo>
+                  <a:pt x="0" y="0"/>
+                </a:moveTo>
+                <a:lnTo>
+                  <a:pt x="2259550" y="0"/>
+                </a:lnTo>
+                <a:lnTo>
+                  <a:pt x="2387803" y="82222"/>
+                </a:lnTo>
+                <a:cubicBezTo>
+                  <a:pt x="3461407" y="807534"/>
+                  <a:pt x="4167271" y="2035835"/>
+                  <a:pt x="4167271" y="3429000"/>
+                </a:cubicBezTo>
+                <a:cubicBezTo>
+                  <a:pt x="4167271" y="4822165"/>
+                  <a:pt x="3461407" y="6050467"/>
+                  <a:pt x="2387803" y="6775779"/>
+                </a:cubicBezTo>
+                <a:lnTo>
+                  <a:pt x="2259550" y="6858000"/>
+                </a:lnTo>
+                <a:lnTo>
+                  <a:pt x="0" y="6858000"/>
+                </a:lnTo>
+                <a:close/>
+              </a:path>
+            </a:pathLst>
+          </a:custGeom>
+          <a:gradFill flip="none" rotWithShape="1">
+            <a:gsLst>
+              <a:gs pos="0">
+                <a:schemeClr val="accent2">
+                  <a:lumMod val="67000"/>
+                </a:schemeClr>
+              </a:gs>
+              <a:gs pos="48000">
+                <a:schemeClr val="accent2">
+                  <a:lumMod val="97000"/>
+                  <a:lumOff val="3000"/>
+                </a:schemeClr>
+              </a:gs>
+              <a:gs pos="100000">
+                <a:schemeClr val="accent2">
+                  <a:lumMod val="60000"/>
+                  <a:lumOff val="40000"/>
+                </a:schemeClr>
+              </a:gs>
+            </a:gsLst>
+            <a:lin ang="16200000" scaled="1"/>
+            <a:tileRect/>
+          </a:gradFill>
+          <a:ln>
+            <a:noFill/>
+          </a:ln>
+        </p:spPr>
+        <p:style>
+          <a:lnRef idx="0">
+            <a:scrgbClr r="0" g="0" b="0"/>
+          </a:lnRef>
+          <a:fillRef idx="0">
+            <a:scrgbClr r="0" g="0" b="0"/>
+          </a:fillRef>
+          <a:effectRef idx="0">
+            <a:scrgbClr r="0" g="0" b="0"/>
+          </a:effectRef>
+          <a:fontRef idx="minor">
+            <a:schemeClr val="lt1"/>
+          </a:fontRef>
+        </p:style>
+        <p:txBody>
+          <a:bodyPr rtlCol="0" anchor="ctr"/>
+          <a:lstStyle/>
+          <a:p>
+            <a:pPr algn="ctr"/>
+            <a:endParaRPr lang="en-US" dirty="0"/>
+          </a:p>
+        </p:txBody>
+      </p:sp>
+      <p:sp>
+        <p:nvSpPr>
+          <p:cNvPr id="2" name="Title 1">
+            <a:extLst>
+              <a:ext uri="{FF2B5EF4-FFF2-40B4-BE49-F238E27FC236}">
+                <a16:creationId xmlns:a16="http://schemas.microsoft.com/office/drawing/2014/main" id="{604CD088-9924-FDF8-32EA-64AD14C5DE41}"/>
+              </a:ext>
+            </a:extLst>
+          </p:cNvPr>
+          <p:cNvSpPr>
+            <a:spLocks noGrp="1"/>
+          </p:cNvSpPr>
+          <p:nvPr>
+            <p:ph type="title"/>
+          </p:nvPr>
+        </p:nvSpPr>
+        <p:spPr>
+          <a:xfrm>
+            <a:off x="686834" y="1153572"/>
+            <a:ext cx="3200400" cy="4461163"/>
+          </a:xfrm>
+        </p:spPr>
+        <p:txBody>
+          <a:bodyPr>
+            <a:normAutofit/>
+          </a:bodyPr>
+          <a:lstStyle/>
+          <a:p>
+            <a:r>
+              <a:rPr lang="en-US" dirty="0">
+                <a:solidFill>
+                  <a:srgbClr val="FFFFFF"/>
+                </a:solidFill>
+              </a:rPr>
+              <a:t>Demo</a:t>
+            </a:r>
+          </a:p>
+        </p:txBody>
+      </p:sp>
+      <p:sp>
+        <p:nvSpPr>
+          <p:cNvPr id="12" name="Arc 11">
+            <a:extLst>
+              <a:ext uri="{FF2B5EF4-FFF2-40B4-BE49-F238E27FC236}">
+                <a16:creationId xmlns:a16="http://schemas.microsoft.com/office/drawing/2014/main" id="{081E4A58-353D-44AE-B2FC-2A74E2E400F7}"/>
+              </a:ext>
+              <a:ext uri="{C183D7F6-B498-43B3-948B-1728B52AA6E4}">
+                <adec:decorative xmlns:adec="http://schemas.microsoft.com/office/drawing/2017/decorative" val="1"/>
+              </a:ext>
+            </a:extLst>
+          </p:cNvPr>
+          <p:cNvSpPr>
+            <a:spLocks noGrp="1" noRot="1" noChangeAspect="1" noMove="1" noResize="1" noEditPoints="1" noAdjustHandles="1" noChangeArrowheads="1" noChangeShapeType="1" noTextEdit="1"/>
+          </p:cNvSpPr>
+          <p:nvPr>
+            <p:extLst>
+              <p:ext uri="{386F3935-93C4-4BCD-93E2-E3B085C9AB24}">
+                <p16:designElem xmlns:p16="http://schemas.microsoft.com/office/powerpoint/2015/main" val="1"/>
+              </p:ext>
+            </p:extLst>
+          </p:nvPr>
+        </p:nvSpPr>
+        <p:spPr>
+          <a:xfrm flipV="1">
+            <a:off x="7550402" y="2455479"/>
+            <a:ext cx="4083433" cy="4083433"/>
+          </a:xfrm>
+          <a:prstGeom prst="arc">
+            <a:avLst/>
+          </a:prstGeom>
+          <a:ln w="127000" cap="rnd">
+            <a:solidFill>
+              <a:schemeClr val="accent4"/>
+            </a:solidFill>
+            <a:prstDash val="dash"/>
+          </a:ln>
+        </p:spPr>
+        <p:style>
+          <a:lnRef idx="1">
+            <a:schemeClr val="accent1"/>
+          </a:lnRef>
+          <a:fillRef idx="0">
+            <a:schemeClr val="accent1"/>
+          </a:fillRef>
+          <a:effectRef idx="0">
+            <a:schemeClr val="accent1"/>
+          </a:effectRef>
+          <a:fontRef idx="minor">
+            <a:schemeClr val="tx1"/>
+          </a:fontRef>
+        </p:style>
+        <p:txBody>
+          <a:bodyPr rtlCol="0" anchor="ctr"/>
+          <a:lstStyle/>
+          <a:p>
+            <a:pPr algn="ctr"/>
+            <a:endParaRPr lang="en-US" dirty="0"/>
+          </a:p>
+        </p:txBody>
+      </p:sp>
+      <p:pic>
+        <p:nvPicPr>
+          <p:cNvPr id="4" name="Picture 3">
+            <a:extLst>
+              <a:ext uri="{FF2B5EF4-FFF2-40B4-BE49-F238E27FC236}">
+                <a16:creationId xmlns:a16="http://schemas.microsoft.com/office/drawing/2014/main" id="{E5D75963-707A-00B6-0F3B-7B61F831E4A6}"/>
+              </a:ext>
+            </a:extLst>
+          </p:cNvPr>
+          <p:cNvPicPr>
+            <a:picLocks noChangeAspect="1"/>
+          </p:cNvPicPr>
+          <p:nvPr/>
+        </p:nvPicPr>
+        <p:blipFill>
+          <a:blip r:embed="rId3"/>
+          <a:stretch>
+            <a:fillRect/>
+          </a:stretch>
+        </p:blipFill>
+        <p:spPr>
+          <a:xfrm>
+            <a:off x="6095986" y="3428993"/>
+            <a:ext cx="27" cy="13"/>
+          </a:xfrm>
+          <a:prstGeom prst="rect">
+            <a:avLst/>
+          </a:prstGeom>
+        </p:spPr>
+      </p:pic>
+      <p:sp>
+        <p:nvSpPr>
+          <p:cNvPr id="6" name="Content Placeholder 5">
+            <a:extLst>
+              <a:ext uri="{FF2B5EF4-FFF2-40B4-BE49-F238E27FC236}">
+                <a16:creationId xmlns:a16="http://schemas.microsoft.com/office/drawing/2014/main" id="{8A486F0A-7C8D-B815-63C5-A465D3B07763}"/>
+              </a:ext>
+            </a:extLst>
+          </p:cNvPr>
+          <p:cNvSpPr>
+            <a:spLocks noGrp="1"/>
+          </p:cNvSpPr>
+          <p:nvPr>
+            <p:ph idx="1"/>
+          </p:nvPr>
+        </p:nvSpPr>
+        <p:spPr/>
+        <p:txBody>
+          <a:bodyPr/>
+          <a:lstStyle/>
+          <a:p>
+            <a:endParaRPr lang="en-US" dirty="0"/>
+          </a:p>
+        </p:txBody>
+      </p:sp>
+    </p:spTree>
+    <p:extLst>
+      <p:ext uri="{BB962C8B-B14F-4D97-AF65-F5344CB8AC3E}">
+        <p14:creationId xmlns:p14="http://schemas.microsoft.com/office/powerpoint/2010/main" val="1798449752"/>
+      </p:ext>
+    </p:extLst>
+  </p:cSld>
+  <p:clrMapOvr>
+    <a:masterClrMapping/>
+  </p:clrMapOvr>
+  <p:timing>
+    <p:tnLst>
+      <p:par>
+        <p:cTn id="1" dur="indefinite" restart="never" nodeType="tmRoot">
+          <p:childTnLst>
+            <p:seq concurrent="1" nextAc="seek">
+              <p:cTn id="2" dur="indefinite" nodeType="mainSeq">
+                <p:childTnLst>
+                  <p:par>
+                    <p:cTn id="3" fill="hold">
+                      <p:stCondLst>
+                        <p:cond delay="indefinite"/>
+                      </p:stCondLst>
+                      <p:childTnLst>
+                        <p:par>
+                          <p:cTn id="4" fill="hold">
+                            <p:stCondLst>
+                              <p:cond delay="0"/>
+                            </p:stCondLst>
+                            <p:childTnLst>
+                              <p:par>
+                                <p:cTn id="5" presetID="2" presetClass="entr" presetSubtype="8" fill="hold" grpId="0" nodeType="clickEffect">
+                                  <p:stCondLst>
+                                    <p:cond delay="0"/>
+                                  </p:stCondLst>
+                                  <p:childTnLst>
+                                    <p:set>
+                                      <p:cBhvr>
+                                        <p:cTn id="6" dur="1" fill="hold">
+                                          <p:stCondLst>
+                                            <p:cond delay="0"/>
+                                          </p:stCondLst>
+                                        </p:cTn>
+                                        <p:tgtEl>
+                                          <p:spTgt spid="10"/>
+                                        </p:tgtEl>
+                                        <p:attrNameLst>
+                                          <p:attrName>style.visibility</p:attrName>
+                                        </p:attrNameLst>
+                                      </p:cBhvr>
+                                      <p:to>
+                                        <p:strVal val="visible"/>
+                                      </p:to>
+                                    </p:set>
+                                    <p:anim calcmode="lin" valueType="num">
+                                      <p:cBhvr additive="base">
+                                        <p:cTn id="7" dur="3500" fill="hold"/>
+                                        <p:tgtEl>
+                                          <p:spTgt spid="10"/>
+                                        </p:tgtEl>
+                                        <p:attrNameLst>
+                                          <p:attrName>ppt_x</p:attrName>
+                                        </p:attrNameLst>
+                                      </p:cBhvr>
+                                      <p:tavLst>
+                                        <p:tav tm="0">
+                                          <p:val>
+                                            <p:strVal val="0-#ppt_w/2"/>
+                                          </p:val>
+                                        </p:tav>
+                                        <p:tav tm="100000">
+                                          <p:val>
+                                            <p:strVal val="#ppt_x"/>
+                                          </p:val>
+                                        </p:tav>
+                                      </p:tavLst>
+                                    </p:anim>
+                                    <p:anim calcmode="lin" valueType="num">
+                                      <p:cBhvr additive="base">
+                                        <p:cTn id="8" dur="3500" fill="hold"/>
+                                        <p:tgtEl>
+                                          <p:spTgt spid="10"/>
+                                        </p:tgtEl>
+                                        <p:attrNameLst>
+                                          <p:attrName>ppt_y</p:attrName>
+                                        </p:attrNameLst>
+                                      </p:cBhvr>
+                                      <p:tavLst>
+                                        <p:tav tm="0">
+                                          <p:val>
+                                            <p:strVal val="#ppt_y"/>
+                                          </p:val>
+                                        </p:tav>
+                                        <p:tav tm="100000">
+                                          <p:val>
+                                            <p:strVal val="#ppt_y"/>
+                                          </p:val>
+                                        </p:tav>
+                                      </p:tavLst>
+                                    </p:anim>
+                                  </p:childTnLst>
+                                </p:cTn>
+                              </p:par>
+                            </p:childTnLst>
+                          </p:cTn>
+                        </p:par>
+                      </p:childTnLst>
+                    </p:cTn>
+                  </p:par>
+                </p:childTnLst>
+              </p:cTn>
+              <p:prevCondLst>
+                <p:cond evt="onPrev" delay="0">
+                  <p:tgtEl>
+                    <p:sldTgt/>
+                  </p:tgtEl>
+                </p:cond>
+              </p:prevCondLst>
+              <p:nextCondLst>
+                <p:cond evt="onNext" delay="0">
+                  <p:tgtEl>
+                    <p:sldTgt/>
+                  </p:tgtEl>
+                </p:cond>
+              </p:nextCondLst>
+            </p:seq>
+          </p:childTnLst>
+        </p:cTn>
+      </p:par>
+    </p:tnLst>
+    <p:bldLst>
+      <p:bldP spid="10" grpId="0" animBg="1"/>
+    </p:bldLst>
+  </p:timing>
+</p:sld>
+</file>
+
+<file path=ppt/slides/slide21.xml><?xml version="1.0" encoding="utf-8"?>
+<p:sld xmlns:a="http://schemas.openxmlformats.org/drawingml/2006/main" xmlns:r="http://schemas.openxmlformats.org/officeDocument/2006/relationships" xmlns:p="http://schemas.openxmlformats.org/presentationml/2006/main">
+  <p:cSld>
+    <p:spTree>
+      <p:nvGrpSpPr>
+        <p:cNvPr id="1" name=""/>
+        <p:cNvGrpSpPr/>
+        <p:nvPr/>
+      </p:nvGrpSpPr>
+      <p:grpSpPr>
+        <a:xfrm>
+          <a:off x="0" y="0"/>
+          <a:ext cx="0" cy="0"/>
+          <a:chOff x="0" y="0"/>
+          <a:chExt cx="0" cy="0"/>
+        </a:xfrm>
+      </p:grpSpPr>
       <p:sp>
         <p:nvSpPr>
           <p:cNvPr id="2" name="Title 1">
@@ -11773,7 +12726,7 @@
 </p:sld>
 </file>
 
-<file path=ppt/slides/slide21.xml><?xml version="1.0" encoding="utf-8"?>
+<file path=ppt/slides/slide22.xml><?xml version="1.0" encoding="utf-8"?>
 <p:sld xmlns:a="http://schemas.openxmlformats.org/drawingml/2006/main" xmlns:r="http://schemas.openxmlformats.org/officeDocument/2006/relationships" xmlns:p="http://schemas.openxmlformats.org/presentationml/2006/main">
   <p:cSld>
     <p:bg>
@@ -12284,7 +13237,7 @@
 </p:sld>
 </file>
 
-<file path=ppt/slides/slide22.xml><?xml version="1.0" encoding="utf-8"?>
+<file path=ppt/slides/slide23.xml><?xml version="1.0" encoding="utf-8"?>
 <p:sld xmlns:a="http://schemas.openxmlformats.org/drawingml/2006/main" xmlns:r="http://schemas.openxmlformats.org/officeDocument/2006/relationships" xmlns:p="http://schemas.openxmlformats.org/presentationml/2006/main">
   <p:cSld>
     <p:bg>
@@ -15551,8 +16504,8 @@
           </a:p>
         </p:txBody>
       </p:sp>
-      <mc:AlternateContent xmlns:mc="http://schemas.openxmlformats.org/markup-compatibility/2006">
-        <mc:Choice xmlns:we="http://schemas.microsoft.com/office/webextensions/webextension/2010/11" xmlns:pca="http://schemas.microsoft.com/office/powerpoint/2013/contentapp" Requires="we pca">
+      <mc:AlternateContent xmlns:mc="http://schemas.openxmlformats.org/markup-compatibility/2006" xmlns:we="http://schemas.microsoft.com/office/webextensions/webextension/2010/11" xmlns:pca="http://schemas.microsoft.com/office/powerpoint/2013/contentapp">
+        <mc:Choice Requires="we pca">
           <p:graphicFrame>
             <p:nvGraphicFramePr>
               <p:cNvPr id="4" name="Content Placeholder 3" title="AhaSlides - Live Polls and Quizzes">
@@ -15585,7 +16538,7 @@
             </a:graphic>
           </p:graphicFrame>
         </mc:Choice>
-        <mc:Fallback>
+        <mc:Fallback xmlns="">
           <p:pic>
             <p:nvPicPr>
               <p:cNvPr id="4" name="Content Placeholder 3" title="AhaSlides - Live Polls and Quizzes">

</xml_diff>